<commit_message>
#20161114 -> Bab 1 kelar, tinggal revisi [slide]
</commit_message>
<xml_diff>
--- a/PPT/Business Plan MID.pptx
+++ b/PPT/Business Plan MID.pptx
@@ -6,6 +6,12 @@
   </p:sldMasterIdLst>
   <p:sldIdLst>
     <p:sldId id="256" r:id="rId2"/>
+    <p:sldId id="258" r:id="rId3"/>
+    <p:sldId id="257" r:id="rId4"/>
+    <p:sldId id="259" r:id="rId5"/>
+    <p:sldId id="260" r:id="rId6"/>
+    <p:sldId id="261" r:id="rId7"/>
+    <p:sldId id="262" r:id="rId8"/>
   </p:sldIdLst>
   <p:sldSz cx="12192000" cy="6858000"/>
   <p:notesSz cx="6858000" cy="9144000"/>
@@ -104,6 +110,11 @@
       </a:defRPr>
     </a:lvl9pPr>
   </p:defaultTextStyle>
+  <p:extLst>
+    <p:ext uri="{EFAFB233-063F-42B5-8137-9DF3F51BA10A}">
+      <p15:sldGuideLst xmlns:p15="http://schemas.microsoft.com/office/powerpoint/2012/main"/>
+    </p:ext>
+  </p:extLst>
 </p:presentation>
 </file>
 
@@ -4574,12 +4585,12 @@
   <p:extLst mod="1">
     <p:ext uri="{27BBF7A9-308A-43DC-89C8-2F10F3537804}">
       <p15:sldGuideLst xmlns:p15="http://schemas.microsoft.com/office/powerpoint/2012/main">
-        <p15:guide id="4294967295" orient="horz" pos="2160">
+        <p15:guide id="1" orient="horz" pos="2160">
           <p15:clr>
             <a:srgbClr val="F26B43"/>
           </p15:clr>
         </p15:guide>
-        <p15:guide id="4294967295" pos="3840">
+        <p15:guide id="2" pos="3840">
           <p15:clr>
             <a:srgbClr val="F26B43"/>
           </p15:clr>
@@ -4617,14 +4628,23 @@
             <p:ph type="ctrTitle"/>
           </p:nvPr>
         </p:nvSpPr>
-        <p:spPr/>
+        <p:spPr>
+          <a:xfrm>
+            <a:off x="2752532" y="3552282"/>
+            <a:ext cx="8591939" cy="489802"/>
+          </a:xfrm>
+        </p:spPr>
         <p:txBody>
           <a:bodyPr>
             <a:normAutofit fontScale="90000"/>
           </a:bodyPr>
           <a:lstStyle/>
           <a:p>
-            <a:endParaRPr lang="id-ID"/>
+            <a:r>
+              <a:rPr lang="id-ID" dirty="0" smtClean="0"/>
+              <a:t>BINUS University</a:t>
+            </a:r>
+            <a:endParaRPr lang="id-ID" dirty="0"/>
           </a:p>
         </p:txBody>
       </p:sp>
@@ -4638,12 +4658,21 @@
             <p:ph type="subTitle" idx="1"/>
           </p:nvPr>
         </p:nvSpPr>
-        <p:spPr/>
+        <p:spPr>
+          <a:xfrm>
+            <a:off x="3889291" y="4100273"/>
+            <a:ext cx="6400800" cy="447869"/>
+          </a:xfrm>
+        </p:spPr>
         <p:txBody>
           <a:bodyPr/>
           <a:lstStyle/>
           <a:p>
-            <a:endParaRPr lang="id-ID"/>
+            <a:r>
+              <a:rPr lang="id-ID" dirty="0" smtClean="0"/>
+              <a:t>November 2016</a:t>
+            </a:r>
+            <a:endParaRPr lang="id-ID" dirty="0"/>
           </a:p>
         </p:txBody>
       </p:sp>
@@ -4651,6 +4680,2292 @@
     <p:extLst>
       <p:ext uri="{BB962C8B-B14F-4D97-AF65-F5344CB8AC3E}">
         <p14:creationId xmlns:p14="http://schemas.microsoft.com/office/powerpoint/2010/main" val="804397251"/>
+      </p:ext>
+    </p:extLst>
+  </p:cSld>
+  <p:clrMapOvr>
+    <a:masterClrMapping/>
+  </p:clrMapOvr>
+  <mc:AlternateContent xmlns:mc="http://schemas.openxmlformats.org/markup-compatibility/2006" xmlns:p14="http://schemas.microsoft.com/office/powerpoint/2010/main">
+    <mc:Choice Requires="p14">
+      <p:transition spd="med" p14:dur="700">
+        <p:fade/>
+      </p:transition>
+    </mc:Choice>
+    <mc:Fallback xmlns="">
+      <p:transition spd="med">
+        <p:fade/>
+      </p:transition>
+    </mc:Fallback>
+  </mc:AlternateContent>
+</p:sld>
+</file>
+
+<file path=ppt/slides/slide2.xml><?xml version="1.0" encoding="utf-8"?>
+<p:sld xmlns:a="http://schemas.openxmlformats.org/drawingml/2006/main" xmlns:r="http://schemas.openxmlformats.org/officeDocument/2006/relationships" xmlns:p="http://schemas.openxmlformats.org/presentationml/2006/main">
+  <p:cSld>
+    <p:spTree>
+      <p:nvGrpSpPr>
+        <p:cNvPr id="1" name=""/>
+        <p:cNvGrpSpPr/>
+        <p:nvPr/>
+      </p:nvGrpSpPr>
+      <p:grpSpPr>
+        <a:xfrm>
+          <a:off x="0" y="0"/>
+          <a:ext cx="0" cy="0"/>
+          <a:chOff x="0" y="0"/>
+          <a:chExt cx="0" cy="0"/>
+        </a:xfrm>
+      </p:grpSpPr>
+      <p:sp>
+        <p:nvSpPr>
+          <p:cNvPr id="2" name="Title 1"/>
+          <p:cNvSpPr>
+            <a:spLocks noGrp="1"/>
+          </p:cNvSpPr>
+          <p:nvPr>
+            <p:ph type="title"/>
+          </p:nvPr>
+        </p:nvSpPr>
+        <p:spPr/>
+        <p:txBody>
+          <a:bodyPr/>
+          <a:lstStyle/>
+          <a:p>
+            <a:r>
+              <a:rPr lang="id-ID" dirty="0" smtClean="0"/>
+              <a:t>Disusun oleh:</a:t>
+            </a:r>
+            <a:endParaRPr lang="id-ID" dirty="0"/>
+          </a:p>
+        </p:txBody>
+      </p:sp>
+      <p:sp>
+        <p:nvSpPr>
+          <p:cNvPr id="3" name="Text Placeholder 2"/>
+          <p:cNvSpPr>
+            <a:spLocks noGrp="1"/>
+          </p:cNvSpPr>
+          <p:nvPr>
+            <p:ph type="body" idx="1"/>
+          </p:nvPr>
+        </p:nvSpPr>
+        <p:spPr/>
+        <p:txBody>
+          <a:bodyPr/>
+          <a:lstStyle/>
+          <a:p>
+            <a:pPr marL="342900" indent="-342900">
+              <a:buFont typeface="+mj-lt"/>
+              <a:buAutoNum type="arabicPeriod"/>
+            </a:pPr>
+            <a:r>
+              <a:rPr lang="id-ID" dirty="0" smtClean="0"/>
+              <a:t>Jeffry Angtoni - 1801425975</a:t>
+            </a:r>
+            <a:endParaRPr lang="id-ID" dirty="0"/>
+          </a:p>
+        </p:txBody>
+      </p:sp>
+    </p:spTree>
+    <p:extLst>
+      <p:ext uri="{BB962C8B-B14F-4D97-AF65-F5344CB8AC3E}">
+        <p14:creationId xmlns:p14="http://schemas.microsoft.com/office/powerpoint/2010/main" val="2583850274"/>
+      </p:ext>
+    </p:extLst>
+  </p:cSld>
+  <p:clrMapOvr>
+    <a:masterClrMapping/>
+  </p:clrMapOvr>
+  <mc:AlternateContent xmlns:mc="http://schemas.openxmlformats.org/markup-compatibility/2006" xmlns:p14="http://schemas.microsoft.com/office/powerpoint/2010/main">
+    <mc:Choice Requires="p14">
+      <p:transition spd="med" p14:dur="700">
+        <p:fade/>
+      </p:transition>
+    </mc:Choice>
+    <mc:Fallback xmlns="">
+      <p:transition spd="med">
+        <p:fade/>
+      </p:transition>
+    </mc:Fallback>
+  </mc:AlternateContent>
+</p:sld>
+</file>
+
+<file path=ppt/slides/slide3.xml><?xml version="1.0" encoding="utf-8"?>
+<p:sld xmlns:a="http://schemas.openxmlformats.org/drawingml/2006/main" xmlns:r="http://schemas.openxmlformats.org/officeDocument/2006/relationships" xmlns:p="http://schemas.openxmlformats.org/presentationml/2006/main">
+  <p:cSld>
+    <p:spTree>
+      <p:nvGrpSpPr>
+        <p:cNvPr id="1" name=""/>
+        <p:cNvGrpSpPr/>
+        <p:nvPr/>
+      </p:nvGrpSpPr>
+      <p:grpSpPr>
+        <a:xfrm>
+          <a:off x="0" y="0"/>
+          <a:ext cx="0" cy="0"/>
+          <a:chOff x="0" y="0"/>
+          <a:chExt cx="0" cy="0"/>
+        </a:xfrm>
+      </p:grpSpPr>
+      <p:sp>
+        <p:nvSpPr>
+          <p:cNvPr id="2" name="Title 1"/>
+          <p:cNvSpPr>
+            <a:spLocks noGrp="1"/>
+          </p:cNvSpPr>
+          <p:nvPr>
+            <p:ph type="title"/>
+          </p:nvPr>
+        </p:nvSpPr>
+        <p:spPr/>
+        <p:txBody>
+          <a:bodyPr/>
+          <a:lstStyle/>
+          <a:p>
+            <a:r>
+              <a:rPr lang="id-ID" dirty="0" smtClean="0"/>
+              <a:t>Ringkasan Eksekutif</a:t>
+            </a:r>
+            <a:endParaRPr lang="id-ID" dirty="0"/>
+          </a:p>
+        </p:txBody>
+      </p:sp>
+      <p:sp>
+        <p:nvSpPr>
+          <p:cNvPr id="3" name="Content Placeholder 2"/>
+          <p:cNvSpPr>
+            <a:spLocks noGrp="1"/>
+          </p:cNvSpPr>
+          <p:nvPr>
+            <p:ph idx="1"/>
+          </p:nvPr>
+        </p:nvSpPr>
+        <p:spPr>
+          <a:xfrm>
+            <a:off x="1295400" y="1662549"/>
+            <a:ext cx="9601200" cy="5079995"/>
+          </a:xfrm>
+        </p:spPr>
+        <p:txBody>
+          <a:bodyPr>
+            <a:noAutofit/>
+          </a:bodyPr>
+          <a:lstStyle/>
+          <a:p>
+            <a:pPr marL="0" indent="0" algn="just">
+              <a:lnSpc>
+                <a:spcPct val="110000"/>
+              </a:lnSpc>
+              <a:spcAft>
+                <a:spcPts val="200"/>
+              </a:spcAft>
+              <a:buNone/>
+            </a:pPr>
+            <a:r>
+              <a:rPr lang="id-ID" sz="1400" b="1" dirty="0" smtClean="0">
+                <a:solidFill>
+                  <a:schemeClr val="tx2"/>
+                </a:solidFill>
+              </a:rPr>
+              <a:t>Router</a:t>
+            </a:r>
+            <a:r>
+              <a:rPr lang="id-ID" sz="1400" b="1" dirty="0" smtClean="0">
+                <a:solidFill>
+                  <a:schemeClr val="accent2"/>
+                </a:solidFill>
+              </a:rPr>
+              <a:t>Maya</a:t>
+            </a:r>
+            <a:r>
+              <a:rPr lang="id-ID" sz="1400" dirty="0">
+                <a:solidFill>
+                  <a:schemeClr val="tx2"/>
+                </a:solidFill>
+              </a:rPr>
+              <a:t> </a:t>
+            </a:r>
+            <a:r>
+              <a:rPr lang="id-ID" sz="1400" dirty="0" smtClean="0">
+                <a:solidFill>
+                  <a:schemeClr val="tx2"/>
+                </a:solidFill>
+              </a:rPr>
+              <a:t>merupakan suatu layanan penyewaan router berbais cloud</a:t>
+            </a:r>
+            <a:r>
+              <a:rPr lang="id-ID" sz="1400" dirty="0">
+                <a:solidFill>
+                  <a:schemeClr val="tx2"/>
+                </a:solidFill>
+              </a:rPr>
+              <a:t>. Kami memilih usaha tersebut karena masih minimnya penggunaan teknologi router berbasis cloud yang ada di Indonesia. Berdasarkan hasil analisa kami, hingga saat ini jumlah provider yang menyediakan jasa router virtual masih bias dihitung dengan jari. Tantangan terbesar dari suatu perusahaan yang membutuhkan ketersediaan jaringan mereka adalah bagaimana mencapai tingkat availability yang tinggi dengan menggunakan perangkat router berbiaya rendah. Dengan adanya layanan router virtual ini diharapkan dapat memangkas jumlah cost yang besar dalam penyediaan router suatu jaringan komputer perusahaan tersebut. Router yang kami sediakan merupakan router virtual sehingga secara fisik router tersebut tidak ada, tetapi secara logika (software) router tersebut ada. Layanan router virtual tersebut dapat dikontrol dari berbagai gadget, PC, ataupun notebook melalui portal web yang kami sediakan</a:t>
+            </a:r>
+            <a:r>
+              <a:rPr lang="id-ID" sz="1400" dirty="0" smtClean="0">
+                <a:solidFill>
+                  <a:schemeClr val="tx2"/>
+                </a:solidFill>
+              </a:rPr>
+              <a:t>.</a:t>
+            </a:r>
+          </a:p>
+          <a:p>
+            <a:pPr marL="0" indent="0" algn="just">
+              <a:lnSpc>
+                <a:spcPct val="110000"/>
+              </a:lnSpc>
+              <a:buNone/>
+            </a:pPr>
+            <a:r>
+              <a:rPr lang="id-ID" sz="1400" b="1" dirty="0" smtClean="0">
+                <a:solidFill>
+                  <a:schemeClr val="tx2"/>
+                </a:solidFill>
+              </a:rPr>
+              <a:t>Router</a:t>
+            </a:r>
+            <a:r>
+              <a:rPr lang="id-ID" sz="1400" b="1" dirty="0" smtClean="0">
+                <a:solidFill>
+                  <a:schemeClr val="accent2"/>
+                </a:solidFill>
+              </a:rPr>
+              <a:t>Maya</a:t>
+            </a:r>
+            <a:r>
+              <a:rPr lang="id-ID" sz="1400" dirty="0" smtClean="0">
+                <a:solidFill>
+                  <a:schemeClr val="tx2"/>
+                </a:solidFill>
+              </a:rPr>
+              <a:t> ditujukan kepada para startup yang baru ingin memulai bisnisnya, kalangan enterprise untuk menjamin </a:t>
+            </a:r>
+            <a:r>
+              <a:rPr lang="id-ID" sz="1400" i="1" dirty="0" smtClean="0">
+                <a:solidFill>
+                  <a:schemeClr val="tx2"/>
+                </a:solidFill>
+              </a:rPr>
+              <a:t>availability</a:t>
+            </a:r>
+            <a:r>
+              <a:rPr lang="id-ID" sz="1400" dirty="0" smtClean="0">
+                <a:solidFill>
+                  <a:schemeClr val="tx2"/>
+                </a:solidFill>
+              </a:rPr>
+              <a:t> server mereka, dan juga untuk para pemula ataupun </a:t>
+            </a:r>
+            <a:r>
+              <a:rPr lang="id-ID" sz="1400" i="1" dirty="0" smtClean="0">
+                <a:solidFill>
+                  <a:schemeClr val="tx2"/>
+                </a:solidFill>
+              </a:rPr>
+              <a:t>enthusiast user</a:t>
+            </a:r>
+            <a:r>
+              <a:rPr lang="id-ID" sz="1400" dirty="0" smtClean="0">
+                <a:solidFill>
+                  <a:schemeClr val="tx2"/>
+                </a:solidFill>
+              </a:rPr>
+              <a:t> yang ingin mencoba hal-hal baru seputar teknologi cloud dan network</a:t>
+            </a:r>
+            <a:r>
+              <a:rPr lang="id-ID" sz="1400" dirty="0">
+                <a:solidFill>
+                  <a:schemeClr val="tx2"/>
+                </a:solidFill>
+              </a:rPr>
+              <a:t>. Fitur-fitur dari layanan kami, yakni mendukung </a:t>
+            </a:r>
+            <a:r>
+              <a:rPr lang="id-ID" sz="1400" dirty="0" smtClean="0">
+                <a:solidFill>
+                  <a:schemeClr val="tx2"/>
+                </a:solidFill>
+              </a:rPr>
+              <a:t>hampir semua open-source OS </a:t>
+            </a:r>
+            <a:r>
+              <a:rPr lang="id-ID" sz="1400" dirty="0">
+                <a:solidFill>
+                  <a:schemeClr val="tx2"/>
+                </a:solidFill>
+              </a:rPr>
+              <a:t>untuk kebutuhan </a:t>
+            </a:r>
+            <a:r>
+              <a:rPr lang="id-ID" sz="1400" dirty="0" smtClean="0">
+                <a:solidFill>
+                  <a:schemeClr val="tx2"/>
+                </a:solidFill>
+              </a:rPr>
+              <a:t>routing. Layanan </a:t>
+            </a:r>
+            <a:r>
+              <a:rPr lang="id-ID" sz="1400" dirty="0">
+                <a:solidFill>
+                  <a:schemeClr val="tx2"/>
+                </a:solidFill>
+              </a:rPr>
+              <a:t>router kami juga dapat dijadikan sebagai backup router untuk fail-over, ataupun sebagai </a:t>
+            </a:r>
+            <a:r>
+              <a:rPr lang="id-ID" sz="1400" dirty="0" smtClean="0">
+                <a:solidFill>
+                  <a:schemeClr val="tx2"/>
+                </a:solidFill>
+              </a:rPr>
+              <a:t>load-balancer. </a:t>
+            </a:r>
+            <a:r>
+              <a:rPr lang="id-ID" sz="1400" dirty="0">
+                <a:solidFill>
+                  <a:schemeClr val="tx2"/>
+                </a:solidFill>
+              </a:rPr>
+              <a:t>Tidak hanya itu, kami juga mengijinkan private tunneling, seperti VPN (Virtual Private Network) untuk menjangkau seluruh cabang dari suatu instansi perusahaan. Router virtual kami juga dapat dijadikan sebagai firewall, sehingga Anda dapat dengan mudah mengontrol access-list (ACL) ataupun melakukan filter berbasis protokol dan no. port jaringan anda. Visi dari usaha kami adalah menjadi cloud router provider yang selalu dipercaya dan terpercaya, dan meningkatkan wawasan teknologi jaringan komputer bangsa. Misi dari usaha kami adalah mengelola infrastruktur jaringan dengan segenap tenaga, meningkatkan hubungan yang baik dengan pelanggan dan partner perusahaan, dan menyelenggarakan training seputar dunia jaringan komputer kepada masyarakat.</a:t>
+            </a:r>
+            <a:endParaRPr lang="id-ID" sz="1400" dirty="0"/>
+          </a:p>
+        </p:txBody>
+      </p:sp>
+    </p:spTree>
+    <p:extLst>
+      <p:ext uri="{BB962C8B-B14F-4D97-AF65-F5344CB8AC3E}">
+        <p14:creationId xmlns:p14="http://schemas.microsoft.com/office/powerpoint/2010/main" val="2734151818"/>
+      </p:ext>
+    </p:extLst>
+  </p:cSld>
+  <p:clrMapOvr>
+    <a:masterClrMapping/>
+  </p:clrMapOvr>
+  <mc:AlternateContent xmlns:mc="http://schemas.openxmlformats.org/markup-compatibility/2006" xmlns:p14="http://schemas.microsoft.com/office/powerpoint/2010/main">
+    <mc:Choice Requires="p14">
+      <p:transition spd="med" p14:dur="700">
+        <p:fade/>
+      </p:transition>
+    </mc:Choice>
+    <mc:Fallback xmlns="">
+      <p:transition spd="med">
+        <p:fade/>
+      </p:transition>
+    </mc:Fallback>
+  </mc:AlternateContent>
+</p:sld>
+</file>
+
+<file path=ppt/slides/slide4.xml><?xml version="1.0" encoding="utf-8"?>
+<p:sld xmlns:a="http://schemas.openxmlformats.org/drawingml/2006/main" xmlns:r="http://schemas.openxmlformats.org/officeDocument/2006/relationships" xmlns:p="http://schemas.openxmlformats.org/presentationml/2006/main">
+  <p:cSld>
+    <p:spTree>
+      <p:nvGrpSpPr>
+        <p:cNvPr id="1" name=""/>
+        <p:cNvGrpSpPr/>
+        <p:nvPr/>
+      </p:nvGrpSpPr>
+      <p:grpSpPr>
+        <a:xfrm>
+          <a:off x="0" y="0"/>
+          <a:ext cx="0" cy="0"/>
+          <a:chOff x="0" y="0"/>
+          <a:chExt cx="0" cy="0"/>
+        </a:xfrm>
+      </p:grpSpPr>
+      <p:sp>
+        <p:nvSpPr>
+          <p:cNvPr id="2" name="Title 1"/>
+          <p:cNvSpPr>
+            <a:spLocks noGrp="1"/>
+          </p:cNvSpPr>
+          <p:nvPr>
+            <p:ph type="title"/>
+          </p:nvPr>
+        </p:nvSpPr>
+        <p:spPr/>
+        <p:txBody>
+          <a:bodyPr/>
+          <a:lstStyle/>
+          <a:p>
+            <a:r>
+              <a:rPr lang="id-ID" dirty="0" smtClean="0"/>
+              <a:t>Latar Belakang Perusahaan</a:t>
+            </a:r>
+            <a:endParaRPr lang="id-ID" dirty="0"/>
+          </a:p>
+        </p:txBody>
+      </p:sp>
+      <p:sp>
+        <p:nvSpPr>
+          <p:cNvPr id="3" name="Content Placeholder 2"/>
+          <p:cNvSpPr>
+            <a:spLocks noGrp="1"/>
+          </p:cNvSpPr>
+          <p:nvPr>
+            <p:ph idx="1"/>
+          </p:nvPr>
+        </p:nvSpPr>
+        <p:spPr/>
+        <p:txBody>
+          <a:bodyPr>
+            <a:normAutofit/>
+          </a:bodyPr>
+          <a:lstStyle/>
+          <a:p>
+            <a:pPr marL="0" indent="0">
+              <a:buNone/>
+            </a:pPr>
+            <a:r>
+              <a:rPr lang="id-ID" sz="1600" dirty="0"/>
+              <a:t>Perusahaan yang kami dirikan merupakan suatu perusahaan berbasis IT yang memberikan jasa layanan sewa router berbasis cloud. Tidak hanya itu, kami juga berupaya memaksimalkan produktivitas pelanggan kami dengan menyediakan layanan cloud hosting ataupun dedicated server yang dapat digabungkan dengan produk RouterMaya kami.</a:t>
+            </a:r>
+          </a:p>
+          <a:p>
+            <a:pPr marL="0" indent="0">
+              <a:buNone/>
+            </a:pPr>
+            <a:r>
+              <a:rPr lang="id-ID" sz="1600" dirty="0"/>
+              <a:t>Perusahaan kami sudah berdiri hampir lima tahun dan tetap dapat berdiri kokoh hingga saat ini berkat sejumlah kenangan yang pahit dan manis di masa lampau. Perusahaan kami dulunya bernama DeHostGeek, merupakan cikal bakal lahirnya perusahaan RouterMaya ini. Perusahaan ini belum mengadopsi layanan virtual router pada mulanya, tetapi hanya fokus pada bisnis conventional hosting dan virtual private server. Saat itu kita juga sedang mengalami kekurangan peminat akibat munculnya pesaing-pesaing baru yang berani memberikan harga lebih murah ketimbang harga rata-rata di pasar. Oleh sebab itu, kami para founder dan para manager perusahaan melakukan meeting tertutup untuk membahas masa depan perusahaan ini. Akhirnya, kami memutuskan untuk tetap melanjutkan mimpi perusahaan ini dengan mengubah sedikit pandangan perusahaan, yakni yang sebelumnya lebih fokus dengan conventional hosting dan VPS, sekarang menjadi lebih fokus terhadap teknologi masa depan, cloud technology. Dan sejak itulah layanan RouterMaya kami pun berhasil direalisasikan.</a:t>
+            </a:r>
+          </a:p>
+          <a:p>
+            <a:pPr marL="0" indent="0">
+              <a:buNone/>
+            </a:pPr>
+            <a:endParaRPr lang="id-ID" sz="1400" dirty="0"/>
+          </a:p>
+        </p:txBody>
+      </p:sp>
+    </p:spTree>
+    <p:extLst>
+      <p:ext uri="{BB962C8B-B14F-4D97-AF65-F5344CB8AC3E}">
+        <p14:creationId xmlns:p14="http://schemas.microsoft.com/office/powerpoint/2010/main" val="1693943791"/>
+      </p:ext>
+    </p:extLst>
+  </p:cSld>
+  <p:clrMapOvr>
+    <a:masterClrMapping/>
+  </p:clrMapOvr>
+  <mc:AlternateContent xmlns:mc="http://schemas.openxmlformats.org/markup-compatibility/2006" xmlns:p14="http://schemas.microsoft.com/office/powerpoint/2010/main">
+    <mc:Choice Requires="p14">
+      <p:transition spd="med" p14:dur="700">
+        <p:fade/>
+      </p:transition>
+    </mc:Choice>
+    <mc:Fallback xmlns="">
+      <p:transition spd="med">
+        <p:fade/>
+      </p:transition>
+    </mc:Fallback>
+  </mc:AlternateContent>
+</p:sld>
+</file>
+
+<file path=ppt/slides/slide5.xml><?xml version="1.0" encoding="utf-8"?>
+<p:sld xmlns:a="http://schemas.openxmlformats.org/drawingml/2006/main" xmlns:r="http://schemas.openxmlformats.org/officeDocument/2006/relationships" xmlns:p="http://schemas.openxmlformats.org/presentationml/2006/main">
+  <p:cSld>
+    <p:spTree>
+      <p:nvGrpSpPr>
+        <p:cNvPr id="1" name=""/>
+        <p:cNvGrpSpPr/>
+        <p:nvPr/>
+      </p:nvGrpSpPr>
+      <p:grpSpPr>
+        <a:xfrm>
+          <a:off x="0" y="0"/>
+          <a:ext cx="0" cy="0"/>
+          <a:chOff x="0" y="0"/>
+          <a:chExt cx="0" cy="0"/>
+        </a:xfrm>
+      </p:grpSpPr>
+      <p:sp>
+        <p:nvSpPr>
+          <p:cNvPr id="2" name="Title 1"/>
+          <p:cNvSpPr>
+            <a:spLocks noGrp="1"/>
+          </p:cNvSpPr>
+          <p:nvPr>
+            <p:ph type="title"/>
+          </p:nvPr>
+        </p:nvSpPr>
+        <p:spPr/>
+        <p:txBody>
+          <a:bodyPr/>
+          <a:lstStyle/>
+          <a:p>
+            <a:r>
+              <a:rPr lang="id-ID" dirty="0" smtClean="0"/>
+              <a:t>Struktur Perusahaan - Team</a:t>
+            </a:r>
+            <a:endParaRPr lang="id-ID" dirty="0"/>
+          </a:p>
+        </p:txBody>
+      </p:sp>
+      <p:pic>
+        <p:nvPicPr>
+          <p:cNvPr id="4" name="Content Placeholder 3"/>
+          <p:cNvPicPr>
+            <a:picLocks noGrp="1" noChangeAspect="1"/>
+          </p:cNvPicPr>
+          <p:nvPr>
+            <p:ph idx="1"/>
+          </p:nvPr>
+        </p:nvPicPr>
+        <p:blipFill>
+          <a:blip r:embed="rId2">
+            <a:extLst>
+              <a:ext uri="{28A0092B-C50C-407E-A947-70E740481C1C}">
+                <a14:useLocalDpi xmlns:a14="http://schemas.microsoft.com/office/drawing/2010/main" val="0"/>
+              </a:ext>
+            </a:extLst>
+          </a:blip>
+          <a:stretch>
+            <a:fillRect/>
+          </a:stretch>
+        </p:blipFill>
+        <p:spPr>
+          <a:xfrm>
+            <a:off x="7056808" y="1521401"/>
+            <a:ext cx="1080000" cy="1213608"/>
+          </a:xfrm>
+          <a:gradFill flip="none" rotWithShape="1">
+            <a:gsLst>
+              <a:gs pos="58000">
+                <a:srgbClr val="075791"/>
+              </a:gs>
+              <a:gs pos="0">
+                <a:srgbClr val="022657"/>
+              </a:gs>
+              <a:gs pos="100000">
+                <a:srgbClr val="0DC2F1"/>
+              </a:gs>
+            </a:gsLst>
+            <a:lin ang="16200000" scaled="1"/>
+            <a:tileRect/>
+          </a:gradFill>
+          <a:effectLst>
+            <a:softEdge rad="0"/>
+          </a:effectLst>
+        </p:spPr>
+      </p:pic>
+      <p:sp>
+        <p:nvSpPr>
+          <p:cNvPr id="5" name="Up Ribbon 4"/>
+          <p:cNvSpPr/>
+          <p:nvPr/>
+        </p:nvSpPr>
+        <p:spPr>
+          <a:xfrm>
+            <a:off x="6287498" y="2577992"/>
+            <a:ext cx="2607129" cy="489528"/>
+          </a:xfrm>
+          <a:prstGeom prst="ribbon2">
+            <a:avLst/>
+          </a:prstGeom>
+          <a:gradFill flip="none" rotWithShape="1">
+            <a:gsLst>
+              <a:gs pos="58000">
+                <a:srgbClr val="075791"/>
+              </a:gs>
+              <a:gs pos="0">
+                <a:srgbClr val="022657"/>
+              </a:gs>
+              <a:gs pos="100000">
+                <a:srgbClr val="0DC2F1"/>
+              </a:gs>
+            </a:gsLst>
+            <a:lin ang="5400000" scaled="1"/>
+            <a:tileRect/>
+          </a:gradFill>
+        </p:spPr>
+        <p:style>
+          <a:lnRef idx="2">
+            <a:schemeClr val="accent1">
+              <a:shade val="50000"/>
+            </a:schemeClr>
+          </a:lnRef>
+          <a:fillRef idx="1">
+            <a:schemeClr val="accent1"/>
+          </a:fillRef>
+          <a:effectRef idx="0">
+            <a:schemeClr val="accent1"/>
+          </a:effectRef>
+          <a:fontRef idx="minor">
+            <a:schemeClr val="lt1"/>
+          </a:fontRef>
+        </p:style>
+        <p:txBody>
+          <a:bodyPr rtlCol="0" anchor="ctr"/>
+          <a:lstStyle/>
+          <a:p>
+            <a:pPr algn="ctr"/>
+            <a:r>
+              <a:rPr lang="id-ID" sz="1400" b="1" dirty="0" smtClean="0">
+                <a:solidFill>
+                  <a:schemeClr val="bg1"/>
+                </a:solidFill>
+              </a:rPr>
+              <a:t>CEO</a:t>
+            </a:r>
+            <a:endParaRPr lang="id-ID" sz="1400" b="1" dirty="0">
+              <a:solidFill>
+                <a:schemeClr val="bg1"/>
+              </a:solidFill>
+            </a:endParaRPr>
+          </a:p>
+        </p:txBody>
+      </p:sp>
+      <p:pic>
+        <p:nvPicPr>
+          <p:cNvPr id="6" name="Content Placeholder 3"/>
+          <p:cNvPicPr>
+            <a:picLocks noChangeAspect="1"/>
+          </p:cNvPicPr>
+          <p:nvPr/>
+        </p:nvPicPr>
+        <p:blipFill>
+          <a:blip r:embed="rId3">
+            <a:extLst>
+              <a:ext uri="{28A0092B-C50C-407E-A947-70E740481C1C}">
+                <a14:useLocalDpi xmlns:a14="http://schemas.microsoft.com/office/drawing/2010/main" val="0"/>
+              </a:ext>
+            </a:extLst>
+          </a:blip>
+          <a:stretch>
+            <a:fillRect/>
+          </a:stretch>
+        </p:blipFill>
+        <p:spPr>
+          <a:xfrm>
+            <a:off x="3680580" y="1521401"/>
+            <a:ext cx="1079999" cy="1213608"/>
+          </a:xfrm>
+          <a:prstGeom prst="rect">
+            <a:avLst/>
+          </a:prstGeom>
+          <a:gradFill flip="none" rotWithShape="1">
+            <a:gsLst>
+              <a:gs pos="58000">
+                <a:srgbClr val="075791"/>
+              </a:gs>
+              <a:gs pos="0">
+                <a:srgbClr val="022657"/>
+              </a:gs>
+              <a:gs pos="100000">
+                <a:srgbClr val="0DC2F1"/>
+              </a:gs>
+            </a:gsLst>
+            <a:lin ang="16200000" scaled="1"/>
+            <a:tileRect/>
+          </a:gradFill>
+          <a:effectLst>
+            <a:softEdge rad="0"/>
+          </a:effectLst>
+        </p:spPr>
+      </p:pic>
+      <p:sp>
+        <p:nvSpPr>
+          <p:cNvPr id="7" name="Up Ribbon 6"/>
+          <p:cNvSpPr/>
+          <p:nvPr/>
+        </p:nvSpPr>
+        <p:spPr>
+          <a:xfrm>
+            <a:off x="2911270" y="2577992"/>
+            <a:ext cx="2607129" cy="489528"/>
+          </a:xfrm>
+          <a:prstGeom prst="ribbon2">
+            <a:avLst/>
+          </a:prstGeom>
+          <a:gradFill flip="none" rotWithShape="1">
+            <a:gsLst>
+              <a:gs pos="58000">
+                <a:srgbClr val="075791"/>
+              </a:gs>
+              <a:gs pos="0">
+                <a:srgbClr val="022657"/>
+              </a:gs>
+              <a:gs pos="100000">
+                <a:srgbClr val="0DC2F1"/>
+              </a:gs>
+            </a:gsLst>
+            <a:lin ang="5400000" scaled="1"/>
+            <a:tileRect/>
+          </a:gradFill>
+        </p:spPr>
+        <p:style>
+          <a:lnRef idx="2">
+            <a:schemeClr val="accent1">
+              <a:shade val="50000"/>
+            </a:schemeClr>
+          </a:lnRef>
+          <a:fillRef idx="1">
+            <a:schemeClr val="accent1"/>
+          </a:fillRef>
+          <a:effectRef idx="0">
+            <a:schemeClr val="accent1"/>
+          </a:effectRef>
+          <a:fontRef idx="minor">
+            <a:schemeClr val="lt1"/>
+          </a:fontRef>
+        </p:style>
+        <p:txBody>
+          <a:bodyPr rtlCol="0" anchor="ctr"/>
+          <a:lstStyle/>
+          <a:p>
+            <a:pPr algn="ctr"/>
+            <a:r>
+              <a:rPr lang="id-ID" sz="1400" b="1" dirty="0" smtClean="0">
+                <a:solidFill>
+                  <a:schemeClr val="bg1"/>
+                </a:solidFill>
+              </a:rPr>
+              <a:t>CTO</a:t>
+            </a:r>
+            <a:endParaRPr lang="id-ID" sz="1400" b="1" dirty="0">
+              <a:solidFill>
+                <a:schemeClr val="bg1"/>
+              </a:solidFill>
+            </a:endParaRPr>
+          </a:p>
+        </p:txBody>
+      </p:sp>
+      <p:pic>
+        <p:nvPicPr>
+          <p:cNvPr id="8" name="Content Placeholder 3"/>
+          <p:cNvPicPr>
+            <a:picLocks noChangeAspect="1"/>
+          </p:cNvPicPr>
+          <p:nvPr/>
+        </p:nvPicPr>
+        <p:blipFill>
+          <a:blip r:embed="rId4">
+            <a:extLst>
+              <a:ext uri="{28A0092B-C50C-407E-A947-70E740481C1C}">
+                <a14:useLocalDpi xmlns:a14="http://schemas.microsoft.com/office/drawing/2010/main" val="0"/>
+              </a:ext>
+            </a:extLst>
+          </a:blip>
+          <a:stretch>
+            <a:fillRect/>
+          </a:stretch>
+        </p:blipFill>
+        <p:spPr>
+          <a:xfrm>
+            <a:off x="1191708" y="4017116"/>
+            <a:ext cx="1080000" cy="1191340"/>
+          </a:xfrm>
+          <a:prstGeom prst="rect">
+            <a:avLst/>
+          </a:prstGeom>
+          <a:gradFill flip="none" rotWithShape="1">
+            <a:gsLst>
+              <a:gs pos="58000">
+                <a:srgbClr val="075791"/>
+              </a:gs>
+              <a:gs pos="0">
+                <a:srgbClr val="022657"/>
+              </a:gs>
+              <a:gs pos="100000">
+                <a:srgbClr val="0DC2F1"/>
+              </a:gs>
+            </a:gsLst>
+            <a:lin ang="16200000" scaled="1"/>
+            <a:tileRect/>
+          </a:gradFill>
+          <a:effectLst>
+            <a:softEdge rad="0"/>
+          </a:effectLst>
+        </p:spPr>
+      </p:pic>
+      <p:sp>
+        <p:nvSpPr>
+          <p:cNvPr id="9" name="Up Ribbon 8"/>
+          <p:cNvSpPr/>
+          <p:nvPr/>
+        </p:nvSpPr>
+        <p:spPr>
+          <a:xfrm>
+            <a:off x="422398" y="5062573"/>
+            <a:ext cx="2607129" cy="489528"/>
+          </a:xfrm>
+          <a:prstGeom prst="ribbon2">
+            <a:avLst/>
+          </a:prstGeom>
+          <a:gradFill flip="none" rotWithShape="1">
+            <a:gsLst>
+              <a:gs pos="58000">
+                <a:srgbClr val="075791"/>
+              </a:gs>
+              <a:gs pos="0">
+                <a:srgbClr val="022657"/>
+              </a:gs>
+              <a:gs pos="100000">
+                <a:srgbClr val="0DC2F1"/>
+              </a:gs>
+            </a:gsLst>
+            <a:lin ang="5400000" scaled="1"/>
+            <a:tileRect/>
+          </a:gradFill>
+        </p:spPr>
+        <p:style>
+          <a:lnRef idx="2">
+            <a:schemeClr val="accent1">
+              <a:shade val="50000"/>
+            </a:schemeClr>
+          </a:lnRef>
+          <a:fillRef idx="1">
+            <a:schemeClr val="accent1"/>
+          </a:fillRef>
+          <a:effectRef idx="0">
+            <a:schemeClr val="accent1"/>
+          </a:effectRef>
+          <a:fontRef idx="minor">
+            <a:schemeClr val="lt1"/>
+          </a:fontRef>
+        </p:style>
+        <p:txBody>
+          <a:bodyPr rtlCol="0" anchor="ctr"/>
+          <a:lstStyle/>
+          <a:p>
+            <a:pPr algn="ctr"/>
+            <a:r>
+              <a:rPr lang="id-ID" sz="1400" b="1" dirty="0" smtClean="0">
+                <a:solidFill>
+                  <a:schemeClr val="bg1"/>
+                </a:solidFill>
+              </a:rPr>
+              <a:t>CFO</a:t>
+            </a:r>
+            <a:endParaRPr lang="id-ID" sz="1400" b="1" dirty="0">
+              <a:solidFill>
+                <a:schemeClr val="bg1"/>
+              </a:solidFill>
+            </a:endParaRPr>
+          </a:p>
+        </p:txBody>
+      </p:sp>
+      <p:pic>
+        <p:nvPicPr>
+          <p:cNvPr id="10" name="Content Placeholder 3"/>
+          <p:cNvPicPr>
+            <a:picLocks noChangeAspect="1"/>
+          </p:cNvPicPr>
+          <p:nvPr/>
+        </p:nvPicPr>
+        <p:blipFill>
+          <a:blip r:embed="rId5">
+            <a:extLst>
+              <a:ext uri="{28A0092B-C50C-407E-A947-70E740481C1C}">
+                <a14:useLocalDpi xmlns:a14="http://schemas.microsoft.com/office/drawing/2010/main" val="0"/>
+              </a:ext>
+            </a:extLst>
+          </a:blip>
+          <a:stretch>
+            <a:fillRect/>
+          </a:stretch>
+        </p:blipFill>
+        <p:spPr>
+          <a:xfrm>
+            <a:off x="5421958" y="4036600"/>
+            <a:ext cx="1080000" cy="1174639"/>
+          </a:xfrm>
+          <a:prstGeom prst="rect">
+            <a:avLst/>
+          </a:prstGeom>
+          <a:gradFill flip="none" rotWithShape="1">
+            <a:gsLst>
+              <a:gs pos="58000">
+                <a:srgbClr val="075791"/>
+              </a:gs>
+              <a:gs pos="0">
+                <a:srgbClr val="022657"/>
+              </a:gs>
+              <a:gs pos="100000">
+                <a:srgbClr val="0DC2F1"/>
+              </a:gs>
+            </a:gsLst>
+            <a:lin ang="16200000" scaled="1"/>
+            <a:tileRect/>
+          </a:gradFill>
+          <a:effectLst>
+            <a:softEdge rad="0"/>
+          </a:effectLst>
+        </p:spPr>
+      </p:pic>
+      <p:sp>
+        <p:nvSpPr>
+          <p:cNvPr id="11" name="Up Ribbon 10"/>
+          <p:cNvSpPr/>
+          <p:nvPr/>
+        </p:nvSpPr>
+        <p:spPr>
+          <a:xfrm>
+            <a:off x="4652648" y="5073707"/>
+            <a:ext cx="2607129" cy="489528"/>
+          </a:xfrm>
+          <a:prstGeom prst="ribbon2">
+            <a:avLst/>
+          </a:prstGeom>
+          <a:gradFill flip="none" rotWithShape="1">
+            <a:gsLst>
+              <a:gs pos="58000">
+                <a:srgbClr val="075791"/>
+              </a:gs>
+              <a:gs pos="0">
+                <a:srgbClr val="022657"/>
+              </a:gs>
+              <a:gs pos="100000">
+                <a:srgbClr val="0DC2F1"/>
+              </a:gs>
+            </a:gsLst>
+            <a:lin ang="5400000" scaled="1"/>
+            <a:tileRect/>
+          </a:gradFill>
+        </p:spPr>
+        <p:style>
+          <a:lnRef idx="2">
+            <a:schemeClr val="accent1">
+              <a:shade val="50000"/>
+            </a:schemeClr>
+          </a:lnRef>
+          <a:fillRef idx="1">
+            <a:schemeClr val="accent1"/>
+          </a:fillRef>
+          <a:effectRef idx="0">
+            <a:schemeClr val="accent1"/>
+          </a:effectRef>
+          <a:fontRef idx="minor">
+            <a:schemeClr val="lt1"/>
+          </a:fontRef>
+        </p:style>
+        <p:txBody>
+          <a:bodyPr rtlCol="0" anchor="ctr"/>
+          <a:lstStyle/>
+          <a:p>
+            <a:pPr algn="ctr"/>
+            <a:r>
+              <a:rPr lang="id-ID" sz="1400" b="1" dirty="0" smtClean="0">
+                <a:solidFill>
+                  <a:schemeClr val="bg1"/>
+                </a:solidFill>
+              </a:rPr>
+              <a:t>Operational</a:t>
+            </a:r>
+            <a:endParaRPr lang="id-ID" sz="1400" b="1" dirty="0">
+              <a:solidFill>
+                <a:schemeClr val="bg1"/>
+              </a:solidFill>
+            </a:endParaRPr>
+          </a:p>
+        </p:txBody>
+      </p:sp>
+      <p:pic>
+        <p:nvPicPr>
+          <p:cNvPr id="12" name="Content Placeholder 3"/>
+          <p:cNvPicPr>
+            <a:picLocks noChangeAspect="1"/>
+          </p:cNvPicPr>
+          <p:nvPr/>
+        </p:nvPicPr>
+        <p:blipFill>
+          <a:blip r:embed="rId6">
+            <a:extLst>
+              <a:ext uri="{28A0092B-C50C-407E-A947-70E740481C1C}">
+                <a14:useLocalDpi xmlns:a14="http://schemas.microsoft.com/office/drawing/2010/main" val="0"/>
+              </a:ext>
+            </a:extLst>
+          </a:blip>
+          <a:stretch>
+            <a:fillRect/>
+          </a:stretch>
+        </p:blipFill>
+        <p:spPr>
+          <a:xfrm>
+            <a:off x="9745660" y="4017116"/>
+            <a:ext cx="1079999" cy="1213608"/>
+          </a:xfrm>
+          <a:prstGeom prst="rect">
+            <a:avLst/>
+          </a:prstGeom>
+          <a:gradFill flip="none" rotWithShape="1">
+            <a:gsLst>
+              <a:gs pos="58000">
+                <a:srgbClr val="075791"/>
+              </a:gs>
+              <a:gs pos="0">
+                <a:srgbClr val="022657"/>
+              </a:gs>
+              <a:gs pos="100000">
+                <a:srgbClr val="0DC2F1"/>
+              </a:gs>
+            </a:gsLst>
+            <a:lin ang="16200000" scaled="1"/>
+            <a:tileRect/>
+          </a:gradFill>
+          <a:effectLst>
+            <a:softEdge rad="0"/>
+          </a:effectLst>
+        </p:spPr>
+      </p:pic>
+      <p:sp>
+        <p:nvSpPr>
+          <p:cNvPr id="13" name="Up Ribbon 12"/>
+          <p:cNvSpPr/>
+          <p:nvPr/>
+        </p:nvSpPr>
+        <p:spPr>
+          <a:xfrm>
+            <a:off x="8976350" y="5073707"/>
+            <a:ext cx="2607129" cy="489528"/>
+          </a:xfrm>
+          <a:prstGeom prst="ribbon2">
+            <a:avLst/>
+          </a:prstGeom>
+          <a:gradFill flip="none" rotWithShape="1">
+            <a:gsLst>
+              <a:gs pos="58000">
+                <a:srgbClr val="075791"/>
+              </a:gs>
+              <a:gs pos="0">
+                <a:srgbClr val="022657"/>
+              </a:gs>
+              <a:gs pos="100000">
+                <a:srgbClr val="0DC2F1"/>
+              </a:gs>
+            </a:gsLst>
+            <a:lin ang="5400000" scaled="1"/>
+            <a:tileRect/>
+          </a:gradFill>
+        </p:spPr>
+        <p:style>
+          <a:lnRef idx="2">
+            <a:schemeClr val="accent1">
+              <a:shade val="50000"/>
+            </a:schemeClr>
+          </a:lnRef>
+          <a:fillRef idx="1">
+            <a:schemeClr val="accent1"/>
+          </a:fillRef>
+          <a:effectRef idx="0">
+            <a:schemeClr val="accent1"/>
+          </a:effectRef>
+          <a:fontRef idx="minor">
+            <a:schemeClr val="lt1"/>
+          </a:fontRef>
+        </p:style>
+        <p:txBody>
+          <a:bodyPr rtlCol="0" anchor="ctr"/>
+          <a:lstStyle/>
+          <a:p>
+            <a:pPr algn="ctr"/>
+            <a:r>
+              <a:rPr lang="id-ID" sz="1400" b="1" dirty="0" smtClean="0">
+                <a:solidFill>
+                  <a:schemeClr val="bg1"/>
+                </a:solidFill>
+              </a:rPr>
+              <a:t>Marketting</a:t>
+            </a:r>
+            <a:endParaRPr lang="id-ID" sz="1400" b="1" dirty="0">
+              <a:solidFill>
+                <a:schemeClr val="bg1"/>
+              </a:solidFill>
+            </a:endParaRPr>
+          </a:p>
+        </p:txBody>
+      </p:sp>
+    </p:spTree>
+    <p:extLst>
+      <p:ext uri="{BB962C8B-B14F-4D97-AF65-F5344CB8AC3E}">
+        <p14:creationId xmlns:p14="http://schemas.microsoft.com/office/powerpoint/2010/main" val="3614104719"/>
+      </p:ext>
+    </p:extLst>
+  </p:cSld>
+  <p:clrMapOvr>
+    <a:masterClrMapping/>
+  </p:clrMapOvr>
+  <mc:AlternateContent xmlns:mc="http://schemas.openxmlformats.org/markup-compatibility/2006" xmlns:p14="http://schemas.microsoft.com/office/powerpoint/2010/main">
+    <mc:Choice Requires="p14">
+      <p:transition spd="med" p14:dur="700">
+        <p:fade/>
+      </p:transition>
+    </mc:Choice>
+    <mc:Fallback xmlns="">
+      <p:transition spd="med">
+        <p:fade/>
+      </p:transition>
+    </mc:Fallback>
+  </mc:AlternateContent>
+</p:sld>
+</file>
+
+<file path=ppt/slides/slide6.xml><?xml version="1.0" encoding="utf-8"?>
+<p:sld xmlns:a="http://schemas.openxmlformats.org/drawingml/2006/main" xmlns:r="http://schemas.openxmlformats.org/officeDocument/2006/relationships" xmlns:p="http://schemas.openxmlformats.org/presentationml/2006/main">
+  <p:cSld>
+    <p:spTree>
+      <p:nvGrpSpPr>
+        <p:cNvPr id="1" name=""/>
+        <p:cNvGrpSpPr/>
+        <p:nvPr/>
+      </p:nvGrpSpPr>
+      <p:grpSpPr>
+        <a:xfrm>
+          <a:off x="0" y="0"/>
+          <a:ext cx="0" cy="0"/>
+          <a:chOff x="0" y="0"/>
+          <a:chExt cx="0" cy="0"/>
+        </a:xfrm>
+      </p:grpSpPr>
+      <p:sp>
+        <p:nvSpPr>
+          <p:cNvPr id="2" name="Title 1"/>
+          <p:cNvSpPr>
+            <a:spLocks noGrp="1"/>
+          </p:cNvSpPr>
+          <p:nvPr>
+            <p:ph type="title"/>
+          </p:nvPr>
+        </p:nvSpPr>
+        <p:spPr/>
+        <p:txBody>
+          <a:bodyPr/>
+          <a:lstStyle/>
+          <a:p>
+            <a:r>
+              <a:rPr lang="id-ID" dirty="0" smtClean="0"/>
+              <a:t>Struktur Perusahaan – Team Profile</a:t>
+            </a:r>
+            <a:endParaRPr lang="id-ID" dirty="0"/>
+          </a:p>
+        </p:txBody>
+      </p:sp>
+      <p:graphicFrame>
+        <p:nvGraphicFramePr>
+          <p:cNvPr id="8" name="Table 7"/>
+          <p:cNvGraphicFramePr>
+            <a:graphicFrameLocks noGrp="1"/>
+          </p:cNvGraphicFramePr>
+          <p:nvPr>
+            <p:extLst>
+              <p:ext uri="{D42A27DB-BD31-4B8C-83A1-F6EECF244321}">
+                <p14:modId xmlns:p14="http://schemas.microsoft.com/office/powerpoint/2010/main" val="139938458"/>
+              </p:ext>
+            </p:extLst>
+          </p:nvPr>
+        </p:nvGraphicFramePr>
+        <p:xfrm>
+          <a:off x="83127" y="1544041"/>
+          <a:ext cx="3906982" cy="5207741"/>
+        </p:xfrm>
+        <a:graphic>
+          <a:graphicData uri="http://schemas.openxmlformats.org/drawingml/2006/table">
+            <a:tbl>
+              <a:tblPr firstRow="1" bandRow="1">
+                <a:tableStyleId>{5C22544A-7EE6-4342-B048-85BDC9FD1C3A}</a:tableStyleId>
+              </a:tblPr>
+              <a:tblGrid>
+                <a:gridCol w="3906982">
+                  <a:extLst>
+                    <a:ext uri="{9D8B030D-6E8A-4147-A177-3AD203B41FA5}">
+                      <a16:colId xmlns:a16="http://schemas.microsoft.com/office/drawing/2014/main" val="2057432390"/>
+                    </a:ext>
+                  </a:extLst>
+                </a:gridCol>
+              </a:tblGrid>
+              <a:tr h="1861855">
+                <a:tc>
+                  <a:txBody>
+                    <a:bodyPr/>
+                    <a:lstStyle/>
+                    <a:p>
+                      <a:endParaRPr lang="id-ID" dirty="0"/>
+                    </a:p>
+                  </a:txBody>
+                  <a:tcPr>
+                    <a:gradFill flip="none" rotWithShape="1">
+                      <a:gsLst>
+                        <a:gs pos="58000">
+                          <a:srgbClr val="075791"/>
+                        </a:gs>
+                        <a:gs pos="0">
+                          <a:srgbClr val="022657"/>
+                        </a:gs>
+                        <a:gs pos="100000">
+                          <a:srgbClr val="0DC2F1"/>
+                        </a:gs>
+                      </a:gsLst>
+                      <a:lin ang="5400000" scaled="1"/>
+                      <a:tileRect/>
+                    </a:gradFill>
+                  </a:tcPr>
+                </a:tc>
+                <a:extLst>
+                  <a:ext uri="{0D108BD9-81ED-4DB2-BD59-A6C34878D82A}">
+                    <a16:rowId xmlns:a16="http://schemas.microsoft.com/office/drawing/2014/main" val="3202738208"/>
+                  </a:ext>
+                </a:extLst>
+              </a:tr>
+              <a:tr h="3345886">
+                <a:tc>
+                  <a:txBody>
+                    <a:bodyPr/>
+                    <a:lstStyle/>
+                    <a:p>
+                      <a:pPr marL="0" marR="0" lvl="0" indent="0" algn="l" defTabSz="685800" rtl="0" eaLnBrk="1" fontAlgn="auto" latinLnBrk="0" hangingPunct="1">
+                        <a:lnSpc>
+                          <a:spcPct val="100000"/>
+                        </a:lnSpc>
+                        <a:spcBef>
+                          <a:spcPts val="0"/>
+                        </a:spcBef>
+                        <a:spcAft>
+                          <a:spcPts val="0"/>
+                        </a:spcAft>
+                        <a:buClrTx/>
+                        <a:buSzTx/>
+                        <a:buFontTx/>
+                        <a:buNone/>
+                        <a:tabLst/>
+                        <a:defRPr/>
+                      </a:pPr>
+                      <a:r>
+                        <a:rPr lang="id-ID" sz="1600" b="1" kern="1200" dirty="0" smtClean="0">
+                          <a:solidFill>
+                            <a:schemeClr val="dk1"/>
+                          </a:solidFill>
+                          <a:effectLst/>
+                          <a:latin typeface="+mn-lt"/>
+                          <a:ea typeface="+mn-ea"/>
+                          <a:cs typeface="+mn-cs"/>
+                        </a:rPr>
+                        <a:t>Jeffry Angtoni</a:t>
+                      </a:r>
+                      <a:r>
+                        <a:rPr lang="id-ID" sz="1600" kern="1200" dirty="0" smtClean="0">
+                          <a:solidFill>
+                            <a:schemeClr val="dk1"/>
+                          </a:solidFill>
+                          <a:effectLst/>
+                          <a:latin typeface="+mn-lt"/>
+                          <a:ea typeface="+mn-ea"/>
+                          <a:cs typeface="+mn-cs"/>
+                        </a:rPr>
+                        <a:t>, sebagai </a:t>
+                      </a:r>
+                      <a:r>
+                        <a:rPr lang="id-ID" sz="1600" i="1" kern="1200" dirty="0" smtClean="0">
+                          <a:solidFill>
+                            <a:schemeClr val="dk1"/>
+                          </a:solidFill>
+                          <a:effectLst/>
+                          <a:latin typeface="+mn-lt"/>
+                          <a:ea typeface="+mn-ea"/>
+                          <a:cs typeface="+mn-cs"/>
+                        </a:rPr>
+                        <a:t>technology researcher</a:t>
+                      </a:r>
+                      <a:r>
+                        <a:rPr lang="id-ID" sz="1600" kern="1200" dirty="0" smtClean="0">
+                          <a:solidFill>
+                            <a:schemeClr val="dk1"/>
+                          </a:solidFill>
+                          <a:effectLst/>
+                          <a:latin typeface="+mn-lt"/>
+                          <a:ea typeface="+mn-ea"/>
+                          <a:cs typeface="+mn-cs"/>
+                        </a:rPr>
+                        <a:t>, CTO (</a:t>
+                      </a:r>
+                      <a:r>
+                        <a:rPr lang="id-ID" sz="1600" i="1" kern="1200" dirty="0" smtClean="0">
+                          <a:solidFill>
+                            <a:schemeClr val="dk1"/>
+                          </a:solidFill>
+                          <a:effectLst/>
+                          <a:latin typeface="+mn-lt"/>
+                          <a:ea typeface="+mn-ea"/>
+                          <a:cs typeface="+mn-cs"/>
+                        </a:rPr>
+                        <a:t>Chief Technology Officer</a:t>
+                      </a:r>
+                      <a:r>
+                        <a:rPr lang="id-ID" sz="1600" kern="1200" dirty="0" smtClean="0">
+                          <a:solidFill>
+                            <a:schemeClr val="dk1"/>
+                          </a:solidFill>
+                          <a:effectLst/>
+                          <a:latin typeface="+mn-lt"/>
+                          <a:ea typeface="+mn-ea"/>
+                          <a:cs typeface="+mn-cs"/>
+                        </a:rPr>
+                        <a:t>), dan </a:t>
+                      </a:r>
+                      <a:r>
+                        <a:rPr lang="id-ID" sz="1600" i="1" kern="1200" dirty="0" smtClean="0">
+                          <a:solidFill>
+                            <a:schemeClr val="dk1"/>
+                          </a:solidFill>
+                          <a:effectLst/>
+                          <a:latin typeface="+mn-lt"/>
+                          <a:ea typeface="+mn-ea"/>
+                          <a:cs typeface="+mn-cs"/>
+                        </a:rPr>
+                        <a:t>founder</a:t>
+                      </a:r>
+                      <a:r>
+                        <a:rPr lang="id-ID" sz="1600" kern="1200" dirty="0" smtClean="0">
+                          <a:solidFill>
+                            <a:schemeClr val="dk1"/>
+                          </a:solidFill>
+                          <a:effectLst/>
+                          <a:latin typeface="+mn-lt"/>
+                          <a:ea typeface="+mn-ea"/>
+                          <a:cs typeface="+mn-cs"/>
+                        </a:rPr>
+                        <a:t>. Merupakan seseorang yang suka</a:t>
+                      </a:r>
+                      <a:r>
+                        <a:rPr lang="id-ID" sz="1600" kern="1200" baseline="0" dirty="0" smtClean="0">
+                          <a:solidFill>
+                            <a:schemeClr val="dk1"/>
+                          </a:solidFill>
+                          <a:effectLst/>
+                          <a:latin typeface="+mn-lt"/>
+                          <a:ea typeface="+mn-ea"/>
+                          <a:cs typeface="+mn-cs"/>
+                        </a:rPr>
+                        <a:t> berbagi pengetahuan, suka mencoba hal-hal baru, dan pantang menyerah. </a:t>
+                      </a:r>
+                      <a:r>
+                        <a:rPr lang="id-ID" sz="1600" kern="1200" dirty="0" smtClean="0">
+                          <a:solidFill>
+                            <a:schemeClr val="dk1"/>
+                          </a:solidFill>
+                          <a:effectLst/>
+                          <a:latin typeface="+mn-lt"/>
+                          <a:ea typeface="+mn-ea"/>
+                          <a:cs typeface="+mn-cs"/>
+                        </a:rPr>
+                        <a:t>Berkomitmen untuk mengembangkan lebih lanjut teknologi cloud dan mencari solusi yang cepat dan tepat dalam melakukan implementasi teknologi cloud ke dalam sistem produksi.</a:t>
+                      </a:r>
+                    </a:p>
+                    <a:p>
+                      <a:endParaRPr lang="id-ID" dirty="0"/>
+                    </a:p>
+                  </a:txBody>
+                  <a:tcPr/>
+                </a:tc>
+                <a:extLst>
+                  <a:ext uri="{0D108BD9-81ED-4DB2-BD59-A6C34878D82A}">
+                    <a16:rowId xmlns:a16="http://schemas.microsoft.com/office/drawing/2014/main" val="3915779658"/>
+                  </a:ext>
+                </a:extLst>
+              </a:tr>
+            </a:tbl>
+          </a:graphicData>
+        </a:graphic>
+      </p:graphicFrame>
+      <p:pic>
+        <p:nvPicPr>
+          <p:cNvPr id="7" name="Content Placeholder 3"/>
+          <p:cNvPicPr>
+            <a:picLocks noChangeAspect="1"/>
+          </p:cNvPicPr>
+          <p:nvPr/>
+        </p:nvPicPr>
+        <p:blipFill>
+          <a:blip r:embed="rId2">
+            <a:extLst>
+              <a:ext uri="{28A0092B-C50C-407E-A947-70E740481C1C}">
+                <a14:useLocalDpi xmlns:a14="http://schemas.microsoft.com/office/drawing/2010/main" val="0"/>
+              </a:ext>
+            </a:extLst>
+          </a:blip>
+          <a:stretch>
+            <a:fillRect/>
+          </a:stretch>
+        </p:blipFill>
+        <p:spPr>
+          <a:xfrm>
+            <a:off x="1570509" y="1863146"/>
+            <a:ext cx="1079999" cy="1213608"/>
+          </a:xfrm>
+          <a:prstGeom prst="rect">
+            <a:avLst/>
+          </a:prstGeom>
+          <a:gradFill flip="none" rotWithShape="1">
+            <a:gsLst>
+              <a:gs pos="58000">
+                <a:srgbClr val="075791"/>
+              </a:gs>
+              <a:gs pos="0">
+                <a:srgbClr val="022657"/>
+              </a:gs>
+              <a:gs pos="100000">
+                <a:srgbClr val="0DC2F1"/>
+              </a:gs>
+            </a:gsLst>
+            <a:lin ang="16200000" scaled="1"/>
+            <a:tileRect/>
+          </a:gradFill>
+          <a:effectLst>
+            <a:softEdge rad="0"/>
+          </a:effectLst>
+        </p:spPr>
+      </p:pic>
+      <p:graphicFrame>
+        <p:nvGraphicFramePr>
+          <p:cNvPr id="9" name="Table 8"/>
+          <p:cNvGraphicFramePr>
+            <a:graphicFrameLocks noGrp="1"/>
+          </p:cNvGraphicFramePr>
+          <p:nvPr>
+            <p:extLst>
+              <p:ext uri="{D42A27DB-BD31-4B8C-83A1-F6EECF244321}">
+                <p14:modId xmlns:p14="http://schemas.microsoft.com/office/powerpoint/2010/main" val="793746961"/>
+              </p:ext>
+            </p:extLst>
+          </p:nvPr>
+        </p:nvGraphicFramePr>
+        <p:xfrm>
+          <a:off x="4089400" y="1544041"/>
+          <a:ext cx="3874654" cy="5207741"/>
+        </p:xfrm>
+        <a:graphic>
+          <a:graphicData uri="http://schemas.openxmlformats.org/drawingml/2006/table">
+            <a:tbl>
+              <a:tblPr firstRow="1" bandRow="1">
+                <a:tableStyleId>{5C22544A-7EE6-4342-B048-85BDC9FD1C3A}</a:tableStyleId>
+              </a:tblPr>
+              <a:tblGrid>
+                <a:gridCol w="3874654">
+                  <a:extLst>
+                    <a:ext uri="{9D8B030D-6E8A-4147-A177-3AD203B41FA5}">
+                      <a16:colId xmlns:a16="http://schemas.microsoft.com/office/drawing/2014/main" val="2057432390"/>
+                    </a:ext>
+                  </a:extLst>
+                </a:gridCol>
+              </a:tblGrid>
+              <a:tr h="1861855">
+                <a:tc>
+                  <a:txBody>
+                    <a:bodyPr/>
+                    <a:lstStyle/>
+                    <a:p>
+                      <a:endParaRPr lang="id-ID" dirty="0"/>
+                    </a:p>
+                  </a:txBody>
+                  <a:tcPr>
+                    <a:gradFill flip="none" rotWithShape="1">
+                      <a:gsLst>
+                        <a:gs pos="58000">
+                          <a:srgbClr val="075791"/>
+                        </a:gs>
+                        <a:gs pos="0">
+                          <a:srgbClr val="022657"/>
+                        </a:gs>
+                        <a:gs pos="100000">
+                          <a:srgbClr val="0DC2F1"/>
+                        </a:gs>
+                      </a:gsLst>
+                      <a:lin ang="5400000" scaled="1"/>
+                      <a:tileRect/>
+                    </a:gradFill>
+                  </a:tcPr>
+                </a:tc>
+                <a:extLst>
+                  <a:ext uri="{0D108BD9-81ED-4DB2-BD59-A6C34878D82A}">
+                    <a16:rowId xmlns:a16="http://schemas.microsoft.com/office/drawing/2014/main" val="3202738208"/>
+                  </a:ext>
+                </a:extLst>
+              </a:tr>
+              <a:tr h="3345886">
+                <a:tc>
+                  <a:txBody>
+                    <a:bodyPr/>
+                    <a:lstStyle/>
+                    <a:p>
+                      <a:pPr marL="0" marR="0" lvl="0" indent="0" algn="l" defTabSz="685800" rtl="0" eaLnBrk="1" fontAlgn="auto" latinLnBrk="0" hangingPunct="1">
+                        <a:lnSpc>
+                          <a:spcPct val="100000"/>
+                        </a:lnSpc>
+                        <a:spcBef>
+                          <a:spcPts val="0"/>
+                        </a:spcBef>
+                        <a:spcAft>
+                          <a:spcPts val="0"/>
+                        </a:spcAft>
+                        <a:buClrTx/>
+                        <a:buSzTx/>
+                        <a:buFontTx/>
+                        <a:buNone/>
+                        <a:tabLst/>
+                        <a:defRPr/>
+                      </a:pPr>
+                      <a:r>
+                        <a:rPr lang="id-ID" sz="1600" b="1" kern="1200" dirty="0" smtClean="0">
+                          <a:solidFill>
+                            <a:schemeClr val="dk1"/>
+                          </a:solidFill>
+                          <a:effectLst/>
+                          <a:latin typeface="+mn-lt"/>
+                          <a:ea typeface="+mn-ea"/>
+                          <a:cs typeface="+mn-cs"/>
+                        </a:rPr>
+                        <a:t>Ivan Theomanto, </a:t>
+                      </a:r>
+                      <a:r>
+                        <a:rPr lang="id-ID" sz="1600" b="0" kern="1200" dirty="0" smtClean="0">
+                          <a:solidFill>
+                            <a:schemeClr val="dk1"/>
+                          </a:solidFill>
+                          <a:effectLst/>
+                          <a:latin typeface="+mn-lt"/>
+                          <a:ea typeface="+mn-ea"/>
+                          <a:cs typeface="+mn-cs"/>
+                        </a:rPr>
+                        <a:t>sebagai CEO (Chief Executive Officer). Merupakan seorang pemikir dan gigih. Bertekad yang kuat untuk menyeimbangkan hidup para karyawan perusahaan. Karena hidup juga bukan selalu untuk kerja, tetapi kerja juga perlu untuk hidup.</a:t>
+                      </a:r>
+                      <a:endParaRPr lang="id-ID" b="0" dirty="0"/>
+                    </a:p>
+                  </a:txBody>
+                  <a:tcPr/>
+                </a:tc>
+                <a:extLst>
+                  <a:ext uri="{0D108BD9-81ED-4DB2-BD59-A6C34878D82A}">
+                    <a16:rowId xmlns:a16="http://schemas.microsoft.com/office/drawing/2014/main" val="3915779658"/>
+                  </a:ext>
+                </a:extLst>
+              </a:tr>
+            </a:tbl>
+          </a:graphicData>
+        </a:graphic>
+      </p:graphicFrame>
+      <p:pic>
+        <p:nvPicPr>
+          <p:cNvPr id="10" name="Content Placeholder 3"/>
+          <p:cNvPicPr>
+            <a:picLocks noChangeAspect="1"/>
+          </p:cNvPicPr>
+          <p:nvPr/>
+        </p:nvPicPr>
+        <p:blipFill>
+          <a:blip r:embed="rId3">
+            <a:extLst>
+              <a:ext uri="{28A0092B-C50C-407E-A947-70E740481C1C}">
+                <a14:useLocalDpi xmlns:a14="http://schemas.microsoft.com/office/drawing/2010/main" val="0"/>
+              </a:ext>
+            </a:extLst>
+          </a:blip>
+          <a:stretch>
+            <a:fillRect/>
+          </a:stretch>
+        </p:blipFill>
+        <p:spPr>
+          <a:xfrm>
+            <a:off x="5556000" y="1863146"/>
+            <a:ext cx="1080000" cy="1213608"/>
+          </a:xfrm>
+          <a:prstGeom prst="rect">
+            <a:avLst/>
+          </a:prstGeom>
+          <a:gradFill flip="none" rotWithShape="1">
+            <a:gsLst>
+              <a:gs pos="58000">
+                <a:srgbClr val="075791"/>
+              </a:gs>
+              <a:gs pos="0">
+                <a:srgbClr val="022657"/>
+              </a:gs>
+              <a:gs pos="100000">
+                <a:srgbClr val="0DC2F1"/>
+              </a:gs>
+            </a:gsLst>
+            <a:lin ang="16200000" scaled="1"/>
+            <a:tileRect/>
+          </a:gradFill>
+          <a:effectLst>
+            <a:softEdge rad="0"/>
+          </a:effectLst>
+        </p:spPr>
+      </p:pic>
+      <p:graphicFrame>
+        <p:nvGraphicFramePr>
+          <p:cNvPr id="11" name="Table 10"/>
+          <p:cNvGraphicFramePr>
+            <a:graphicFrameLocks noGrp="1"/>
+          </p:cNvGraphicFramePr>
+          <p:nvPr>
+            <p:extLst>
+              <p:ext uri="{D42A27DB-BD31-4B8C-83A1-F6EECF244321}">
+                <p14:modId xmlns:p14="http://schemas.microsoft.com/office/powerpoint/2010/main" val="3347527792"/>
+              </p:ext>
+            </p:extLst>
+          </p:nvPr>
+        </p:nvGraphicFramePr>
+        <p:xfrm>
+          <a:off x="8047178" y="1544041"/>
+          <a:ext cx="4054764" cy="5207741"/>
+        </p:xfrm>
+        <a:graphic>
+          <a:graphicData uri="http://schemas.openxmlformats.org/drawingml/2006/table">
+            <a:tbl>
+              <a:tblPr firstRow="1" bandRow="1">
+                <a:tableStyleId>{5C22544A-7EE6-4342-B048-85BDC9FD1C3A}</a:tableStyleId>
+              </a:tblPr>
+              <a:tblGrid>
+                <a:gridCol w="4054764">
+                  <a:extLst>
+                    <a:ext uri="{9D8B030D-6E8A-4147-A177-3AD203B41FA5}">
+                      <a16:colId xmlns:a16="http://schemas.microsoft.com/office/drawing/2014/main" val="2057432390"/>
+                    </a:ext>
+                  </a:extLst>
+                </a:gridCol>
+              </a:tblGrid>
+              <a:tr h="1861855">
+                <a:tc>
+                  <a:txBody>
+                    <a:bodyPr/>
+                    <a:lstStyle/>
+                    <a:p>
+                      <a:endParaRPr lang="id-ID" dirty="0"/>
+                    </a:p>
+                  </a:txBody>
+                  <a:tcPr>
+                    <a:gradFill flip="none" rotWithShape="1">
+                      <a:gsLst>
+                        <a:gs pos="58000">
+                          <a:srgbClr val="075791"/>
+                        </a:gs>
+                        <a:gs pos="0">
+                          <a:srgbClr val="022657"/>
+                        </a:gs>
+                        <a:gs pos="100000">
+                          <a:srgbClr val="0DC2F1"/>
+                        </a:gs>
+                      </a:gsLst>
+                      <a:lin ang="5400000" scaled="1"/>
+                      <a:tileRect/>
+                    </a:gradFill>
+                  </a:tcPr>
+                </a:tc>
+                <a:extLst>
+                  <a:ext uri="{0D108BD9-81ED-4DB2-BD59-A6C34878D82A}">
+                    <a16:rowId xmlns:a16="http://schemas.microsoft.com/office/drawing/2014/main" val="3202738208"/>
+                  </a:ext>
+                </a:extLst>
+              </a:tr>
+              <a:tr h="3345886">
+                <a:tc>
+                  <a:txBody>
+                    <a:bodyPr/>
+                    <a:lstStyle/>
+                    <a:p>
+                      <a:pPr marL="0" marR="0" lvl="0" indent="0" algn="l" defTabSz="685800" rtl="0" eaLnBrk="1" fontAlgn="auto" latinLnBrk="0" hangingPunct="1">
+                        <a:lnSpc>
+                          <a:spcPct val="100000"/>
+                        </a:lnSpc>
+                        <a:spcBef>
+                          <a:spcPts val="0"/>
+                        </a:spcBef>
+                        <a:spcAft>
+                          <a:spcPts val="0"/>
+                        </a:spcAft>
+                        <a:buClrTx/>
+                        <a:buSzTx/>
+                        <a:buFontTx/>
+                        <a:buNone/>
+                        <a:tabLst/>
+                        <a:defRPr/>
+                      </a:pPr>
+                      <a:r>
+                        <a:rPr lang="id-ID" sz="1600" b="1" kern="1200" dirty="0" smtClean="0">
+                          <a:solidFill>
+                            <a:schemeClr val="dk1"/>
+                          </a:solidFill>
+                          <a:effectLst/>
+                          <a:latin typeface="+mn-lt"/>
+                          <a:ea typeface="+mn-ea"/>
+                          <a:cs typeface="+mn-cs"/>
+                        </a:rPr>
+                        <a:t>Benny Susanto, </a:t>
+                      </a:r>
+                      <a:r>
+                        <a:rPr lang="id-ID" sz="1600" b="0" kern="1200" dirty="0" smtClean="0">
+                          <a:solidFill>
+                            <a:schemeClr val="dk1"/>
+                          </a:solidFill>
+                          <a:effectLst/>
+                          <a:latin typeface="+mn-lt"/>
+                          <a:ea typeface="+mn-ea"/>
+                          <a:cs typeface="+mn-cs"/>
+                        </a:rPr>
+                        <a:t>sebagai CFO (Chief Financial Officer) dan founder. Merupakan seseorang yang sangat</a:t>
+                      </a:r>
+                      <a:r>
+                        <a:rPr lang="id-ID" sz="1600" b="0" kern="1200" baseline="0" dirty="0" smtClean="0">
+                          <a:solidFill>
+                            <a:schemeClr val="dk1"/>
+                          </a:solidFill>
+                          <a:effectLst/>
+                          <a:latin typeface="+mn-lt"/>
+                          <a:ea typeface="+mn-ea"/>
+                          <a:cs typeface="+mn-cs"/>
+                        </a:rPr>
+                        <a:t> berjiwa sosial. Mengawali karir sebagai pedagang menjadikan beliau penuh dengan pengalaman finansial.</a:t>
+                      </a:r>
+                      <a:r>
+                        <a:rPr lang="id-ID" sz="1600" b="0" kern="1200" dirty="0" smtClean="0">
+                          <a:solidFill>
+                            <a:schemeClr val="dk1"/>
+                          </a:solidFill>
+                          <a:effectLst/>
+                          <a:latin typeface="+mn-lt"/>
+                          <a:ea typeface="+mn-ea"/>
+                          <a:cs typeface="+mn-cs"/>
+                        </a:rPr>
+                        <a:t> Bertekad untuk mencari solusi dalam pemenuhan kebutuhan finansial perusahaan dengan membuat berbagai kebijakan finansial.</a:t>
+                      </a:r>
+                      <a:endParaRPr lang="id-ID" b="0" dirty="0"/>
+                    </a:p>
+                  </a:txBody>
+                  <a:tcPr/>
+                </a:tc>
+                <a:extLst>
+                  <a:ext uri="{0D108BD9-81ED-4DB2-BD59-A6C34878D82A}">
+                    <a16:rowId xmlns:a16="http://schemas.microsoft.com/office/drawing/2014/main" val="3915779658"/>
+                  </a:ext>
+                </a:extLst>
+              </a:tr>
+            </a:tbl>
+          </a:graphicData>
+        </a:graphic>
+      </p:graphicFrame>
+      <p:pic>
+        <p:nvPicPr>
+          <p:cNvPr id="12" name="Content Placeholder 3"/>
+          <p:cNvPicPr>
+            <a:picLocks noChangeAspect="1"/>
+          </p:cNvPicPr>
+          <p:nvPr/>
+        </p:nvPicPr>
+        <p:blipFill>
+          <a:blip r:embed="rId4">
+            <a:extLst>
+              <a:ext uri="{28A0092B-C50C-407E-A947-70E740481C1C}">
+                <a14:useLocalDpi xmlns:a14="http://schemas.microsoft.com/office/drawing/2010/main" val="0"/>
+              </a:ext>
+            </a:extLst>
+          </a:blip>
+          <a:stretch>
+            <a:fillRect/>
+          </a:stretch>
+        </p:blipFill>
+        <p:spPr>
+          <a:xfrm>
+            <a:off x="9534560" y="1885414"/>
+            <a:ext cx="1080000" cy="1191340"/>
+          </a:xfrm>
+          <a:prstGeom prst="rect">
+            <a:avLst/>
+          </a:prstGeom>
+          <a:gradFill flip="none" rotWithShape="1">
+            <a:gsLst>
+              <a:gs pos="58000">
+                <a:srgbClr val="075791"/>
+              </a:gs>
+              <a:gs pos="0">
+                <a:srgbClr val="022657"/>
+              </a:gs>
+              <a:gs pos="100000">
+                <a:srgbClr val="0DC2F1"/>
+              </a:gs>
+            </a:gsLst>
+            <a:lin ang="16200000" scaled="1"/>
+            <a:tileRect/>
+          </a:gradFill>
+          <a:effectLst>
+            <a:softEdge rad="0"/>
+          </a:effectLst>
+        </p:spPr>
+      </p:pic>
+    </p:spTree>
+    <p:extLst>
+      <p:ext uri="{BB962C8B-B14F-4D97-AF65-F5344CB8AC3E}">
+        <p14:creationId xmlns:p14="http://schemas.microsoft.com/office/powerpoint/2010/main" val="3181121581"/>
+      </p:ext>
+    </p:extLst>
+  </p:cSld>
+  <p:clrMapOvr>
+    <a:masterClrMapping/>
+  </p:clrMapOvr>
+  <mc:AlternateContent xmlns:mc="http://schemas.openxmlformats.org/markup-compatibility/2006" xmlns:p14="http://schemas.microsoft.com/office/powerpoint/2010/main">
+    <mc:Choice Requires="p14">
+      <p:transition spd="med" p14:dur="700">
+        <p:fade/>
+      </p:transition>
+    </mc:Choice>
+    <mc:Fallback xmlns="">
+      <p:transition spd="med">
+        <p:fade/>
+      </p:transition>
+    </mc:Fallback>
+  </mc:AlternateContent>
+</p:sld>
+</file>
+
+<file path=ppt/slides/slide7.xml><?xml version="1.0" encoding="utf-8"?>
+<p:sld xmlns:a="http://schemas.openxmlformats.org/drawingml/2006/main" xmlns:r="http://schemas.openxmlformats.org/officeDocument/2006/relationships" xmlns:p="http://schemas.openxmlformats.org/presentationml/2006/main">
+  <p:cSld>
+    <p:spTree>
+      <p:nvGrpSpPr>
+        <p:cNvPr id="1" name=""/>
+        <p:cNvGrpSpPr/>
+        <p:nvPr/>
+      </p:nvGrpSpPr>
+      <p:grpSpPr>
+        <a:xfrm>
+          <a:off x="0" y="0"/>
+          <a:ext cx="0" cy="0"/>
+          <a:chOff x="0" y="0"/>
+          <a:chExt cx="0" cy="0"/>
+        </a:xfrm>
+      </p:grpSpPr>
+      <p:sp>
+        <p:nvSpPr>
+          <p:cNvPr id="2" name="Title 1"/>
+          <p:cNvSpPr>
+            <a:spLocks noGrp="1"/>
+          </p:cNvSpPr>
+          <p:nvPr>
+            <p:ph type="title"/>
+          </p:nvPr>
+        </p:nvSpPr>
+        <p:spPr/>
+        <p:txBody>
+          <a:bodyPr/>
+          <a:lstStyle/>
+          <a:p>
+            <a:r>
+              <a:rPr lang="id-ID" dirty="0" smtClean="0"/>
+              <a:t>Struktur Perusahaan – Team Profile</a:t>
+            </a:r>
+            <a:endParaRPr lang="id-ID" dirty="0"/>
+          </a:p>
+        </p:txBody>
+      </p:sp>
+      <p:graphicFrame>
+        <p:nvGraphicFramePr>
+          <p:cNvPr id="8" name="Table 7"/>
+          <p:cNvGraphicFramePr>
+            <a:graphicFrameLocks noGrp="1"/>
+          </p:cNvGraphicFramePr>
+          <p:nvPr>
+            <p:extLst>
+              <p:ext uri="{D42A27DB-BD31-4B8C-83A1-F6EECF244321}">
+                <p14:modId xmlns:p14="http://schemas.microsoft.com/office/powerpoint/2010/main" val="1779604935"/>
+              </p:ext>
+            </p:extLst>
+          </p:nvPr>
+        </p:nvGraphicFramePr>
+        <p:xfrm>
+          <a:off x="83127" y="1544041"/>
+          <a:ext cx="3906982" cy="5207741"/>
+        </p:xfrm>
+        <a:graphic>
+          <a:graphicData uri="http://schemas.openxmlformats.org/drawingml/2006/table">
+            <a:tbl>
+              <a:tblPr firstRow="1" bandRow="1">
+                <a:tableStyleId>{5C22544A-7EE6-4342-B048-85BDC9FD1C3A}</a:tableStyleId>
+              </a:tblPr>
+              <a:tblGrid>
+                <a:gridCol w="3906982">
+                  <a:extLst>
+                    <a:ext uri="{9D8B030D-6E8A-4147-A177-3AD203B41FA5}">
+                      <a16:colId xmlns:a16="http://schemas.microsoft.com/office/drawing/2014/main" val="2057432390"/>
+                    </a:ext>
+                  </a:extLst>
+                </a:gridCol>
+              </a:tblGrid>
+              <a:tr h="1861855">
+                <a:tc>
+                  <a:txBody>
+                    <a:bodyPr/>
+                    <a:lstStyle/>
+                    <a:p>
+                      <a:endParaRPr lang="id-ID" dirty="0"/>
+                    </a:p>
+                  </a:txBody>
+                  <a:tcPr>
+                    <a:gradFill flip="none" rotWithShape="1">
+                      <a:gsLst>
+                        <a:gs pos="58000">
+                          <a:srgbClr val="075791"/>
+                        </a:gs>
+                        <a:gs pos="0">
+                          <a:srgbClr val="022657"/>
+                        </a:gs>
+                        <a:gs pos="100000">
+                          <a:srgbClr val="0DC2F1"/>
+                        </a:gs>
+                      </a:gsLst>
+                      <a:lin ang="5400000" scaled="1"/>
+                      <a:tileRect/>
+                    </a:gradFill>
+                  </a:tcPr>
+                </a:tc>
+                <a:extLst>
+                  <a:ext uri="{0D108BD9-81ED-4DB2-BD59-A6C34878D82A}">
+                    <a16:rowId xmlns:a16="http://schemas.microsoft.com/office/drawing/2014/main" val="3202738208"/>
+                  </a:ext>
+                </a:extLst>
+              </a:tr>
+              <a:tr h="3345886">
+                <a:tc>
+                  <a:txBody>
+                    <a:bodyPr/>
+                    <a:lstStyle/>
+                    <a:p>
+                      <a:pPr marL="0" marR="0" lvl="0" indent="0" algn="l" defTabSz="685800" rtl="0" eaLnBrk="1" fontAlgn="auto" latinLnBrk="0" hangingPunct="1">
+                        <a:lnSpc>
+                          <a:spcPct val="100000"/>
+                        </a:lnSpc>
+                        <a:spcBef>
+                          <a:spcPts val="0"/>
+                        </a:spcBef>
+                        <a:spcAft>
+                          <a:spcPts val="0"/>
+                        </a:spcAft>
+                        <a:buClrTx/>
+                        <a:buSzTx/>
+                        <a:buFontTx/>
+                        <a:buNone/>
+                        <a:tabLst/>
+                        <a:defRPr/>
+                      </a:pPr>
+                      <a:r>
+                        <a:rPr lang="id-ID" sz="1600" b="1" kern="1200" dirty="0" smtClean="0">
+                          <a:solidFill>
+                            <a:schemeClr val="dk1"/>
+                          </a:solidFill>
+                          <a:effectLst/>
+                          <a:latin typeface="+mn-lt"/>
+                          <a:ea typeface="+mn-ea"/>
+                          <a:cs typeface="+mn-cs"/>
+                        </a:rPr>
+                        <a:t>Machfito, </a:t>
+                      </a:r>
+                      <a:r>
+                        <a:rPr lang="id-ID" sz="1600" b="0" kern="1200" dirty="0" smtClean="0">
+                          <a:solidFill>
+                            <a:schemeClr val="dk1"/>
+                          </a:solidFill>
+                          <a:effectLst/>
+                          <a:latin typeface="+mn-lt"/>
+                          <a:ea typeface="+mn-ea"/>
+                          <a:cs typeface="+mn-cs"/>
+                        </a:rPr>
+                        <a:t>sebagai operational manager. Merupakan seorang yang</a:t>
+                      </a:r>
+                      <a:r>
+                        <a:rPr lang="id-ID" sz="1600" b="0" kern="1200" baseline="0" dirty="0" smtClean="0">
+                          <a:solidFill>
+                            <a:schemeClr val="dk1"/>
+                          </a:solidFill>
+                          <a:effectLst/>
+                          <a:latin typeface="+mn-lt"/>
+                          <a:ea typeface="+mn-ea"/>
+                          <a:cs typeface="+mn-cs"/>
+                        </a:rPr>
+                        <a:t> sangat antusias dalam jaringan komputer. Memiliki pengalaman yang kuat dalam teknologi cloud membuat beliau dapat menyelesaikan tugasnya dengan baik. </a:t>
+                      </a:r>
+                      <a:r>
+                        <a:rPr lang="id-ID" sz="1600" b="0" kern="1200" dirty="0" smtClean="0">
+                          <a:solidFill>
+                            <a:schemeClr val="dk1"/>
+                          </a:solidFill>
+                          <a:effectLst/>
+                          <a:latin typeface="+mn-lt"/>
+                          <a:ea typeface="+mn-ea"/>
+                          <a:cs typeface="+mn-cs"/>
+                        </a:rPr>
+                        <a:t>Bertugas dalam menyelesaikan hal-hal yang berhubungan dengan datacenter perusahaan.</a:t>
+                      </a:r>
+                      <a:endParaRPr lang="id-ID" b="0" dirty="0"/>
+                    </a:p>
+                  </a:txBody>
+                  <a:tcPr/>
+                </a:tc>
+                <a:extLst>
+                  <a:ext uri="{0D108BD9-81ED-4DB2-BD59-A6C34878D82A}">
+                    <a16:rowId xmlns:a16="http://schemas.microsoft.com/office/drawing/2014/main" val="3915779658"/>
+                  </a:ext>
+                </a:extLst>
+              </a:tr>
+            </a:tbl>
+          </a:graphicData>
+        </a:graphic>
+      </p:graphicFrame>
+      <p:pic>
+        <p:nvPicPr>
+          <p:cNvPr id="7" name="Content Placeholder 3"/>
+          <p:cNvPicPr>
+            <a:picLocks noChangeAspect="1"/>
+          </p:cNvPicPr>
+          <p:nvPr/>
+        </p:nvPicPr>
+        <p:blipFill>
+          <a:blip r:embed="rId2">
+            <a:extLst>
+              <a:ext uri="{28A0092B-C50C-407E-A947-70E740481C1C}">
+                <a14:useLocalDpi xmlns:a14="http://schemas.microsoft.com/office/drawing/2010/main" val="0"/>
+              </a:ext>
+            </a:extLst>
+          </a:blip>
+          <a:stretch>
+            <a:fillRect/>
+          </a:stretch>
+        </p:blipFill>
+        <p:spPr>
+          <a:xfrm>
+            <a:off x="1570509" y="1882631"/>
+            <a:ext cx="1079999" cy="1174638"/>
+          </a:xfrm>
+          <a:prstGeom prst="rect">
+            <a:avLst/>
+          </a:prstGeom>
+          <a:gradFill flip="none" rotWithShape="1">
+            <a:gsLst>
+              <a:gs pos="58000">
+                <a:srgbClr val="075791"/>
+              </a:gs>
+              <a:gs pos="0">
+                <a:srgbClr val="022657"/>
+              </a:gs>
+              <a:gs pos="100000">
+                <a:srgbClr val="0DC2F1"/>
+              </a:gs>
+            </a:gsLst>
+            <a:lin ang="16200000" scaled="1"/>
+            <a:tileRect/>
+          </a:gradFill>
+          <a:effectLst>
+            <a:softEdge rad="0"/>
+          </a:effectLst>
+        </p:spPr>
+      </p:pic>
+      <p:graphicFrame>
+        <p:nvGraphicFramePr>
+          <p:cNvPr id="9" name="Table 8"/>
+          <p:cNvGraphicFramePr>
+            <a:graphicFrameLocks noGrp="1"/>
+          </p:cNvGraphicFramePr>
+          <p:nvPr>
+            <p:extLst>
+              <p:ext uri="{D42A27DB-BD31-4B8C-83A1-F6EECF244321}">
+                <p14:modId xmlns:p14="http://schemas.microsoft.com/office/powerpoint/2010/main" val="2901938444"/>
+              </p:ext>
+            </p:extLst>
+          </p:nvPr>
+        </p:nvGraphicFramePr>
+        <p:xfrm>
+          <a:off x="4089400" y="1544041"/>
+          <a:ext cx="3874654" cy="5207741"/>
+        </p:xfrm>
+        <a:graphic>
+          <a:graphicData uri="http://schemas.openxmlformats.org/drawingml/2006/table">
+            <a:tbl>
+              <a:tblPr firstRow="1" bandRow="1">
+                <a:tableStyleId>{5C22544A-7EE6-4342-B048-85BDC9FD1C3A}</a:tableStyleId>
+              </a:tblPr>
+              <a:tblGrid>
+                <a:gridCol w="3874654">
+                  <a:extLst>
+                    <a:ext uri="{9D8B030D-6E8A-4147-A177-3AD203B41FA5}">
+                      <a16:colId xmlns:a16="http://schemas.microsoft.com/office/drawing/2014/main" val="2057432390"/>
+                    </a:ext>
+                  </a:extLst>
+                </a:gridCol>
+              </a:tblGrid>
+              <a:tr h="1861855">
+                <a:tc>
+                  <a:txBody>
+                    <a:bodyPr/>
+                    <a:lstStyle/>
+                    <a:p>
+                      <a:endParaRPr lang="id-ID" dirty="0"/>
+                    </a:p>
+                  </a:txBody>
+                  <a:tcPr>
+                    <a:gradFill flip="none" rotWithShape="1">
+                      <a:gsLst>
+                        <a:gs pos="58000">
+                          <a:srgbClr val="075791"/>
+                        </a:gs>
+                        <a:gs pos="0">
+                          <a:srgbClr val="022657"/>
+                        </a:gs>
+                        <a:gs pos="100000">
+                          <a:srgbClr val="0DC2F1"/>
+                        </a:gs>
+                      </a:gsLst>
+                      <a:lin ang="5400000" scaled="1"/>
+                      <a:tileRect/>
+                    </a:gradFill>
+                  </a:tcPr>
+                </a:tc>
+                <a:extLst>
+                  <a:ext uri="{0D108BD9-81ED-4DB2-BD59-A6C34878D82A}">
+                    <a16:rowId xmlns:a16="http://schemas.microsoft.com/office/drawing/2014/main" val="3202738208"/>
+                  </a:ext>
+                </a:extLst>
+              </a:tr>
+              <a:tr h="3345886">
+                <a:tc>
+                  <a:txBody>
+                    <a:bodyPr/>
+                    <a:lstStyle/>
+                    <a:p>
+                      <a:pPr marL="0" marR="0" lvl="0" indent="0" algn="l" defTabSz="685800" rtl="0" eaLnBrk="1" fontAlgn="auto" latinLnBrk="0" hangingPunct="1">
+                        <a:lnSpc>
+                          <a:spcPct val="100000"/>
+                        </a:lnSpc>
+                        <a:spcBef>
+                          <a:spcPts val="0"/>
+                        </a:spcBef>
+                        <a:spcAft>
+                          <a:spcPts val="0"/>
+                        </a:spcAft>
+                        <a:buClrTx/>
+                        <a:buSzTx/>
+                        <a:buFontTx/>
+                        <a:buNone/>
+                        <a:tabLst/>
+                        <a:defRPr/>
+                      </a:pPr>
+                      <a:r>
+                        <a:rPr lang="id-ID" sz="1600" b="1" kern="1200" dirty="0" smtClean="0">
+                          <a:solidFill>
+                            <a:schemeClr val="dk1"/>
+                          </a:solidFill>
+                          <a:effectLst/>
+                          <a:latin typeface="+mn-lt"/>
+                          <a:ea typeface="+mn-ea"/>
+                          <a:cs typeface="+mn-cs"/>
+                        </a:rPr>
+                        <a:t>Fikri Fadillah, </a:t>
+                      </a:r>
+                      <a:r>
+                        <a:rPr lang="id-ID" sz="1600" b="0" kern="1200" dirty="0" smtClean="0">
+                          <a:solidFill>
+                            <a:schemeClr val="dk1"/>
+                          </a:solidFill>
+                          <a:effectLst/>
+                          <a:latin typeface="+mn-lt"/>
+                          <a:ea typeface="+mn-ea"/>
+                          <a:cs typeface="+mn-cs"/>
+                        </a:rPr>
+                        <a:t>sebagai public relation manager dan marketting staff. Berawal dari hobi menjual</a:t>
+                      </a:r>
+                      <a:r>
+                        <a:rPr lang="id-ID" sz="1600" b="0" kern="1200" baseline="0" dirty="0" smtClean="0">
+                          <a:solidFill>
+                            <a:schemeClr val="dk1"/>
+                          </a:solidFill>
+                          <a:effectLst/>
+                          <a:latin typeface="+mn-lt"/>
+                          <a:ea typeface="+mn-ea"/>
+                          <a:cs typeface="+mn-cs"/>
+                        </a:rPr>
+                        <a:t> barang-barang seken membuat beliau menjadi seseorang yang ahli dalam memberikan persuasi kepada orang lain untuk ikut serta dalam event yang diselenggarakan.</a:t>
+                      </a:r>
+                      <a:r>
+                        <a:rPr lang="id-ID" sz="1600" b="0" kern="1200" dirty="0" smtClean="0">
+                          <a:solidFill>
+                            <a:schemeClr val="dk1"/>
+                          </a:solidFill>
+                          <a:effectLst/>
+                          <a:latin typeface="+mn-lt"/>
+                          <a:ea typeface="+mn-ea"/>
+                          <a:cs typeface="+mn-cs"/>
+                        </a:rPr>
+                        <a:t> Berperan dalam hal event dan promosi perusahaan, serta pelaksanaan training seputar teknologi cloud.</a:t>
+                      </a:r>
+                      <a:endParaRPr lang="id-ID" b="0" dirty="0"/>
+                    </a:p>
+                  </a:txBody>
+                  <a:tcPr/>
+                </a:tc>
+                <a:extLst>
+                  <a:ext uri="{0D108BD9-81ED-4DB2-BD59-A6C34878D82A}">
+                    <a16:rowId xmlns:a16="http://schemas.microsoft.com/office/drawing/2014/main" val="3915779658"/>
+                  </a:ext>
+                </a:extLst>
+              </a:tr>
+            </a:tbl>
+          </a:graphicData>
+        </a:graphic>
+      </p:graphicFrame>
+      <p:pic>
+        <p:nvPicPr>
+          <p:cNvPr id="10" name="Content Placeholder 3"/>
+          <p:cNvPicPr>
+            <a:picLocks noChangeAspect="1"/>
+          </p:cNvPicPr>
+          <p:nvPr/>
+        </p:nvPicPr>
+        <p:blipFill>
+          <a:blip r:embed="rId3">
+            <a:extLst>
+              <a:ext uri="{28A0092B-C50C-407E-A947-70E740481C1C}">
+                <a14:useLocalDpi xmlns:a14="http://schemas.microsoft.com/office/drawing/2010/main" val="0"/>
+              </a:ext>
+            </a:extLst>
+          </a:blip>
+          <a:stretch>
+            <a:fillRect/>
+          </a:stretch>
+        </p:blipFill>
+        <p:spPr>
+          <a:xfrm>
+            <a:off x="5556000" y="1863146"/>
+            <a:ext cx="1079999" cy="1213608"/>
+          </a:xfrm>
+          <a:prstGeom prst="rect">
+            <a:avLst/>
+          </a:prstGeom>
+          <a:gradFill flip="none" rotWithShape="1">
+            <a:gsLst>
+              <a:gs pos="58000">
+                <a:srgbClr val="075791"/>
+              </a:gs>
+              <a:gs pos="0">
+                <a:srgbClr val="022657"/>
+              </a:gs>
+              <a:gs pos="100000">
+                <a:srgbClr val="0DC2F1"/>
+              </a:gs>
+            </a:gsLst>
+            <a:lin ang="16200000" scaled="1"/>
+            <a:tileRect/>
+          </a:gradFill>
+          <a:effectLst>
+            <a:softEdge rad="0"/>
+          </a:effectLst>
+        </p:spPr>
+      </p:pic>
+    </p:spTree>
+    <p:extLst>
+      <p:ext uri="{BB962C8B-B14F-4D97-AF65-F5344CB8AC3E}">
+        <p14:creationId xmlns:p14="http://schemas.microsoft.com/office/powerpoint/2010/main" val="4050888949"/>
       </p:ext>
     </p:extLst>
   </p:cSld>

</xml_diff>

<commit_message>
#20161115 -> page setting [minor fix]
</commit_message>
<xml_diff>
--- a/PPT/Business Plan MID.pptx
+++ b/PPT/Business Plan MID.pptx
@@ -4,6 +4,12 @@
   <p:sldMasterIdLst>
     <p:sldMasterId id="2147483660" r:id="rId1"/>
   </p:sldMasterIdLst>
+  <p:notesMasterIdLst>
+    <p:notesMasterId r:id="rId9"/>
+  </p:notesMasterIdLst>
+  <p:handoutMasterIdLst>
+    <p:handoutMasterId r:id="rId10"/>
+  </p:handoutMasterIdLst>
   <p:sldIdLst>
     <p:sldId id="256" r:id="rId2"/>
     <p:sldId id="258" r:id="rId3"/>
@@ -118,6 +124,1109 @@
 </p:presentation>
 </file>
 
+<file path=ppt/handoutMasters/handoutMaster1.xml><?xml version="1.0" encoding="utf-8"?>
+<p:handoutMaster xmlns:a="http://schemas.openxmlformats.org/drawingml/2006/main" xmlns:r="http://schemas.openxmlformats.org/officeDocument/2006/relationships" xmlns:p="http://schemas.openxmlformats.org/presentationml/2006/main">
+  <p:cSld>
+    <p:bg>
+      <p:bgRef idx="1001">
+        <a:schemeClr val="bg1"/>
+      </p:bgRef>
+    </p:bg>
+    <p:spTree>
+      <p:nvGrpSpPr>
+        <p:cNvPr id="1" name=""/>
+        <p:cNvGrpSpPr/>
+        <p:nvPr/>
+      </p:nvGrpSpPr>
+      <p:grpSpPr>
+        <a:xfrm>
+          <a:off x="0" y="0"/>
+          <a:ext cx="0" cy="0"/>
+          <a:chOff x="0" y="0"/>
+          <a:chExt cx="0" cy="0"/>
+        </a:xfrm>
+      </p:grpSpPr>
+      <p:sp>
+        <p:nvSpPr>
+          <p:cNvPr id="2" name="Header Placeholder 1"/>
+          <p:cNvSpPr>
+            <a:spLocks noGrp="1"/>
+          </p:cNvSpPr>
+          <p:nvPr>
+            <p:ph type="hdr" sz="quarter"/>
+          </p:nvPr>
+        </p:nvSpPr>
+        <p:spPr>
+          <a:xfrm>
+            <a:off x="0" y="0"/>
+            <a:ext cx="2971800" cy="458788"/>
+          </a:xfrm>
+          <a:prstGeom prst="rect">
+            <a:avLst/>
+          </a:prstGeom>
+        </p:spPr>
+        <p:txBody>
+          <a:bodyPr vert="horz" lIns="91440" tIns="45720" rIns="91440" bIns="45720" rtlCol="0"/>
+          <a:lstStyle>
+            <a:lvl1pPr algn="l">
+              <a:defRPr sz="1200"/>
+            </a:lvl1pPr>
+          </a:lstStyle>
+          <a:p>
+            <a:endParaRPr lang="id-ID"/>
+          </a:p>
+        </p:txBody>
+      </p:sp>
+      <p:sp>
+        <p:nvSpPr>
+          <p:cNvPr id="3" name="Date Placeholder 2"/>
+          <p:cNvSpPr>
+            <a:spLocks noGrp="1"/>
+          </p:cNvSpPr>
+          <p:nvPr>
+            <p:ph type="dt" sz="quarter" idx="1"/>
+          </p:nvPr>
+        </p:nvSpPr>
+        <p:spPr>
+          <a:xfrm>
+            <a:off x="3884613" y="0"/>
+            <a:ext cx="2971800" cy="458788"/>
+          </a:xfrm>
+          <a:prstGeom prst="rect">
+            <a:avLst/>
+          </a:prstGeom>
+        </p:spPr>
+        <p:txBody>
+          <a:bodyPr vert="horz" lIns="91440" tIns="45720" rIns="91440" bIns="45720" rtlCol="0"/>
+          <a:lstStyle>
+            <a:lvl1pPr algn="r">
+              <a:defRPr sz="1200"/>
+            </a:lvl1pPr>
+          </a:lstStyle>
+          <a:p>
+            <a:fld id="{8B48C99A-A39E-4101-9841-2841ADECF095}" type="datetimeFigureOut">
+              <a:rPr lang="id-ID" smtClean="0"/>
+              <a:t>15/11/2016</a:t>
+            </a:fld>
+            <a:endParaRPr lang="id-ID"/>
+          </a:p>
+        </p:txBody>
+      </p:sp>
+      <p:sp>
+        <p:nvSpPr>
+          <p:cNvPr id="4" name="Footer Placeholder 3"/>
+          <p:cNvSpPr>
+            <a:spLocks noGrp="1"/>
+          </p:cNvSpPr>
+          <p:nvPr>
+            <p:ph type="ftr" sz="quarter" idx="2"/>
+          </p:nvPr>
+        </p:nvSpPr>
+        <p:spPr>
+          <a:xfrm>
+            <a:off x="0" y="8685213"/>
+            <a:ext cx="2971800" cy="458787"/>
+          </a:xfrm>
+          <a:prstGeom prst="rect">
+            <a:avLst/>
+          </a:prstGeom>
+        </p:spPr>
+        <p:txBody>
+          <a:bodyPr vert="horz" lIns="91440" tIns="45720" rIns="91440" bIns="45720" rtlCol="0" anchor="b"/>
+          <a:lstStyle>
+            <a:lvl1pPr algn="l">
+              <a:defRPr sz="1200"/>
+            </a:lvl1pPr>
+          </a:lstStyle>
+          <a:p>
+            <a:endParaRPr lang="id-ID"/>
+          </a:p>
+        </p:txBody>
+      </p:sp>
+      <p:sp>
+        <p:nvSpPr>
+          <p:cNvPr id="5" name="Slide Number Placeholder 4"/>
+          <p:cNvSpPr>
+            <a:spLocks noGrp="1"/>
+          </p:cNvSpPr>
+          <p:nvPr>
+            <p:ph type="sldNum" sz="quarter" idx="3"/>
+          </p:nvPr>
+        </p:nvSpPr>
+        <p:spPr>
+          <a:xfrm>
+            <a:off x="3884613" y="8685213"/>
+            <a:ext cx="2971800" cy="458787"/>
+          </a:xfrm>
+          <a:prstGeom prst="rect">
+            <a:avLst/>
+          </a:prstGeom>
+        </p:spPr>
+        <p:txBody>
+          <a:bodyPr vert="horz" lIns="91440" tIns="45720" rIns="91440" bIns="45720" rtlCol="0" anchor="b"/>
+          <a:lstStyle>
+            <a:lvl1pPr algn="r">
+              <a:defRPr sz="1200"/>
+            </a:lvl1pPr>
+          </a:lstStyle>
+          <a:p>
+            <a:fld id="{5ECD1DB0-0B14-4FBC-8570-C4BE112024A1}" type="slidenum">
+              <a:rPr lang="id-ID" smtClean="0"/>
+              <a:t>‹#›</a:t>
+            </a:fld>
+            <a:endParaRPr lang="id-ID"/>
+          </a:p>
+        </p:txBody>
+      </p:sp>
+    </p:spTree>
+    <p:extLst>
+      <p:ext uri="{BB962C8B-B14F-4D97-AF65-F5344CB8AC3E}">
+        <p14:creationId xmlns:p14="http://schemas.microsoft.com/office/powerpoint/2010/main" val="2289160284"/>
+      </p:ext>
+    </p:extLst>
+  </p:cSld>
+  <p:clrMap bg1="lt1" tx1="dk1" bg2="lt2" tx2="dk2" accent1="accent1" accent2="accent2" accent3="accent3" accent4="accent4" accent5="accent5" accent6="accent6" hlink="hlink" folHlink="folHlink"/>
+</p:handoutMaster>
+</file>
+
+<file path=ppt/notesMasters/notesMaster1.xml><?xml version="1.0" encoding="utf-8"?>
+<p:notesMaster xmlns:a="http://schemas.openxmlformats.org/drawingml/2006/main" xmlns:r="http://schemas.openxmlformats.org/officeDocument/2006/relationships" xmlns:p="http://schemas.openxmlformats.org/presentationml/2006/main">
+  <p:cSld>
+    <p:bg>
+      <p:bgRef idx="1001">
+        <a:schemeClr val="bg1"/>
+      </p:bgRef>
+    </p:bg>
+    <p:spTree>
+      <p:nvGrpSpPr>
+        <p:cNvPr id="1" name=""/>
+        <p:cNvGrpSpPr/>
+        <p:nvPr/>
+      </p:nvGrpSpPr>
+      <p:grpSpPr>
+        <a:xfrm>
+          <a:off x="0" y="0"/>
+          <a:ext cx="0" cy="0"/>
+          <a:chOff x="0" y="0"/>
+          <a:chExt cx="0" cy="0"/>
+        </a:xfrm>
+      </p:grpSpPr>
+      <p:sp>
+        <p:nvSpPr>
+          <p:cNvPr id="2" name="Header Placeholder 1"/>
+          <p:cNvSpPr>
+            <a:spLocks noGrp="1"/>
+          </p:cNvSpPr>
+          <p:nvPr>
+            <p:ph type="hdr" sz="quarter"/>
+          </p:nvPr>
+        </p:nvSpPr>
+        <p:spPr>
+          <a:xfrm>
+            <a:off x="0" y="0"/>
+            <a:ext cx="2971800" cy="458788"/>
+          </a:xfrm>
+          <a:prstGeom prst="rect">
+            <a:avLst/>
+          </a:prstGeom>
+        </p:spPr>
+        <p:txBody>
+          <a:bodyPr vert="horz" lIns="91440" tIns="45720" rIns="91440" bIns="45720" rtlCol="0"/>
+          <a:lstStyle>
+            <a:lvl1pPr algn="l">
+              <a:defRPr sz="1200"/>
+            </a:lvl1pPr>
+          </a:lstStyle>
+          <a:p>
+            <a:endParaRPr lang="id-ID"/>
+          </a:p>
+        </p:txBody>
+      </p:sp>
+      <p:sp>
+        <p:nvSpPr>
+          <p:cNvPr id="3" name="Date Placeholder 2"/>
+          <p:cNvSpPr>
+            <a:spLocks noGrp="1"/>
+          </p:cNvSpPr>
+          <p:nvPr>
+            <p:ph type="dt" idx="1"/>
+          </p:nvPr>
+        </p:nvSpPr>
+        <p:spPr>
+          <a:xfrm>
+            <a:off x="3884613" y="0"/>
+            <a:ext cx="2971800" cy="458788"/>
+          </a:xfrm>
+          <a:prstGeom prst="rect">
+            <a:avLst/>
+          </a:prstGeom>
+        </p:spPr>
+        <p:txBody>
+          <a:bodyPr vert="horz" lIns="91440" tIns="45720" rIns="91440" bIns="45720" rtlCol="0"/>
+          <a:lstStyle>
+            <a:lvl1pPr algn="r">
+              <a:defRPr sz="1200"/>
+            </a:lvl1pPr>
+          </a:lstStyle>
+          <a:p>
+            <a:fld id="{D17A2ABF-6DA3-46C4-A412-9D37D241A630}" type="datetimeFigureOut">
+              <a:rPr lang="id-ID" smtClean="0"/>
+              <a:t>15/11/2016</a:t>
+            </a:fld>
+            <a:endParaRPr lang="id-ID"/>
+          </a:p>
+        </p:txBody>
+      </p:sp>
+      <p:sp>
+        <p:nvSpPr>
+          <p:cNvPr id="4" name="Slide Image Placeholder 3"/>
+          <p:cNvSpPr>
+            <a:spLocks noGrp="1" noRot="1" noChangeAspect="1"/>
+          </p:cNvSpPr>
+          <p:nvPr>
+            <p:ph type="sldImg" idx="2"/>
+          </p:nvPr>
+        </p:nvSpPr>
+        <p:spPr>
+          <a:xfrm>
+            <a:off x="685800" y="1143000"/>
+            <a:ext cx="5486400" cy="3086100"/>
+          </a:xfrm>
+          <a:prstGeom prst="rect">
+            <a:avLst/>
+          </a:prstGeom>
+          <a:noFill/>
+          <a:ln w="12700">
+            <a:solidFill>
+              <a:prstClr val="black"/>
+            </a:solidFill>
+          </a:ln>
+        </p:spPr>
+        <p:txBody>
+          <a:bodyPr vert="horz" lIns="91440" tIns="45720" rIns="91440" bIns="45720" rtlCol="0" anchor="ctr"/>
+          <a:lstStyle/>
+          <a:p>
+            <a:endParaRPr lang="id-ID"/>
+          </a:p>
+        </p:txBody>
+      </p:sp>
+      <p:sp>
+        <p:nvSpPr>
+          <p:cNvPr id="5" name="Notes Placeholder 4"/>
+          <p:cNvSpPr>
+            <a:spLocks noGrp="1"/>
+          </p:cNvSpPr>
+          <p:nvPr>
+            <p:ph type="body" sz="quarter" idx="3"/>
+          </p:nvPr>
+        </p:nvSpPr>
+        <p:spPr>
+          <a:xfrm>
+            <a:off x="685800" y="4400550"/>
+            <a:ext cx="5486400" cy="3600450"/>
+          </a:xfrm>
+          <a:prstGeom prst="rect">
+            <a:avLst/>
+          </a:prstGeom>
+        </p:spPr>
+        <p:txBody>
+          <a:bodyPr vert="horz" lIns="91440" tIns="45720" rIns="91440" bIns="45720" rtlCol="0"/>
+          <a:lstStyle/>
+          <a:p>
+            <a:pPr lvl="0"/>
+            <a:r>
+              <a:rPr lang="en-US" smtClean="0"/>
+              <a:t>Edit Master text styles</a:t>
+            </a:r>
+          </a:p>
+          <a:p>
+            <a:pPr lvl="1"/>
+            <a:r>
+              <a:rPr lang="en-US" smtClean="0"/>
+              <a:t>Second level</a:t>
+            </a:r>
+          </a:p>
+          <a:p>
+            <a:pPr lvl="2"/>
+            <a:r>
+              <a:rPr lang="en-US" smtClean="0"/>
+              <a:t>Third level</a:t>
+            </a:r>
+          </a:p>
+          <a:p>
+            <a:pPr lvl="3"/>
+            <a:r>
+              <a:rPr lang="en-US" smtClean="0"/>
+              <a:t>Fourth level</a:t>
+            </a:r>
+          </a:p>
+          <a:p>
+            <a:pPr lvl="4"/>
+            <a:r>
+              <a:rPr lang="en-US" smtClean="0"/>
+              <a:t>Fifth level</a:t>
+            </a:r>
+            <a:endParaRPr lang="id-ID"/>
+          </a:p>
+        </p:txBody>
+      </p:sp>
+      <p:sp>
+        <p:nvSpPr>
+          <p:cNvPr id="6" name="Footer Placeholder 5"/>
+          <p:cNvSpPr>
+            <a:spLocks noGrp="1"/>
+          </p:cNvSpPr>
+          <p:nvPr>
+            <p:ph type="ftr" sz="quarter" idx="4"/>
+          </p:nvPr>
+        </p:nvSpPr>
+        <p:spPr>
+          <a:xfrm>
+            <a:off x="0" y="8685213"/>
+            <a:ext cx="2971800" cy="458787"/>
+          </a:xfrm>
+          <a:prstGeom prst="rect">
+            <a:avLst/>
+          </a:prstGeom>
+        </p:spPr>
+        <p:txBody>
+          <a:bodyPr vert="horz" lIns="91440" tIns="45720" rIns="91440" bIns="45720" rtlCol="0" anchor="b"/>
+          <a:lstStyle>
+            <a:lvl1pPr algn="l">
+              <a:defRPr sz="1200"/>
+            </a:lvl1pPr>
+          </a:lstStyle>
+          <a:p>
+            <a:endParaRPr lang="id-ID"/>
+          </a:p>
+        </p:txBody>
+      </p:sp>
+      <p:sp>
+        <p:nvSpPr>
+          <p:cNvPr id="7" name="Slide Number Placeholder 6"/>
+          <p:cNvSpPr>
+            <a:spLocks noGrp="1"/>
+          </p:cNvSpPr>
+          <p:nvPr>
+            <p:ph type="sldNum" sz="quarter" idx="5"/>
+          </p:nvPr>
+        </p:nvSpPr>
+        <p:spPr>
+          <a:xfrm>
+            <a:off x="3884613" y="8685213"/>
+            <a:ext cx="2971800" cy="458787"/>
+          </a:xfrm>
+          <a:prstGeom prst="rect">
+            <a:avLst/>
+          </a:prstGeom>
+        </p:spPr>
+        <p:txBody>
+          <a:bodyPr vert="horz" lIns="91440" tIns="45720" rIns="91440" bIns="45720" rtlCol="0" anchor="b"/>
+          <a:lstStyle>
+            <a:lvl1pPr algn="r">
+              <a:defRPr sz="1200"/>
+            </a:lvl1pPr>
+          </a:lstStyle>
+          <a:p>
+            <a:fld id="{388FB956-B54D-4835-9A6B-C1A6CD221AAA}" type="slidenum">
+              <a:rPr lang="id-ID" smtClean="0"/>
+              <a:t>‹#›</a:t>
+            </a:fld>
+            <a:endParaRPr lang="id-ID"/>
+          </a:p>
+        </p:txBody>
+      </p:sp>
+    </p:spTree>
+    <p:extLst>
+      <p:ext uri="{BB962C8B-B14F-4D97-AF65-F5344CB8AC3E}">
+        <p14:creationId xmlns:p14="http://schemas.microsoft.com/office/powerpoint/2010/main" val="2295159388"/>
+      </p:ext>
+    </p:extLst>
+  </p:cSld>
+  <p:clrMap bg1="lt1" tx1="dk1" bg2="lt2" tx2="dk2" accent1="accent1" accent2="accent2" accent3="accent3" accent4="accent4" accent5="accent5" accent6="accent6" hlink="hlink" folHlink="folHlink"/>
+  <p:notesStyle>
+    <a:lvl1pPr marL="0" algn="l" defTabSz="914400" rtl="0" eaLnBrk="1" latinLnBrk="0" hangingPunct="1">
+      <a:defRPr sz="1200" kern="1200">
+        <a:solidFill>
+          <a:schemeClr val="tx1"/>
+        </a:solidFill>
+        <a:latin typeface="+mn-lt"/>
+        <a:ea typeface="+mn-ea"/>
+        <a:cs typeface="+mn-cs"/>
+      </a:defRPr>
+    </a:lvl1pPr>
+    <a:lvl2pPr marL="457200" algn="l" defTabSz="914400" rtl="0" eaLnBrk="1" latinLnBrk="0" hangingPunct="1">
+      <a:defRPr sz="1200" kern="1200">
+        <a:solidFill>
+          <a:schemeClr val="tx1"/>
+        </a:solidFill>
+        <a:latin typeface="+mn-lt"/>
+        <a:ea typeface="+mn-ea"/>
+        <a:cs typeface="+mn-cs"/>
+      </a:defRPr>
+    </a:lvl2pPr>
+    <a:lvl3pPr marL="914400" algn="l" defTabSz="914400" rtl="0" eaLnBrk="1" latinLnBrk="0" hangingPunct="1">
+      <a:defRPr sz="1200" kern="1200">
+        <a:solidFill>
+          <a:schemeClr val="tx1"/>
+        </a:solidFill>
+        <a:latin typeface="+mn-lt"/>
+        <a:ea typeface="+mn-ea"/>
+        <a:cs typeface="+mn-cs"/>
+      </a:defRPr>
+    </a:lvl3pPr>
+    <a:lvl4pPr marL="1371600" algn="l" defTabSz="914400" rtl="0" eaLnBrk="1" latinLnBrk="0" hangingPunct="1">
+      <a:defRPr sz="1200" kern="1200">
+        <a:solidFill>
+          <a:schemeClr val="tx1"/>
+        </a:solidFill>
+        <a:latin typeface="+mn-lt"/>
+        <a:ea typeface="+mn-ea"/>
+        <a:cs typeface="+mn-cs"/>
+      </a:defRPr>
+    </a:lvl4pPr>
+    <a:lvl5pPr marL="1828800" algn="l" defTabSz="914400" rtl="0" eaLnBrk="1" latinLnBrk="0" hangingPunct="1">
+      <a:defRPr sz="1200" kern="1200">
+        <a:solidFill>
+          <a:schemeClr val="tx1"/>
+        </a:solidFill>
+        <a:latin typeface="+mn-lt"/>
+        <a:ea typeface="+mn-ea"/>
+        <a:cs typeface="+mn-cs"/>
+      </a:defRPr>
+    </a:lvl5pPr>
+    <a:lvl6pPr marL="2286000" algn="l" defTabSz="914400" rtl="0" eaLnBrk="1" latinLnBrk="0" hangingPunct="1">
+      <a:defRPr sz="1200" kern="1200">
+        <a:solidFill>
+          <a:schemeClr val="tx1"/>
+        </a:solidFill>
+        <a:latin typeface="+mn-lt"/>
+        <a:ea typeface="+mn-ea"/>
+        <a:cs typeface="+mn-cs"/>
+      </a:defRPr>
+    </a:lvl6pPr>
+    <a:lvl7pPr marL="2743200" algn="l" defTabSz="914400" rtl="0" eaLnBrk="1" latinLnBrk="0" hangingPunct="1">
+      <a:defRPr sz="1200" kern="1200">
+        <a:solidFill>
+          <a:schemeClr val="tx1"/>
+        </a:solidFill>
+        <a:latin typeface="+mn-lt"/>
+        <a:ea typeface="+mn-ea"/>
+        <a:cs typeface="+mn-cs"/>
+      </a:defRPr>
+    </a:lvl7pPr>
+    <a:lvl8pPr marL="3200400" algn="l" defTabSz="914400" rtl="0" eaLnBrk="1" latinLnBrk="0" hangingPunct="1">
+      <a:defRPr sz="1200" kern="1200">
+        <a:solidFill>
+          <a:schemeClr val="tx1"/>
+        </a:solidFill>
+        <a:latin typeface="+mn-lt"/>
+        <a:ea typeface="+mn-ea"/>
+        <a:cs typeface="+mn-cs"/>
+      </a:defRPr>
+    </a:lvl8pPr>
+    <a:lvl9pPr marL="3657600" algn="l" defTabSz="914400" rtl="0" eaLnBrk="1" latinLnBrk="0" hangingPunct="1">
+      <a:defRPr sz="1200" kern="1200">
+        <a:solidFill>
+          <a:schemeClr val="tx1"/>
+        </a:solidFill>
+        <a:latin typeface="+mn-lt"/>
+        <a:ea typeface="+mn-ea"/>
+        <a:cs typeface="+mn-cs"/>
+      </a:defRPr>
+    </a:lvl9pPr>
+  </p:notesStyle>
+</p:notesMaster>
+</file>
+
+<file path=ppt/notesSlides/notesSlide1.xml><?xml version="1.0" encoding="utf-8"?>
+<p:notes xmlns:a="http://schemas.openxmlformats.org/drawingml/2006/main" xmlns:r="http://schemas.openxmlformats.org/officeDocument/2006/relationships" xmlns:p="http://schemas.openxmlformats.org/presentationml/2006/main">
+  <p:cSld>
+    <p:spTree>
+      <p:nvGrpSpPr>
+        <p:cNvPr id="1" name=""/>
+        <p:cNvGrpSpPr/>
+        <p:nvPr/>
+      </p:nvGrpSpPr>
+      <p:grpSpPr>
+        <a:xfrm>
+          <a:off x="0" y="0"/>
+          <a:ext cx="0" cy="0"/>
+          <a:chOff x="0" y="0"/>
+          <a:chExt cx="0" cy="0"/>
+        </a:xfrm>
+      </p:grpSpPr>
+      <p:sp>
+        <p:nvSpPr>
+          <p:cNvPr id="2" name="Slide Image Placeholder 1"/>
+          <p:cNvSpPr>
+            <a:spLocks noGrp="1" noRot="1" noChangeAspect="1"/>
+          </p:cNvSpPr>
+          <p:nvPr>
+            <p:ph type="sldImg"/>
+          </p:nvPr>
+        </p:nvSpPr>
+        <p:spPr/>
+      </p:sp>
+      <p:sp>
+        <p:nvSpPr>
+          <p:cNvPr id="3" name="Notes Placeholder 2"/>
+          <p:cNvSpPr>
+            <a:spLocks noGrp="1"/>
+          </p:cNvSpPr>
+          <p:nvPr>
+            <p:ph type="body" idx="1"/>
+          </p:nvPr>
+        </p:nvSpPr>
+        <p:spPr/>
+        <p:txBody>
+          <a:bodyPr/>
+          <a:lstStyle/>
+          <a:p>
+            <a:endParaRPr lang="id-ID"/>
+          </a:p>
+        </p:txBody>
+      </p:sp>
+      <p:sp>
+        <p:nvSpPr>
+          <p:cNvPr id="4" name="Slide Number Placeholder 3"/>
+          <p:cNvSpPr>
+            <a:spLocks noGrp="1"/>
+          </p:cNvSpPr>
+          <p:nvPr>
+            <p:ph type="sldNum" sz="quarter" idx="10"/>
+          </p:nvPr>
+        </p:nvSpPr>
+        <p:spPr/>
+        <p:txBody>
+          <a:bodyPr/>
+          <a:lstStyle/>
+          <a:p>
+            <a:fld id="{388FB956-B54D-4835-9A6B-C1A6CD221AAA}" type="slidenum">
+              <a:rPr lang="id-ID" smtClean="0"/>
+              <a:t>1</a:t>
+            </a:fld>
+            <a:endParaRPr lang="id-ID"/>
+          </a:p>
+        </p:txBody>
+      </p:sp>
+    </p:spTree>
+    <p:extLst>
+      <p:ext uri="{BB962C8B-B14F-4D97-AF65-F5344CB8AC3E}">
+        <p14:creationId xmlns:p14="http://schemas.microsoft.com/office/powerpoint/2010/main" val="2027692805"/>
+      </p:ext>
+    </p:extLst>
+  </p:cSld>
+  <p:clrMapOvr>
+    <a:masterClrMapping/>
+  </p:clrMapOvr>
+</p:notes>
+</file>
+
+<file path=ppt/notesSlides/notesSlide2.xml><?xml version="1.0" encoding="utf-8"?>
+<p:notes xmlns:a="http://schemas.openxmlformats.org/drawingml/2006/main" xmlns:r="http://schemas.openxmlformats.org/officeDocument/2006/relationships" xmlns:p="http://schemas.openxmlformats.org/presentationml/2006/main">
+  <p:cSld>
+    <p:spTree>
+      <p:nvGrpSpPr>
+        <p:cNvPr id="1" name=""/>
+        <p:cNvGrpSpPr/>
+        <p:nvPr/>
+      </p:nvGrpSpPr>
+      <p:grpSpPr>
+        <a:xfrm>
+          <a:off x="0" y="0"/>
+          <a:ext cx="0" cy="0"/>
+          <a:chOff x="0" y="0"/>
+          <a:chExt cx="0" cy="0"/>
+        </a:xfrm>
+      </p:grpSpPr>
+      <p:sp>
+        <p:nvSpPr>
+          <p:cNvPr id="2" name="Slide Image Placeholder 1"/>
+          <p:cNvSpPr>
+            <a:spLocks noGrp="1" noRot="1" noChangeAspect="1"/>
+          </p:cNvSpPr>
+          <p:nvPr>
+            <p:ph type="sldImg"/>
+          </p:nvPr>
+        </p:nvSpPr>
+        <p:spPr/>
+      </p:sp>
+      <p:sp>
+        <p:nvSpPr>
+          <p:cNvPr id="3" name="Notes Placeholder 2"/>
+          <p:cNvSpPr>
+            <a:spLocks noGrp="1"/>
+          </p:cNvSpPr>
+          <p:nvPr>
+            <p:ph type="body" idx="1"/>
+          </p:nvPr>
+        </p:nvSpPr>
+        <p:spPr/>
+        <p:txBody>
+          <a:bodyPr/>
+          <a:lstStyle/>
+          <a:p>
+            <a:endParaRPr lang="id-ID"/>
+          </a:p>
+        </p:txBody>
+      </p:sp>
+      <p:sp>
+        <p:nvSpPr>
+          <p:cNvPr id="4" name="Slide Number Placeholder 3"/>
+          <p:cNvSpPr>
+            <a:spLocks noGrp="1"/>
+          </p:cNvSpPr>
+          <p:nvPr>
+            <p:ph type="sldNum" sz="quarter" idx="10"/>
+          </p:nvPr>
+        </p:nvSpPr>
+        <p:spPr/>
+        <p:txBody>
+          <a:bodyPr/>
+          <a:lstStyle/>
+          <a:p>
+            <a:fld id="{388FB956-B54D-4835-9A6B-C1A6CD221AAA}" type="slidenum">
+              <a:rPr lang="id-ID" smtClean="0"/>
+              <a:t>2</a:t>
+            </a:fld>
+            <a:endParaRPr lang="id-ID"/>
+          </a:p>
+        </p:txBody>
+      </p:sp>
+    </p:spTree>
+    <p:extLst>
+      <p:ext uri="{BB962C8B-B14F-4D97-AF65-F5344CB8AC3E}">
+        <p14:creationId xmlns:p14="http://schemas.microsoft.com/office/powerpoint/2010/main" val="1821867645"/>
+      </p:ext>
+    </p:extLst>
+  </p:cSld>
+  <p:clrMapOvr>
+    <a:masterClrMapping/>
+  </p:clrMapOvr>
+</p:notes>
+</file>
+
+<file path=ppt/notesSlides/notesSlide3.xml><?xml version="1.0" encoding="utf-8"?>
+<p:notes xmlns:a="http://schemas.openxmlformats.org/drawingml/2006/main" xmlns:r="http://schemas.openxmlformats.org/officeDocument/2006/relationships" xmlns:p="http://schemas.openxmlformats.org/presentationml/2006/main">
+  <p:cSld>
+    <p:spTree>
+      <p:nvGrpSpPr>
+        <p:cNvPr id="1" name=""/>
+        <p:cNvGrpSpPr/>
+        <p:nvPr/>
+      </p:nvGrpSpPr>
+      <p:grpSpPr>
+        <a:xfrm>
+          <a:off x="0" y="0"/>
+          <a:ext cx="0" cy="0"/>
+          <a:chOff x="0" y="0"/>
+          <a:chExt cx="0" cy="0"/>
+        </a:xfrm>
+      </p:grpSpPr>
+      <p:sp>
+        <p:nvSpPr>
+          <p:cNvPr id="2" name="Slide Image Placeholder 1"/>
+          <p:cNvSpPr>
+            <a:spLocks noGrp="1" noRot="1" noChangeAspect="1"/>
+          </p:cNvSpPr>
+          <p:nvPr>
+            <p:ph type="sldImg"/>
+          </p:nvPr>
+        </p:nvSpPr>
+        <p:spPr/>
+      </p:sp>
+      <p:sp>
+        <p:nvSpPr>
+          <p:cNvPr id="3" name="Notes Placeholder 2"/>
+          <p:cNvSpPr>
+            <a:spLocks noGrp="1"/>
+          </p:cNvSpPr>
+          <p:nvPr>
+            <p:ph type="body" idx="1"/>
+          </p:nvPr>
+        </p:nvSpPr>
+        <p:spPr/>
+        <p:txBody>
+          <a:bodyPr/>
+          <a:lstStyle/>
+          <a:p>
+            <a:endParaRPr lang="id-ID"/>
+          </a:p>
+        </p:txBody>
+      </p:sp>
+      <p:sp>
+        <p:nvSpPr>
+          <p:cNvPr id="4" name="Slide Number Placeholder 3"/>
+          <p:cNvSpPr>
+            <a:spLocks noGrp="1"/>
+          </p:cNvSpPr>
+          <p:nvPr>
+            <p:ph type="sldNum" sz="quarter" idx="10"/>
+          </p:nvPr>
+        </p:nvSpPr>
+        <p:spPr/>
+        <p:txBody>
+          <a:bodyPr/>
+          <a:lstStyle/>
+          <a:p>
+            <a:fld id="{388FB956-B54D-4835-9A6B-C1A6CD221AAA}" type="slidenum">
+              <a:rPr lang="id-ID" smtClean="0"/>
+              <a:t>3</a:t>
+            </a:fld>
+            <a:endParaRPr lang="id-ID"/>
+          </a:p>
+        </p:txBody>
+      </p:sp>
+    </p:spTree>
+    <p:extLst>
+      <p:ext uri="{BB962C8B-B14F-4D97-AF65-F5344CB8AC3E}">
+        <p14:creationId xmlns:p14="http://schemas.microsoft.com/office/powerpoint/2010/main" val="2674378154"/>
+      </p:ext>
+    </p:extLst>
+  </p:cSld>
+  <p:clrMapOvr>
+    <a:masterClrMapping/>
+  </p:clrMapOvr>
+</p:notes>
+</file>
+
+<file path=ppt/notesSlides/notesSlide4.xml><?xml version="1.0" encoding="utf-8"?>
+<p:notes xmlns:a="http://schemas.openxmlformats.org/drawingml/2006/main" xmlns:r="http://schemas.openxmlformats.org/officeDocument/2006/relationships" xmlns:p="http://schemas.openxmlformats.org/presentationml/2006/main">
+  <p:cSld>
+    <p:spTree>
+      <p:nvGrpSpPr>
+        <p:cNvPr id="1" name=""/>
+        <p:cNvGrpSpPr/>
+        <p:nvPr/>
+      </p:nvGrpSpPr>
+      <p:grpSpPr>
+        <a:xfrm>
+          <a:off x="0" y="0"/>
+          <a:ext cx="0" cy="0"/>
+          <a:chOff x="0" y="0"/>
+          <a:chExt cx="0" cy="0"/>
+        </a:xfrm>
+      </p:grpSpPr>
+      <p:sp>
+        <p:nvSpPr>
+          <p:cNvPr id="2" name="Slide Image Placeholder 1"/>
+          <p:cNvSpPr>
+            <a:spLocks noGrp="1" noRot="1" noChangeAspect="1"/>
+          </p:cNvSpPr>
+          <p:nvPr>
+            <p:ph type="sldImg"/>
+          </p:nvPr>
+        </p:nvSpPr>
+        <p:spPr/>
+      </p:sp>
+      <p:sp>
+        <p:nvSpPr>
+          <p:cNvPr id="3" name="Notes Placeholder 2"/>
+          <p:cNvSpPr>
+            <a:spLocks noGrp="1"/>
+          </p:cNvSpPr>
+          <p:nvPr>
+            <p:ph type="body" idx="1"/>
+          </p:nvPr>
+        </p:nvSpPr>
+        <p:spPr/>
+        <p:txBody>
+          <a:bodyPr/>
+          <a:lstStyle/>
+          <a:p>
+            <a:endParaRPr lang="id-ID"/>
+          </a:p>
+        </p:txBody>
+      </p:sp>
+      <p:sp>
+        <p:nvSpPr>
+          <p:cNvPr id="4" name="Slide Number Placeholder 3"/>
+          <p:cNvSpPr>
+            <a:spLocks noGrp="1"/>
+          </p:cNvSpPr>
+          <p:nvPr>
+            <p:ph type="sldNum" sz="quarter" idx="10"/>
+          </p:nvPr>
+        </p:nvSpPr>
+        <p:spPr/>
+        <p:txBody>
+          <a:bodyPr/>
+          <a:lstStyle/>
+          <a:p>
+            <a:fld id="{388FB956-B54D-4835-9A6B-C1A6CD221AAA}" type="slidenum">
+              <a:rPr lang="id-ID" smtClean="0"/>
+              <a:t>4</a:t>
+            </a:fld>
+            <a:endParaRPr lang="id-ID"/>
+          </a:p>
+        </p:txBody>
+      </p:sp>
+    </p:spTree>
+    <p:extLst>
+      <p:ext uri="{BB962C8B-B14F-4D97-AF65-F5344CB8AC3E}">
+        <p14:creationId xmlns:p14="http://schemas.microsoft.com/office/powerpoint/2010/main" val="3847500523"/>
+      </p:ext>
+    </p:extLst>
+  </p:cSld>
+  <p:clrMapOvr>
+    <a:masterClrMapping/>
+  </p:clrMapOvr>
+</p:notes>
+</file>
+
+<file path=ppt/notesSlides/notesSlide5.xml><?xml version="1.0" encoding="utf-8"?>
+<p:notes xmlns:a="http://schemas.openxmlformats.org/drawingml/2006/main" xmlns:r="http://schemas.openxmlformats.org/officeDocument/2006/relationships" xmlns:p="http://schemas.openxmlformats.org/presentationml/2006/main">
+  <p:cSld>
+    <p:spTree>
+      <p:nvGrpSpPr>
+        <p:cNvPr id="1" name=""/>
+        <p:cNvGrpSpPr/>
+        <p:nvPr/>
+      </p:nvGrpSpPr>
+      <p:grpSpPr>
+        <a:xfrm>
+          <a:off x="0" y="0"/>
+          <a:ext cx="0" cy="0"/>
+          <a:chOff x="0" y="0"/>
+          <a:chExt cx="0" cy="0"/>
+        </a:xfrm>
+      </p:grpSpPr>
+      <p:sp>
+        <p:nvSpPr>
+          <p:cNvPr id="2" name="Slide Image Placeholder 1"/>
+          <p:cNvSpPr>
+            <a:spLocks noGrp="1" noRot="1" noChangeAspect="1"/>
+          </p:cNvSpPr>
+          <p:nvPr>
+            <p:ph type="sldImg"/>
+          </p:nvPr>
+        </p:nvSpPr>
+        <p:spPr/>
+      </p:sp>
+      <p:sp>
+        <p:nvSpPr>
+          <p:cNvPr id="3" name="Notes Placeholder 2"/>
+          <p:cNvSpPr>
+            <a:spLocks noGrp="1"/>
+          </p:cNvSpPr>
+          <p:nvPr>
+            <p:ph type="body" idx="1"/>
+          </p:nvPr>
+        </p:nvSpPr>
+        <p:spPr/>
+        <p:txBody>
+          <a:bodyPr/>
+          <a:lstStyle/>
+          <a:p>
+            <a:endParaRPr lang="id-ID"/>
+          </a:p>
+        </p:txBody>
+      </p:sp>
+      <p:sp>
+        <p:nvSpPr>
+          <p:cNvPr id="4" name="Slide Number Placeholder 3"/>
+          <p:cNvSpPr>
+            <a:spLocks noGrp="1"/>
+          </p:cNvSpPr>
+          <p:nvPr>
+            <p:ph type="sldNum" sz="quarter" idx="10"/>
+          </p:nvPr>
+        </p:nvSpPr>
+        <p:spPr/>
+        <p:txBody>
+          <a:bodyPr/>
+          <a:lstStyle/>
+          <a:p>
+            <a:fld id="{388FB956-B54D-4835-9A6B-C1A6CD221AAA}" type="slidenum">
+              <a:rPr lang="id-ID" smtClean="0"/>
+              <a:t>5</a:t>
+            </a:fld>
+            <a:endParaRPr lang="id-ID"/>
+          </a:p>
+        </p:txBody>
+      </p:sp>
+    </p:spTree>
+    <p:extLst>
+      <p:ext uri="{BB962C8B-B14F-4D97-AF65-F5344CB8AC3E}">
+        <p14:creationId xmlns:p14="http://schemas.microsoft.com/office/powerpoint/2010/main" val="165047914"/>
+      </p:ext>
+    </p:extLst>
+  </p:cSld>
+  <p:clrMapOvr>
+    <a:masterClrMapping/>
+  </p:clrMapOvr>
+</p:notes>
+</file>
+
+<file path=ppt/notesSlides/notesSlide6.xml><?xml version="1.0" encoding="utf-8"?>
+<p:notes xmlns:a="http://schemas.openxmlformats.org/drawingml/2006/main" xmlns:r="http://schemas.openxmlformats.org/officeDocument/2006/relationships" xmlns:p="http://schemas.openxmlformats.org/presentationml/2006/main">
+  <p:cSld>
+    <p:spTree>
+      <p:nvGrpSpPr>
+        <p:cNvPr id="1" name=""/>
+        <p:cNvGrpSpPr/>
+        <p:nvPr/>
+      </p:nvGrpSpPr>
+      <p:grpSpPr>
+        <a:xfrm>
+          <a:off x="0" y="0"/>
+          <a:ext cx="0" cy="0"/>
+          <a:chOff x="0" y="0"/>
+          <a:chExt cx="0" cy="0"/>
+        </a:xfrm>
+      </p:grpSpPr>
+      <p:sp>
+        <p:nvSpPr>
+          <p:cNvPr id="2" name="Slide Image Placeholder 1"/>
+          <p:cNvSpPr>
+            <a:spLocks noGrp="1" noRot="1" noChangeAspect="1"/>
+          </p:cNvSpPr>
+          <p:nvPr>
+            <p:ph type="sldImg"/>
+          </p:nvPr>
+        </p:nvSpPr>
+        <p:spPr/>
+      </p:sp>
+      <p:sp>
+        <p:nvSpPr>
+          <p:cNvPr id="3" name="Notes Placeholder 2"/>
+          <p:cNvSpPr>
+            <a:spLocks noGrp="1"/>
+          </p:cNvSpPr>
+          <p:nvPr>
+            <p:ph type="body" idx="1"/>
+          </p:nvPr>
+        </p:nvSpPr>
+        <p:spPr/>
+        <p:txBody>
+          <a:bodyPr/>
+          <a:lstStyle/>
+          <a:p>
+            <a:endParaRPr lang="id-ID"/>
+          </a:p>
+        </p:txBody>
+      </p:sp>
+      <p:sp>
+        <p:nvSpPr>
+          <p:cNvPr id="4" name="Slide Number Placeholder 3"/>
+          <p:cNvSpPr>
+            <a:spLocks noGrp="1"/>
+          </p:cNvSpPr>
+          <p:nvPr>
+            <p:ph type="sldNum" sz="quarter" idx="10"/>
+          </p:nvPr>
+        </p:nvSpPr>
+        <p:spPr/>
+        <p:txBody>
+          <a:bodyPr/>
+          <a:lstStyle/>
+          <a:p>
+            <a:fld id="{388FB956-B54D-4835-9A6B-C1A6CD221AAA}" type="slidenum">
+              <a:rPr lang="id-ID" smtClean="0"/>
+              <a:t>6</a:t>
+            </a:fld>
+            <a:endParaRPr lang="id-ID"/>
+          </a:p>
+        </p:txBody>
+      </p:sp>
+    </p:spTree>
+    <p:extLst>
+      <p:ext uri="{BB962C8B-B14F-4D97-AF65-F5344CB8AC3E}">
+        <p14:creationId xmlns:p14="http://schemas.microsoft.com/office/powerpoint/2010/main" val="4258406369"/>
+      </p:ext>
+    </p:extLst>
+  </p:cSld>
+  <p:clrMapOvr>
+    <a:masterClrMapping/>
+  </p:clrMapOvr>
+</p:notes>
+</file>
+
+<file path=ppt/notesSlides/notesSlide7.xml><?xml version="1.0" encoding="utf-8"?>
+<p:notes xmlns:a="http://schemas.openxmlformats.org/drawingml/2006/main" xmlns:r="http://schemas.openxmlformats.org/officeDocument/2006/relationships" xmlns:p="http://schemas.openxmlformats.org/presentationml/2006/main">
+  <p:cSld>
+    <p:spTree>
+      <p:nvGrpSpPr>
+        <p:cNvPr id="1" name=""/>
+        <p:cNvGrpSpPr/>
+        <p:nvPr/>
+      </p:nvGrpSpPr>
+      <p:grpSpPr>
+        <a:xfrm>
+          <a:off x="0" y="0"/>
+          <a:ext cx="0" cy="0"/>
+          <a:chOff x="0" y="0"/>
+          <a:chExt cx="0" cy="0"/>
+        </a:xfrm>
+      </p:grpSpPr>
+      <p:sp>
+        <p:nvSpPr>
+          <p:cNvPr id="2" name="Slide Image Placeholder 1"/>
+          <p:cNvSpPr>
+            <a:spLocks noGrp="1" noRot="1" noChangeAspect="1"/>
+          </p:cNvSpPr>
+          <p:nvPr>
+            <p:ph type="sldImg"/>
+          </p:nvPr>
+        </p:nvSpPr>
+        <p:spPr/>
+      </p:sp>
+      <p:sp>
+        <p:nvSpPr>
+          <p:cNvPr id="3" name="Notes Placeholder 2"/>
+          <p:cNvSpPr>
+            <a:spLocks noGrp="1"/>
+          </p:cNvSpPr>
+          <p:nvPr>
+            <p:ph type="body" idx="1"/>
+          </p:nvPr>
+        </p:nvSpPr>
+        <p:spPr/>
+        <p:txBody>
+          <a:bodyPr/>
+          <a:lstStyle/>
+          <a:p>
+            <a:endParaRPr lang="id-ID"/>
+          </a:p>
+        </p:txBody>
+      </p:sp>
+      <p:sp>
+        <p:nvSpPr>
+          <p:cNvPr id="4" name="Slide Number Placeholder 3"/>
+          <p:cNvSpPr>
+            <a:spLocks noGrp="1"/>
+          </p:cNvSpPr>
+          <p:nvPr>
+            <p:ph type="sldNum" sz="quarter" idx="10"/>
+          </p:nvPr>
+        </p:nvSpPr>
+        <p:spPr/>
+        <p:txBody>
+          <a:bodyPr/>
+          <a:lstStyle/>
+          <a:p>
+            <a:fld id="{388FB956-B54D-4835-9A6B-C1A6CD221AAA}" type="slidenum">
+              <a:rPr lang="id-ID" smtClean="0"/>
+              <a:t>7</a:t>
+            </a:fld>
+            <a:endParaRPr lang="id-ID"/>
+          </a:p>
+        </p:txBody>
+      </p:sp>
+    </p:spTree>
+    <p:extLst>
+      <p:ext uri="{BB962C8B-B14F-4D97-AF65-F5344CB8AC3E}">
+        <p14:creationId xmlns:p14="http://schemas.microsoft.com/office/powerpoint/2010/main" val="911361843"/>
+      </p:ext>
+    </p:extLst>
+  </p:cSld>
+  <p:clrMapOvr>
+    <a:masterClrMapping/>
+  </p:clrMapOvr>
+</p:notes>
+</file>
+
 <file path=ppt/slideLayouts/slideLayout1.xml><?xml version="1.0" encoding="utf-8"?>
 <p:sldLayout xmlns:a="http://schemas.openxmlformats.org/drawingml/2006/main" xmlns:r="http://schemas.openxmlformats.org/officeDocument/2006/relationships" xmlns:p="http://schemas.openxmlformats.org/presentationml/2006/main" showMasterSp="0" type="title" preserve="1">
   <p:cSld name="Title Slide">
@@ -533,7 +1642,7 @@
           <a:p>
             <a:fld id="{3CDF5237-F705-4D5E-906A-DC4C67CD4E04}" type="datetimeFigureOut">
               <a:rPr lang="id-ID" smtClean="0"/>
-              <a:t>14/11/2016</a:t>
+              <a:t>15/11/2016</a:t>
             </a:fld>
             <a:endParaRPr lang="id-ID"/>
           </a:p>
@@ -839,7 +1948,7 @@
           <a:p>
             <a:fld id="{3CDF5237-F705-4D5E-906A-DC4C67CD4E04}" type="datetimeFigureOut">
               <a:rPr lang="id-ID" smtClean="0"/>
-              <a:t>14/11/2016</a:t>
+              <a:t>15/11/2016</a:t>
             </a:fld>
             <a:endParaRPr lang="id-ID"/>
           </a:p>
@@ -1128,7 +2237,7 @@
           <a:p>
             <a:fld id="{3CDF5237-F705-4D5E-906A-DC4C67CD4E04}" type="datetimeFigureOut">
               <a:rPr lang="id-ID" smtClean="0"/>
-              <a:t>14/11/2016</a:t>
+              <a:t>15/11/2016</a:t>
             </a:fld>
             <a:endParaRPr lang="id-ID"/>
           </a:p>
@@ -1686,7 +2795,7 @@
           <a:p>
             <a:fld id="{3CDF5237-F705-4D5E-906A-DC4C67CD4E04}" type="datetimeFigureOut">
               <a:rPr lang="id-ID" smtClean="0"/>
-              <a:t>14/11/2016</a:t>
+              <a:t>15/11/2016</a:t>
             </a:fld>
             <a:endParaRPr lang="id-ID"/>
           </a:p>
@@ -1958,7 +3067,7 @@
           <a:p>
             <a:fld id="{3CDF5237-F705-4D5E-906A-DC4C67CD4E04}" type="datetimeFigureOut">
               <a:rPr lang="id-ID" smtClean="0"/>
-              <a:t>14/11/2016</a:t>
+              <a:t>15/11/2016</a:t>
             </a:fld>
             <a:endParaRPr lang="id-ID"/>
           </a:p>
@@ -2190,7 +3299,7 @@
           <a:p>
             <a:fld id="{3CDF5237-F705-4D5E-906A-DC4C67CD4E04}" type="datetimeFigureOut">
               <a:rPr lang="id-ID" smtClean="0"/>
-              <a:t>14/11/2016</a:t>
+              <a:t>15/11/2016</a:t>
             </a:fld>
             <a:endParaRPr lang="id-ID"/>
           </a:p>
@@ -2998,7 +4107,7 @@
           <a:p>
             <a:fld id="{3CDF5237-F705-4D5E-906A-DC4C67CD4E04}" type="datetimeFigureOut">
               <a:rPr lang="id-ID" smtClean="0"/>
-              <a:t>14/11/2016</a:t>
+              <a:t>15/11/2016</a:t>
             </a:fld>
             <a:endParaRPr lang="id-ID"/>
           </a:p>
@@ -3411,7 +4520,7 @@
           <a:p>
             <a:fld id="{3CDF5237-F705-4D5E-906A-DC4C67CD4E04}" type="datetimeFigureOut">
               <a:rPr lang="id-ID" smtClean="0"/>
-              <a:t>14/11/2016</a:t>
+              <a:t>15/11/2016</a:t>
             </a:fld>
             <a:endParaRPr lang="id-ID"/>
           </a:p>
@@ -3571,7 +4680,7 @@
           <a:p>
             <a:fld id="{3CDF5237-F705-4D5E-906A-DC4C67CD4E04}" type="datetimeFigureOut">
               <a:rPr lang="id-ID" smtClean="0"/>
-              <a:t>14/11/2016</a:t>
+              <a:t>15/11/2016</a:t>
             </a:fld>
             <a:endParaRPr lang="id-ID"/>
           </a:p>
@@ -3722,7 +4831,7 @@
           <a:p>
             <a:fld id="{3CDF5237-F705-4D5E-906A-DC4C67CD4E04}" type="datetimeFigureOut">
               <a:rPr lang="id-ID" smtClean="0"/>
-              <a:t>14/11/2016</a:t>
+              <a:t>15/11/2016</a:t>
             </a:fld>
             <a:endParaRPr lang="id-ID"/>
           </a:p>
@@ -3843,7 +4952,7 @@
           <a:p>
             <a:fld id="{3CDF5237-F705-4D5E-906A-DC4C67CD4E04}" type="datetimeFigureOut">
               <a:rPr lang="id-ID" smtClean="0"/>
-              <a:t>14/11/2016</a:t>
+              <a:t>15/11/2016</a:t>
             </a:fld>
             <a:endParaRPr lang="id-ID"/>
           </a:p>
@@ -4186,7 +5295,7 @@
           <a:p>
             <a:fld id="{3CDF5237-F705-4D5E-906A-DC4C67CD4E04}" type="datetimeFigureOut">
               <a:rPr lang="id-ID" smtClean="0"/>
-              <a:t>14/11/2016</a:t>
+              <a:t>15/11/2016</a:t>
             </a:fld>
             <a:endParaRPr lang="id-ID"/>
           </a:p>
@@ -5114,7 +6223,7 @@
         <p:spPr/>
         <p:txBody>
           <a:bodyPr>
-            <a:normAutofit/>
+            <a:noAutofit/>
           </a:bodyPr>
           <a:lstStyle/>
           <a:p>
@@ -5122,7 +6231,11 @@
               <a:buNone/>
             </a:pPr>
             <a:r>
-              <a:rPr lang="id-ID" sz="1600" dirty="0"/>
+              <a:rPr lang="id-ID" sz="1600" dirty="0">
+                <a:solidFill>
+                  <a:schemeClr val="tx2"/>
+                </a:solidFill>
+              </a:rPr>
               <a:t>Perusahaan yang kami dirikan merupakan suatu perusahaan berbasis IT yang memberikan jasa layanan sewa router berbasis cloud. Tidak hanya itu, kami juga berupaya memaksimalkan produktivitas pelanggan kami dengan menyediakan layanan cloud hosting ataupun dedicated server yang dapat digabungkan dengan produk RouterMaya kami.</a:t>
             </a:r>
           </a:p>
@@ -5131,7 +6244,11 @@
               <a:buNone/>
             </a:pPr>
             <a:r>
-              <a:rPr lang="id-ID" sz="1600" dirty="0"/>
+              <a:rPr lang="id-ID" sz="1600" dirty="0">
+                <a:solidFill>
+                  <a:schemeClr val="tx2"/>
+                </a:solidFill>
+              </a:rPr>
               <a:t>Perusahaan kami sudah berdiri hampir lima tahun dan tetap dapat berdiri kokoh hingga saat ini berkat sejumlah kenangan yang pahit dan manis di masa lampau. Perusahaan kami dulunya bernama DeHostGeek, merupakan cikal bakal lahirnya perusahaan RouterMaya ini. Perusahaan ini belum mengadopsi layanan virtual router pada mulanya, tetapi hanya fokus pada bisnis conventional hosting dan virtual private server. Saat itu kita juga sedang mengalami kekurangan peminat akibat munculnya pesaing-pesaing baru yang berani memberikan harga lebih murah ketimbang harga rata-rata di pasar. Oleh sebab itu, kami para founder dan para manager perusahaan melakukan meeting tertutup untuk membahas masa depan perusahaan ini. Akhirnya, kami memutuskan untuk tetap melanjutkan mimpi perusahaan ini dengan mengubah sedikit pandangan perusahaan, yakni yang sebelumnya lebih fokus dengan conventional hosting dan VPS, sekarang menjadi lebih fokus terhadap teknologi masa depan, cloud technology. Dan sejak itulah layanan RouterMaya kami pun berhasil direalisasikan.</a:t>
             </a:r>
           </a:p>
@@ -5139,7 +6256,11 @@
             <a:pPr marL="0" indent="0">
               <a:buNone/>
             </a:pPr>
-            <a:endParaRPr lang="id-ID" sz="1400" dirty="0"/>
+            <a:endParaRPr lang="id-ID" sz="1400" dirty="0">
+              <a:solidFill>
+                <a:schemeClr val="tx2"/>
+              </a:solidFill>
+            </a:endParaRPr>
           </a:p>
         </p:txBody>
       </p:sp>
@@ -5219,7 +6340,7 @@
           </p:nvPr>
         </p:nvPicPr>
         <p:blipFill>
-          <a:blip r:embed="rId2">
+          <a:blip r:embed="rId3">
             <a:extLst>
               <a:ext uri="{28A0092B-C50C-407E-A947-70E740481C1C}">
                 <a14:useLocalDpi xmlns:a14="http://schemas.microsoft.com/office/drawing/2010/main" val="0"/>
@@ -5331,7 +6452,7 @@
           <p:nvPr/>
         </p:nvPicPr>
         <p:blipFill>
-          <a:blip r:embed="rId3">
+          <a:blip r:embed="rId4">
             <a:extLst>
               <a:ext uri="{28A0092B-C50C-407E-A947-70E740481C1C}">
                 <a14:useLocalDpi xmlns:a14="http://schemas.microsoft.com/office/drawing/2010/main" val="0"/>
@@ -5446,7 +6567,7 @@
           <p:nvPr/>
         </p:nvPicPr>
         <p:blipFill>
-          <a:blip r:embed="rId4">
+          <a:blip r:embed="rId5">
             <a:extLst>
               <a:ext uri="{28A0092B-C50C-407E-A947-70E740481C1C}">
                 <a14:useLocalDpi xmlns:a14="http://schemas.microsoft.com/office/drawing/2010/main" val="0"/>
@@ -5561,7 +6682,7 @@
           <p:nvPr/>
         </p:nvPicPr>
         <p:blipFill>
-          <a:blip r:embed="rId5">
+          <a:blip r:embed="rId6">
             <a:extLst>
               <a:ext uri="{28A0092B-C50C-407E-A947-70E740481C1C}">
                 <a14:useLocalDpi xmlns:a14="http://schemas.microsoft.com/office/drawing/2010/main" val="0"/>
@@ -5676,7 +6797,7 @@
           <p:nvPr/>
         </p:nvPicPr>
         <p:blipFill>
-          <a:blip r:embed="rId6">
+          <a:blip r:embed="rId7">
             <a:extLst>
               <a:ext uri="{28A0092B-C50C-407E-A947-70E740481C1C}">
                 <a14:useLocalDpi xmlns:a14="http://schemas.microsoft.com/office/drawing/2010/main" val="0"/>
@@ -6082,7 +7203,7 @@
           <p:nvPr/>
         </p:nvPicPr>
         <p:blipFill>
-          <a:blip r:embed="rId2">
+          <a:blip r:embed="rId3">
             <a:extLst>
               <a:ext uri="{28A0092B-C50C-407E-A947-70E740481C1C}">
                 <a14:useLocalDpi xmlns:a14="http://schemas.microsoft.com/office/drawing/2010/main" val="0"/>
@@ -6258,7 +7379,7 @@
           <p:nvPr/>
         </p:nvPicPr>
         <p:blipFill>
-          <a:blip r:embed="rId3">
+          <a:blip r:embed="rId4">
             <a:extLst>
               <a:ext uri="{28A0092B-C50C-407E-A947-70E740481C1C}">
                 <a14:useLocalDpi xmlns:a14="http://schemas.microsoft.com/office/drawing/2010/main" val="0"/>
@@ -6458,7 +7579,7 @@
           <p:nvPr/>
         </p:nvPicPr>
         <p:blipFill>
-          <a:blip r:embed="rId4">
+          <a:blip r:embed="rId5">
             <a:extLst>
               <a:ext uri="{28A0092B-C50C-407E-A947-70E740481C1C}">
                 <a14:useLocalDpi xmlns:a14="http://schemas.microsoft.com/office/drawing/2010/main" val="0"/>
@@ -6723,7 +7844,7 @@
           <p:nvPr/>
         </p:nvPicPr>
         <p:blipFill>
-          <a:blip r:embed="rId2">
+          <a:blip r:embed="rId3">
             <a:extLst>
               <a:ext uri="{28A0092B-C50C-407E-A947-70E740481C1C}">
                 <a14:useLocalDpi xmlns:a14="http://schemas.microsoft.com/office/drawing/2010/main" val="0"/>
@@ -6923,7 +8044,7 @@
           <p:nvPr/>
         </p:nvPicPr>
         <p:blipFill>
-          <a:blip r:embed="rId3">
+          <a:blip r:embed="rId4">
             <a:extLst>
               <a:ext uri="{28A0092B-C50C-407E-A947-70E740481C1C}">
                 <a14:useLocalDpi xmlns:a14="http://schemas.microsoft.com/office/drawing/2010/main" val="0"/>
@@ -7246,4 +8367,526 @@
     </a:ext>
   </a:extLst>
 </a:theme>
+</file>
+
+<file path=ppt/theme/theme2.xml><?xml version="1.0" encoding="utf-8"?>
+<a:theme xmlns:a="http://schemas.openxmlformats.org/drawingml/2006/main" name="Office Theme">
+  <a:themeElements>
+    <a:clrScheme name="Office">
+      <a:dk1>
+        <a:sysClr val="windowText" lastClr="000000"/>
+      </a:dk1>
+      <a:lt1>
+        <a:sysClr val="window" lastClr="FFFFFF"/>
+      </a:lt1>
+      <a:dk2>
+        <a:srgbClr val="44546A"/>
+      </a:dk2>
+      <a:lt2>
+        <a:srgbClr val="E7E6E6"/>
+      </a:lt2>
+      <a:accent1>
+        <a:srgbClr val="5B9BD5"/>
+      </a:accent1>
+      <a:accent2>
+        <a:srgbClr val="ED7D31"/>
+      </a:accent2>
+      <a:accent3>
+        <a:srgbClr val="A5A5A5"/>
+      </a:accent3>
+      <a:accent4>
+        <a:srgbClr val="FFC000"/>
+      </a:accent4>
+      <a:accent5>
+        <a:srgbClr val="4472C4"/>
+      </a:accent5>
+      <a:accent6>
+        <a:srgbClr val="70AD47"/>
+      </a:accent6>
+      <a:hlink>
+        <a:srgbClr val="0563C1"/>
+      </a:hlink>
+      <a:folHlink>
+        <a:srgbClr val="954F72"/>
+      </a:folHlink>
+    </a:clrScheme>
+    <a:fontScheme name="Office">
+      <a:majorFont>
+        <a:latin typeface="Calibri Light" panose="020F0302020204030204"/>
+        <a:ea typeface=""/>
+        <a:cs typeface=""/>
+        <a:font script="Jpan" typeface="游ゴシック Light"/>
+        <a:font script="Hang" typeface="맑은 고딕"/>
+        <a:font script="Hans" typeface="等线 Light"/>
+        <a:font script="Hant" typeface="新細明體"/>
+        <a:font script="Arab" typeface="Times New Roman"/>
+        <a:font script="Hebr" typeface="Times New Roman"/>
+        <a:font script="Thai" typeface="Angsana New"/>
+        <a:font script="Ethi" typeface="Nyala"/>
+        <a:font script="Beng" typeface="Vrinda"/>
+        <a:font script="Gujr" typeface="Shruti"/>
+        <a:font script="Khmr" typeface="MoolBoran"/>
+        <a:font script="Knda" typeface="Tunga"/>
+        <a:font script="Guru" typeface="Raavi"/>
+        <a:font script="Cans" typeface="Euphemia"/>
+        <a:font script="Cher" typeface="Plantagenet Cherokee"/>
+        <a:font script="Yiii" typeface="Microsoft Yi Baiti"/>
+        <a:font script="Tibt" typeface="Microsoft Himalaya"/>
+        <a:font script="Thaa" typeface="MV Boli"/>
+        <a:font script="Deva" typeface="Mangal"/>
+        <a:font script="Telu" typeface="Gautami"/>
+        <a:font script="Taml" typeface="Latha"/>
+        <a:font script="Syrc" typeface="Estrangelo Edessa"/>
+        <a:font script="Orya" typeface="Kalinga"/>
+        <a:font script="Mlym" typeface="Kartika"/>
+        <a:font script="Laoo" typeface="DokChampa"/>
+        <a:font script="Sinh" typeface="Iskoola Pota"/>
+        <a:font script="Mong" typeface="Mongolian Baiti"/>
+        <a:font script="Viet" typeface="Times New Roman"/>
+        <a:font script="Uigh" typeface="Microsoft Uighur"/>
+        <a:font script="Geor" typeface="Sylfaen"/>
+      </a:majorFont>
+      <a:minorFont>
+        <a:latin typeface="Calibri" panose="020F0502020204030204"/>
+        <a:ea typeface=""/>
+        <a:cs typeface=""/>
+        <a:font script="Jpan" typeface="游ゴシック"/>
+        <a:font script="Hang" typeface="맑은 고딕"/>
+        <a:font script="Hans" typeface="等线"/>
+        <a:font script="Hant" typeface="新細明體"/>
+        <a:font script="Arab" typeface="Arial"/>
+        <a:font script="Hebr" typeface="Arial"/>
+        <a:font script="Thai" typeface="Cordia New"/>
+        <a:font script="Ethi" typeface="Nyala"/>
+        <a:font script="Beng" typeface="Vrinda"/>
+        <a:font script="Gujr" typeface="Shruti"/>
+        <a:font script="Khmr" typeface="DaunPenh"/>
+        <a:font script="Knda" typeface="Tunga"/>
+        <a:font script="Guru" typeface="Raavi"/>
+        <a:font script="Cans" typeface="Euphemia"/>
+        <a:font script="Cher" typeface="Plantagenet Cherokee"/>
+        <a:font script="Yiii" typeface="Microsoft Yi Baiti"/>
+        <a:font script="Tibt" typeface="Microsoft Himalaya"/>
+        <a:font script="Thaa" typeface="MV Boli"/>
+        <a:font script="Deva" typeface="Mangal"/>
+        <a:font script="Telu" typeface="Gautami"/>
+        <a:font script="Taml" typeface="Latha"/>
+        <a:font script="Syrc" typeface="Estrangelo Edessa"/>
+        <a:font script="Orya" typeface="Kalinga"/>
+        <a:font script="Mlym" typeface="Kartika"/>
+        <a:font script="Laoo" typeface="DokChampa"/>
+        <a:font script="Sinh" typeface="Iskoola Pota"/>
+        <a:font script="Mong" typeface="Mongolian Baiti"/>
+        <a:font script="Viet" typeface="Arial"/>
+        <a:font script="Uigh" typeface="Microsoft Uighur"/>
+        <a:font script="Geor" typeface="Sylfaen"/>
+      </a:minorFont>
+    </a:fontScheme>
+    <a:fmtScheme name="Office">
+      <a:fillStyleLst>
+        <a:solidFill>
+          <a:schemeClr val="phClr"/>
+        </a:solidFill>
+        <a:gradFill rotWithShape="1">
+          <a:gsLst>
+            <a:gs pos="0">
+              <a:schemeClr val="phClr">
+                <a:lumMod val="110000"/>
+                <a:satMod val="105000"/>
+                <a:tint val="67000"/>
+              </a:schemeClr>
+            </a:gs>
+            <a:gs pos="50000">
+              <a:schemeClr val="phClr">
+                <a:lumMod val="105000"/>
+                <a:satMod val="103000"/>
+                <a:tint val="73000"/>
+              </a:schemeClr>
+            </a:gs>
+            <a:gs pos="100000">
+              <a:schemeClr val="phClr">
+                <a:lumMod val="105000"/>
+                <a:satMod val="109000"/>
+                <a:tint val="81000"/>
+              </a:schemeClr>
+            </a:gs>
+          </a:gsLst>
+          <a:lin ang="5400000" scaled="0"/>
+        </a:gradFill>
+        <a:gradFill rotWithShape="1">
+          <a:gsLst>
+            <a:gs pos="0">
+              <a:schemeClr val="phClr">
+                <a:satMod val="103000"/>
+                <a:lumMod val="102000"/>
+                <a:tint val="94000"/>
+              </a:schemeClr>
+            </a:gs>
+            <a:gs pos="50000">
+              <a:schemeClr val="phClr">
+                <a:satMod val="110000"/>
+                <a:lumMod val="100000"/>
+                <a:shade val="100000"/>
+              </a:schemeClr>
+            </a:gs>
+            <a:gs pos="100000">
+              <a:schemeClr val="phClr">
+                <a:lumMod val="99000"/>
+                <a:satMod val="120000"/>
+                <a:shade val="78000"/>
+              </a:schemeClr>
+            </a:gs>
+          </a:gsLst>
+          <a:lin ang="5400000" scaled="0"/>
+        </a:gradFill>
+      </a:fillStyleLst>
+      <a:lnStyleLst>
+        <a:ln w="6350" cap="flat" cmpd="sng" algn="ctr">
+          <a:solidFill>
+            <a:schemeClr val="phClr"/>
+          </a:solidFill>
+          <a:prstDash val="solid"/>
+          <a:miter lim="800000"/>
+        </a:ln>
+        <a:ln w="12700" cap="flat" cmpd="sng" algn="ctr">
+          <a:solidFill>
+            <a:schemeClr val="phClr"/>
+          </a:solidFill>
+          <a:prstDash val="solid"/>
+          <a:miter lim="800000"/>
+        </a:ln>
+        <a:ln w="19050" cap="flat" cmpd="sng" algn="ctr">
+          <a:solidFill>
+            <a:schemeClr val="phClr"/>
+          </a:solidFill>
+          <a:prstDash val="solid"/>
+          <a:miter lim="800000"/>
+        </a:ln>
+      </a:lnStyleLst>
+      <a:effectStyleLst>
+        <a:effectStyle>
+          <a:effectLst/>
+        </a:effectStyle>
+        <a:effectStyle>
+          <a:effectLst/>
+        </a:effectStyle>
+        <a:effectStyle>
+          <a:effectLst>
+            <a:outerShdw blurRad="57150" dist="19050" dir="5400000" algn="ctr" rotWithShape="0">
+              <a:srgbClr val="000000">
+                <a:alpha val="63000"/>
+              </a:srgbClr>
+            </a:outerShdw>
+          </a:effectLst>
+        </a:effectStyle>
+      </a:effectStyleLst>
+      <a:bgFillStyleLst>
+        <a:solidFill>
+          <a:schemeClr val="phClr"/>
+        </a:solidFill>
+        <a:solidFill>
+          <a:schemeClr val="phClr">
+            <a:tint val="95000"/>
+            <a:satMod val="170000"/>
+          </a:schemeClr>
+        </a:solidFill>
+        <a:gradFill rotWithShape="1">
+          <a:gsLst>
+            <a:gs pos="0">
+              <a:schemeClr val="phClr">
+                <a:tint val="93000"/>
+                <a:satMod val="150000"/>
+                <a:shade val="98000"/>
+                <a:lumMod val="102000"/>
+              </a:schemeClr>
+            </a:gs>
+            <a:gs pos="50000">
+              <a:schemeClr val="phClr">
+                <a:tint val="98000"/>
+                <a:satMod val="130000"/>
+                <a:shade val="90000"/>
+                <a:lumMod val="103000"/>
+              </a:schemeClr>
+            </a:gs>
+            <a:gs pos="100000">
+              <a:schemeClr val="phClr">
+                <a:shade val="63000"/>
+                <a:satMod val="120000"/>
+              </a:schemeClr>
+            </a:gs>
+          </a:gsLst>
+          <a:lin ang="5400000" scaled="0"/>
+        </a:gradFill>
+      </a:bgFillStyleLst>
+    </a:fmtScheme>
+  </a:themeElements>
+  <a:objectDefaults/>
+  <a:extraClrSchemeLst/>
+  <a:extLst>
+    <a:ext uri="{05A4C25C-085E-4340-85A3-A5531E510DB2}">
+      <thm15:themeFamily xmlns:thm15="http://schemas.microsoft.com/office/thememl/2012/main" name="Office Theme" id="{62F939B6-93AF-4DB8-9C6B-D6C7DFDC589F}" vid="{4A3C46E8-61CC-4603-A589-7422A47A8E4A}"/>
+    </a:ext>
+  </a:extLst>
+</a:theme>
+</file>
+
+<file path=ppt/theme/theme3.xml><?xml version="1.0" encoding="utf-8"?>
+<a:theme xmlns:a="http://schemas.openxmlformats.org/drawingml/2006/main" name="Office Theme">
+  <a:themeElements>
+    <a:clrScheme name="Office">
+      <a:dk1>
+        <a:sysClr val="windowText" lastClr="000000"/>
+      </a:dk1>
+      <a:lt1>
+        <a:sysClr val="window" lastClr="FFFFFF"/>
+      </a:lt1>
+      <a:dk2>
+        <a:srgbClr val="44546A"/>
+      </a:dk2>
+      <a:lt2>
+        <a:srgbClr val="E7E6E6"/>
+      </a:lt2>
+      <a:accent1>
+        <a:srgbClr val="5B9BD5"/>
+      </a:accent1>
+      <a:accent2>
+        <a:srgbClr val="ED7D31"/>
+      </a:accent2>
+      <a:accent3>
+        <a:srgbClr val="A5A5A5"/>
+      </a:accent3>
+      <a:accent4>
+        <a:srgbClr val="FFC000"/>
+      </a:accent4>
+      <a:accent5>
+        <a:srgbClr val="4472C4"/>
+      </a:accent5>
+      <a:accent6>
+        <a:srgbClr val="70AD47"/>
+      </a:accent6>
+      <a:hlink>
+        <a:srgbClr val="0563C1"/>
+      </a:hlink>
+      <a:folHlink>
+        <a:srgbClr val="954F72"/>
+      </a:folHlink>
+    </a:clrScheme>
+    <a:fontScheme name="Office">
+      <a:majorFont>
+        <a:latin typeface="Calibri Light" panose="020F0302020204030204"/>
+        <a:ea typeface=""/>
+        <a:cs typeface=""/>
+        <a:font script="Jpan" typeface="游ゴシック Light"/>
+        <a:font script="Hang" typeface="맑은 고딕"/>
+        <a:font script="Hans" typeface="等线 Light"/>
+        <a:font script="Hant" typeface="新細明體"/>
+        <a:font script="Arab" typeface="Times New Roman"/>
+        <a:font script="Hebr" typeface="Times New Roman"/>
+        <a:font script="Thai" typeface="Angsana New"/>
+        <a:font script="Ethi" typeface="Nyala"/>
+        <a:font script="Beng" typeface="Vrinda"/>
+        <a:font script="Gujr" typeface="Shruti"/>
+        <a:font script="Khmr" typeface="MoolBoran"/>
+        <a:font script="Knda" typeface="Tunga"/>
+        <a:font script="Guru" typeface="Raavi"/>
+        <a:font script="Cans" typeface="Euphemia"/>
+        <a:font script="Cher" typeface="Plantagenet Cherokee"/>
+        <a:font script="Yiii" typeface="Microsoft Yi Baiti"/>
+        <a:font script="Tibt" typeface="Microsoft Himalaya"/>
+        <a:font script="Thaa" typeface="MV Boli"/>
+        <a:font script="Deva" typeface="Mangal"/>
+        <a:font script="Telu" typeface="Gautami"/>
+        <a:font script="Taml" typeface="Latha"/>
+        <a:font script="Syrc" typeface="Estrangelo Edessa"/>
+        <a:font script="Orya" typeface="Kalinga"/>
+        <a:font script="Mlym" typeface="Kartika"/>
+        <a:font script="Laoo" typeface="DokChampa"/>
+        <a:font script="Sinh" typeface="Iskoola Pota"/>
+        <a:font script="Mong" typeface="Mongolian Baiti"/>
+        <a:font script="Viet" typeface="Times New Roman"/>
+        <a:font script="Uigh" typeface="Microsoft Uighur"/>
+        <a:font script="Geor" typeface="Sylfaen"/>
+      </a:majorFont>
+      <a:minorFont>
+        <a:latin typeface="Calibri" panose="020F0502020204030204"/>
+        <a:ea typeface=""/>
+        <a:cs typeface=""/>
+        <a:font script="Jpan" typeface="游ゴシック"/>
+        <a:font script="Hang" typeface="맑은 고딕"/>
+        <a:font script="Hans" typeface="等线"/>
+        <a:font script="Hant" typeface="新細明體"/>
+        <a:font script="Arab" typeface="Arial"/>
+        <a:font script="Hebr" typeface="Arial"/>
+        <a:font script="Thai" typeface="Cordia New"/>
+        <a:font script="Ethi" typeface="Nyala"/>
+        <a:font script="Beng" typeface="Vrinda"/>
+        <a:font script="Gujr" typeface="Shruti"/>
+        <a:font script="Khmr" typeface="DaunPenh"/>
+        <a:font script="Knda" typeface="Tunga"/>
+        <a:font script="Guru" typeface="Raavi"/>
+        <a:font script="Cans" typeface="Euphemia"/>
+        <a:font script="Cher" typeface="Plantagenet Cherokee"/>
+        <a:font script="Yiii" typeface="Microsoft Yi Baiti"/>
+        <a:font script="Tibt" typeface="Microsoft Himalaya"/>
+        <a:font script="Thaa" typeface="MV Boli"/>
+        <a:font script="Deva" typeface="Mangal"/>
+        <a:font script="Telu" typeface="Gautami"/>
+        <a:font script="Taml" typeface="Latha"/>
+        <a:font script="Syrc" typeface="Estrangelo Edessa"/>
+        <a:font script="Orya" typeface="Kalinga"/>
+        <a:font script="Mlym" typeface="Kartika"/>
+        <a:font script="Laoo" typeface="DokChampa"/>
+        <a:font script="Sinh" typeface="Iskoola Pota"/>
+        <a:font script="Mong" typeface="Mongolian Baiti"/>
+        <a:font script="Viet" typeface="Arial"/>
+        <a:font script="Uigh" typeface="Microsoft Uighur"/>
+        <a:font script="Geor" typeface="Sylfaen"/>
+      </a:minorFont>
+    </a:fontScheme>
+    <a:fmtScheme name="Office">
+      <a:fillStyleLst>
+        <a:solidFill>
+          <a:schemeClr val="phClr"/>
+        </a:solidFill>
+        <a:gradFill rotWithShape="1">
+          <a:gsLst>
+            <a:gs pos="0">
+              <a:schemeClr val="phClr">
+                <a:lumMod val="110000"/>
+                <a:satMod val="105000"/>
+                <a:tint val="67000"/>
+              </a:schemeClr>
+            </a:gs>
+            <a:gs pos="50000">
+              <a:schemeClr val="phClr">
+                <a:lumMod val="105000"/>
+                <a:satMod val="103000"/>
+                <a:tint val="73000"/>
+              </a:schemeClr>
+            </a:gs>
+            <a:gs pos="100000">
+              <a:schemeClr val="phClr">
+                <a:lumMod val="105000"/>
+                <a:satMod val="109000"/>
+                <a:tint val="81000"/>
+              </a:schemeClr>
+            </a:gs>
+          </a:gsLst>
+          <a:lin ang="5400000" scaled="0"/>
+        </a:gradFill>
+        <a:gradFill rotWithShape="1">
+          <a:gsLst>
+            <a:gs pos="0">
+              <a:schemeClr val="phClr">
+                <a:satMod val="103000"/>
+                <a:lumMod val="102000"/>
+                <a:tint val="94000"/>
+              </a:schemeClr>
+            </a:gs>
+            <a:gs pos="50000">
+              <a:schemeClr val="phClr">
+                <a:satMod val="110000"/>
+                <a:lumMod val="100000"/>
+                <a:shade val="100000"/>
+              </a:schemeClr>
+            </a:gs>
+            <a:gs pos="100000">
+              <a:schemeClr val="phClr">
+                <a:lumMod val="99000"/>
+                <a:satMod val="120000"/>
+                <a:shade val="78000"/>
+              </a:schemeClr>
+            </a:gs>
+          </a:gsLst>
+          <a:lin ang="5400000" scaled="0"/>
+        </a:gradFill>
+      </a:fillStyleLst>
+      <a:lnStyleLst>
+        <a:ln w="6350" cap="flat" cmpd="sng" algn="ctr">
+          <a:solidFill>
+            <a:schemeClr val="phClr"/>
+          </a:solidFill>
+          <a:prstDash val="solid"/>
+          <a:miter lim="800000"/>
+        </a:ln>
+        <a:ln w="12700" cap="flat" cmpd="sng" algn="ctr">
+          <a:solidFill>
+            <a:schemeClr val="phClr"/>
+          </a:solidFill>
+          <a:prstDash val="solid"/>
+          <a:miter lim="800000"/>
+        </a:ln>
+        <a:ln w="19050" cap="flat" cmpd="sng" algn="ctr">
+          <a:solidFill>
+            <a:schemeClr val="phClr"/>
+          </a:solidFill>
+          <a:prstDash val="solid"/>
+          <a:miter lim="800000"/>
+        </a:ln>
+      </a:lnStyleLst>
+      <a:effectStyleLst>
+        <a:effectStyle>
+          <a:effectLst/>
+        </a:effectStyle>
+        <a:effectStyle>
+          <a:effectLst/>
+        </a:effectStyle>
+        <a:effectStyle>
+          <a:effectLst>
+            <a:outerShdw blurRad="57150" dist="19050" dir="5400000" algn="ctr" rotWithShape="0">
+              <a:srgbClr val="000000">
+                <a:alpha val="63000"/>
+              </a:srgbClr>
+            </a:outerShdw>
+          </a:effectLst>
+        </a:effectStyle>
+      </a:effectStyleLst>
+      <a:bgFillStyleLst>
+        <a:solidFill>
+          <a:schemeClr val="phClr"/>
+        </a:solidFill>
+        <a:solidFill>
+          <a:schemeClr val="phClr">
+            <a:tint val="95000"/>
+            <a:satMod val="170000"/>
+          </a:schemeClr>
+        </a:solidFill>
+        <a:gradFill rotWithShape="1">
+          <a:gsLst>
+            <a:gs pos="0">
+              <a:schemeClr val="phClr">
+                <a:tint val="93000"/>
+                <a:satMod val="150000"/>
+                <a:shade val="98000"/>
+                <a:lumMod val="102000"/>
+              </a:schemeClr>
+            </a:gs>
+            <a:gs pos="50000">
+              <a:schemeClr val="phClr">
+                <a:tint val="98000"/>
+                <a:satMod val="130000"/>
+                <a:shade val="90000"/>
+                <a:lumMod val="103000"/>
+              </a:schemeClr>
+            </a:gs>
+            <a:gs pos="100000">
+              <a:schemeClr val="phClr">
+                <a:shade val="63000"/>
+                <a:satMod val="120000"/>
+              </a:schemeClr>
+            </a:gs>
+          </a:gsLst>
+          <a:lin ang="5400000" scaled="0"/>
+        </a:gradFill>
+      </a:bgFillStyleLst>
+    </a:fmtScheme>
+  </a:themeElements>
+  <a:objectDefaults/>
+  <a:extraClrSchemeLst/>
+  <a:extLst>
+    <a:ext uri="{05A4C25C-085E-4340-85A3-A5531E510DB2}">
+      <thm15:themeFamily xmlns:thm15="http://schemas.microsoft.com/office/thememl/2012/main" name="Office Theme" id="{62F939B6-93AF-4DB8-9C6B-D6C7DFDC589F}" vid="{4A3C46E8-61CC-4603-A589-7422A47A8E4A}"/>
+    </a:ext>
+  </a:extLst>
+</a:theme>
 </file>
</xml_diff>

<commit_message>
#20161115 -> Change document structure and content
</commit_message>
<xml_diff>
--- a/PPT/Business Plan MID.pptx
+++ b/PPT/Business Plan MID.pptx
@@ -5,19 +5,22 @@
     <p:sldMasterId id="2147483660" r:id="rId1"/>
   </p:sldMasterIdLst>
   <p:notesMasterIdLst>
-    <p:notesMasterId r:id="rId9"/>
+    <p:notesMasterId r:id="rId12"/>
   </p:notesMasterIdLst>
   <p:handoutMasterIdLst>
-    <p:handoutMasterId r:id="rId10"/>
+    <p:handoutMasterId r:id="rId13"/>
   </p:handoutMasterIdLst>
   <p:sldIdLst>
     <p:sldId id="256" r:id="rId2"/>
     <p:sldId id="258" r:id="rId3"/>
     <p:sldId id="257" r:id="rId4"/>
     <p:sldId id="259" r:id="rId5"/>
-    <p:sldId id="260" r:id="rId6"/>
-    <p:sldId id="261" r:id="rId7"/>
-    <p:sldId id="262" r:id="rId8"/>
+    <p:sldId id="264" r:id="rId6"/>
+    <p:sldId id="260" r:id="rId7"/>
+    <p:sldId id="261" r:id="rId8"/>
+    <p:sldId id="262" r:id="rId9"/>
+    <p:sldId id="263" r:id="rId10"/>
+    <p:sldId id="265" r:id="rId11"/>
   </p:sldIdLst>
   <p:sldSz cx="12192000" cy="6858000"/>
   <p:notesSz cx="6858000" cy="9144000"/>
@@ -119,6 +122,9 @@
   <p:extLst>
     <p:ext uri="{EFAFB233-063F-42B5-8137-9DF3F51BA10A}">
       <p15:sldGuideLst xmlns:p15="http://schemas.microsoft.com/office/powerpoint/2012/main"/>
+    </p:ext>
+    <p:ext uri="{2D200454-40CA-4A62-9FC3-DE9A4176ACB9}">
+      <p15:notesGuideLst xmlns:p15="http://schemas.microsoft.com/office/powerpoint/2012/main"/>
     </p:ext>
   </p:extLst>
 </p:presentation>
@@ -1040,7 +1046,7 @@
           <a:p>
             <a:fld id="{388FB956-B54D-4835-9A6B-C1A6CD221AAA}" type="slidenum">
               <a:rPr lang="id-ID" smtClean="0"/>
-              <a:t>5</a:t>
+              <a:t>6</a:t>
             </a:fld>
             <a:endParaRPr lang="id-ID"/>
           </a:p>
@@ -1124,7 +1130,7 @@
           <a:p>
             <a:fld id="{388FB956-B54D-4835-9A6B-C1A6CD221AAA}" type="slidenum">
               <a:rPr lang="id-ID" smtClean="0"/>
-              <a:t>6</a:t>
+              <a:t>7</a:t>
             </a:fld>
             <a:endParaRPr lang="id-ID"/>
           </a:p>
@@ -1208,7 +1214,7 @@
           <a:p>
             <a:fld id="{388FB956-B54D-4835-9A6B-C1A6CD221AAA}" type="slidenum">
               <a:rPr lang="id-ID" smtClean="0"/>
-              <a:t>7</a:t>
+              <a:t>8</a:t>
             </a:fld>
             <a:endParaRPr lang="id-ID"/>
           </a:p>
@@ -5810,6 +5816,612 @@
 </p:sld>
 </file>
 
+<file path=ppt/slides/slide10.xml><?xml version="1.0" encoding="utf-8"?>
+<p:sld xmlns:a="http://schemas.openxmlformats.org/drawingml/2006/main" xmlns:r="http://schemas.openxmlformats.org/officeDocument/2006/relationships" xmlns:p="http://schemas.openxmlformats.org/presentationml/2006/main">
+  <p:cSld>
+    <p:spTree>
+      <p:nvGrpSpPr>
+        <p:cNvPr id="1" name=""/>
+        <p:cNvGrpSpPr/>
+        <p:nvPr/>
+      </p:nvGrpSpPr>
+      <p:grpSpPr>
+        <a:xfrm>
+          <a:off x="0" y="0"/>
+          <a:ext cx="0" cy="0"/>
+          <a:chOff x="0" y="0"/>
+          <a:chExt cx="0" cy="0"/>
+        </a:xfrm>
+      </p:grpSpPr>
+      <p:sp>
+        <p:nvSpPr>
+          <p:cNvPr id="2" name="Title 1"/>
+          <p:cNvSpPr>
+            <a:spLocks noGrp="1"/>
+          </p:cNvSpPr>
+          <p:nvPr>
+            <p:ph type="title"/>
+          </p:nvPr>
+        </p:nvSpPr>
+        <p:spPr/>
+        <p:txBody>
+          <a:bodyPr/>
+          <a:lstStyle/>
+          <a:p>
+            <a:r>
+              <a:rPr lang="id-ID" dirty="0"/>
+              <a:t>Team</a:t>
+            </a:r>
+            <a:r>
+              <a:rPr lang="en-US" dirty="0"/>
+              <a:t> – </a:t>
+            </a:r>
+            <a:r>
+              <a:rPr lang="en-US" dirty="0" smtClean="0"/>
+              <a:t>Organization Structure</a:t>
+            </a:r>
+            <a:endParaRPr lang="id-ID" dirty="0"/>
+          </a:p>
+        </p:txBody>
+      </p:sp>
+      <p:sp>
+        <p:nvSpPr>
+          <p:cNvPr id="3" name="Content Placeholder 2"/>
+          <p:cNvSpPr>
+            <a:spLocks noGrp="1"/>
+          </p:cNvSpPr>
+          <p:nvPr>
+            <p:ph idx="1"/>
+          </p:nvPr>
+        </p:nvSpPr>
+        <p:spPr/>
+        <p:txBody>
+          <a:bodyPr/>
+          <a:lstStyle/>
+          <a:p>
+            <a:pPr marL="0" indent="0">
+              <a:buNone/>
+            </a:pPr>
+            <a:r>
+              <a:rPr lang="en-US" b="1" dirty="0">
+                <a:solidFill>
+                  <a:schemeClr val="accent3"/>
+                </a:solidFill>
+              </a:rPr>
+              <a:t>Marketing Division</a:t>
+            </a:r>
+            <a:endParaRPr lang="id-ID" dirty="0">
+              <a:solidFill>
+                <a:schemeClr val="accent3"/>
+              </a:solidFill>
+            </a:endParaRPr>
+          </a:p>
+          <a:p>
+            <a:pPr marL="0" indent="0">
+              <a:buNone/>
+            </a:pPr>
+            <a:r>
+              <a:rPr lang="en-US" dirty="0" err="1"/>
+              <a:t>Bertanggung</a:t>
+            </a:r>
+            <a:r>
+              <a:rPr lang="en-US" dirty="0"/>
+              <a:t> </a:t>
+            </a:r>
+            <a:r>
+              <a:rPr lang="en-US" dirty="0" err="1"/>
+              <a:t>jawab</a:t>
+            </a:r>
+            <a:r>
+              <a:rPr lang="en-US" dirty="0"/>
+              <a:t> </a:t>
+            </a:r>
+            <a:r>
+              <a:rPr lang="en-US" dirty="0" err="1"/>
+              <a:t>dalam</a:t>
+            </a:r>
+            <a:r>
+              <a:rPr lang="en-US" dirty="0"/>
+              <a:t> </a:t>
+            </a:r>
+            <a:r>
+              <a:rPr lang="en-US" dirty="0" err="1"/>
+              <a:t>memberikan</a:t>
+            </a:r>
+            <a:r>
+              <a:rPr lang="en-US" dirty="0"/>
+              <a:t> surprise </a:t>
+            </a:r>
+            <a:r>
+              <a:rPr lang="en-US" dirty="0" err="1"/>
+              <a:t>kepada</a:t>
+            </a:r>
+            <a:r>
+              <a:rPr lang="en-US" dirty="0"/>
+              <a:t> </a:t>
+            </a:r>
+            <a:r>
+              <a:rPr lang="en-US" dirty="0" err="1"/>
+              <a:t>calon</a:t>
+            </a:r>
+            <a:r>
+              <a:rPr lang="en-US" dirty="0"/>
+              <a:t> </a:t>
+            </a:r>
+            <a:r>
+              <a:rPr lang="en-US" dirty="0" err="1"/>
+              <a:t>pelanggan</a:t>
+            </a:r>
+            <a:r>
+              <a:rPr lang="en-US" dirty="0"/>
+              <a:t> agar </a:t>
+            </a:r>
+            <a:r>
+              <a:rPr lang="en-US" dirty="0" err="1"/>
+              <a:t>mau</a:t>
+            </a:r>
+            <a:r>
+              <a:rPr lang="en-US" dirty="0"/>
+              <a:t> </a:t>
+            </a:r>
+            <a:r>
+              <a:rPr lang="en-US" dirty="0" err="1"/>
+              <a:t>berlangganan</a:t>
+            </a:r>
+            <a:r>
+              <a:rPr lang="en-US" dirty="0"/>
+              <a:t> </a:t>
+            </a:r>
+            <a:r>
+              <a:rPr lang="en-US" dirty="0" err="1"/>
+              <a:t>dengan</a:t>
+            </a:r>
+            <a:r>
+              <a:rPr lang="en-US" dirty="0"/>
+              <a:t> </a:t>
+            </a:r>
+            <a:r>
+              <a:rPr lang="en-US" dirty="0" err="1"/>
+              <a:t>layanan</a:t>
+            </a:r>
+            <a:r>
+              <a:rPr lang="en-US" dirty="0"/>
+              <a:t> yang kami </a:t>
+            </a:r>
+            <a:r>
+              <a:rPr lang="en-US" dirty="0" err="1"/>
+              <a:t>tawarkan</a:t>
+            </a:r>
+            <a:r>
+              <a:rPr lang="en-US" dirty="0"/>
+              <a:t>, </a:t>
+            </a:r>
+            <a:r>
+              <a:rPr lang="en-US" dirty="0" err="1"/>
+              <a:t>begitu</a:t>
+            </a:r>
+            <a:r>
+              <a:rPr lang="en-US" dirty="0"/>
+              <a:t> juga </a:t>
+            </a:r>
+            <a:r>
+              <a:rPr lang="en-US" dirty="0" err="1"/>
+              <a:t>dengan</a:t>
+            </a:r>
+            <a:r>
+              <a:rPr lang="en-US" dirty="0"/>
+              <a:t> </a:t>
+            </a:r>
+            <a:r>
+              <a:rPr lang="en-US" dirty="0" err="1"/>
+              <a:t>pelanggan</a:t>
+            </a:r>
+            <a:r>
+              <a:rPr lang="en-US" dirty="0"/>
+              <a:t> lama agar </a:t>
+            </a:r>
+            <a:r>
+              <a:rPr lang="en-US" dirty="0" err="1"/>
+              <a:t>pelanggan</a:t>
+            </a:r>
+            <a:r>
+              <a:rPr lang="en-US" dirty="0"/>
+              <a:t> lama </a:t>
+            </a:r>
+            <a:r>
+              <a:rPr lang="en-US" dirty="0" err="1"/>
+              <a:t>tetap</a:t>
+            </a:r>
+            <a:r>
+              <a:rPr lang="en-US" dirty="0"/>
+              <a:t> </a:t>
+            </a:r>
+            <a:r>
+              <a:rPr lang="en-US" dirty="0" err="1"/>
+              <a:t>setia</a:t>
+            </a:r>
+            <a:r>
+              <a:rPr lang="en-US" dirty="0"/>
+              <a:t> </a:t>
+            </a:r>
+            <a:r>
+              <a:rPr lang="en-US" dirty="0" err="1"/>
+              <a:t>dengan</a:t>
+            </a:r>
+            <a:r>
+              <a:rPr lang="en-US" dirty="0"/>
+              <a:t> </a:t>
+            </a:r>
+            <a:r>
+              <a:rPr lang="en-US" dirty="0" err="1"/>
+              <a:t>layanan</a:t>
+            </a:r>
+            <a:r>
+              <a:rPr lang="en-US" dirty="0"/>
+              <a:t> yang kami </a:t>
+            </a:r>
+            <a:r>
+              <a:rPr lang="en-US" dirty="0" err="1"/>
+              <a:t>berikan</a:t>
+            </a:r>
+            <a:r>
+              <a:rPr lang="en-US" dirty="0"/>
+              <a:t>.</a:t>
+            </a:r>
+            <a:endParaRPr lang="id-ID" dirty="0"/>
+          </a:p>
+          <a:p>
+            <a:pPr marL="0" indent="0">
+              <a:buNone/>
+            </a:pPr>
+            <a:r>
+              <a:rPr lang="en-US" b="1" dirty="0">
+                <a:solidFill>
+                  <a:srgbClr val="C00000"/>
+                </a:solidFill>
+              </a:rPr>
+              <a:t>Software Development Center</a:t>
+            </a:r>
+            <a:endParaRPr lang="id-ID" dirty="0">
+              <a:solidFill>
+                <a:srgbClr val="C00000"/>
+              </a:solidFill>
+            </a:endParaRPr>
+          </a:p>
+          <a:p>
+            <a:pPr marL="0" indent="0">
+              <a:buNone/>
+            </a:pPr>
+            <a:r>
+              <a:rPr lang="en-US" dirty="0" err="1"/>
+              <a:t>Divisi</a:t>
+            </a:r>
+            <a:r>
+              <a:rPr lang="en-US" dirty="0"/>
+              <a:t> </a:t>
+            </a:r>
+            <a:r>
+              <a:rPr lang="en-US" dirty="0" err="1"/>
+              <a:t>ini</a:t>
+            </a:r>
+            <a:r>
+              <a:rPr lang="en-US" dirty="0"/>
+              <a:t> </a:t>
+            </a:r>
+            <a:r>
+              <a:rPr lang="en-US" dirty="0" err="1"/>
+              <a:t>bertugas</a:t>
+            </a:r>
+            <a:r>
+              <a:rPr lang="en-US" dirty="0"/>
+              <a:t> </a:t>
+            </a:r>
+            <a:r>
+              <a:rPr lang="en-US" dirty="0" err="1"/>
+              <a:t>untuk</a:t>
+            </a:r>
+            <a:r>
+              <a:rPr lang="en-US" dirty="0"/>
+              <a:t> </a:t>
+            </a:r>
+            <a:r>
+              <a:rPr lang="en-US" dirty="0" err="1"/>
+              <a:t>memberikan</a:t>
+            </a:r>
+            <a:r>
+              <a:rPr lang="en-US" dirty="0"/>
+              <a:t> </a:t>
+            </a:r>
+            <a:r>
+              <a:rPr lang="en-US" dirty="0" err="1"/>
+              <a:t>fitur-fitur</a:t>
+            </a:r>
+            <a:r>
+              <a:rPr lang="en-US" dirty="0"/>
+              <a:t> </a:t>
+            </a:r>
+            <a:r>
+              <a:rPr lang="en-US" dirty="0" err="1"/>
+              <a:t>baru</a:t>
+            </a:r>
+            <a:r>
+              <a:rPr lang="en-US" dirty="0"/>
+              <a:t> </a:t>
+            </a:r>
+            <a:r>
+              <a:rPr lang="en-US" dirty="0" err="1"/>
+              <a:t>kepada</a:t>
+            </a:r>
+            <a:r>
+              <a:rPr lang="en-US" dirty="0"/>
+              <a:t> </a:t>
+            </a:r>
+            <a:r>
+              <a:rPr lang="en-US" dirty="0" err="1"/>
+              <a:t>aplikasi</a:t>
+            </a:r>
+            <a:r>
+              <a:rPr lang="en-US" dirty="0"/>
+              <a:t> yang </a:t>
+            </a:r>
+            <a:r>
+              <a:rPr lang="en-US" dirty="0" err="1"/>
+              <a:t>sudah</a:t>
+            </a:r>
+            <a:r>
+              <a:rPr lang="en-US" dirty="0"/>
+              <a:t> </a:t>
+            </a:r>
+            <a:r>
+              <a:rPr lang="en-US" dirty="0" err="1"/>
+              <a:t>ada</a:t>
+            </a:r>
+            <a:r>
+              <a:rPr lang="en-US" dirty="0"/>
+              <a:t>, </a:t>
+            </a:r>
+            <a:r>
+              <a:rPr lang="en-US" dirty="0" err="1"/>
+              <a:t>seperti</a:t>
+            </a:r>
+            <a:r>
+              <a:rPr lang="en-US" dirty="0"/>
+              <a:t> </a:t>
+            </a:r>
+            <a:r>
+              <a:rPr lang="en-US" dirty="0" err="1"/>
+              <a:t>penambahan</a:t>
+            </a:r>
+            <a:r>
+              <a:rPr lang="en-US" dirty="0"/>
+              <a:t> </a:t>
+            </a:r>
+            <a:r>
+              <a:rPr lang="en-US" dirty="0" err="1"/>
+              <a:t>fitur</a:t>
+            </a:r>
+            <a:r>
+              <a:rPr lang="en-US" dirty="0"/>
+              <a:t> di portal web </a:t>
+            </a:r>
+            <a:r>
+              <a:rPr lang="en-US" dirty="0" err="1"/>
+              <a:t>pelanggan</a:t>
+            </a:r>
+            <a:r>
+              <a:rPr lang="en-US" dirty="0"/>
+              <a:t>. </a:t>
+            </a:r>
+            <a:r>
+              <a:rPr lang="en-US" dirty="0" err="1"/>
+              <a:t>Bukan</a:t>
+            </a:r>
+            <a:r>
+              <a:rPr lang="en-US" dirty="0"/>
+              <a:t> </a:t>
+            </a:r>
+            <a:r>
+              <a:rPr lang="en-US" dirty="0" err="1"/>
+              <a:t>hanya</a:t>
+            </a:r>
+            <a:r>
+              <a:rPr lang="en-US" dirty="0"/>
+              <a:t> </a:t>
+            </a:r>
+            <a:r>
+              <a:rPr lang="en-US" dirty="0" err="1"/>
+              <a:t>itu</a:t>
+            </a:r>
+            <a:r>
+              <a:rPr lang="en-US" dirty="0"/>
+              <a:t>, </a:t>
+            </a:r>
+            <a:r>
+              <a:rPr lang="en-US" dirty="0" err="1"/>
+              <a:t>divisi</a:t>
+            </a:r>
+            <a:r>
+              <a:rPr lang="en-US" dirty="0"/>
+              <a:t> </a:t>
+            </a:r>
+            <a:r>
+              <a:rPr lang="en-US" dirty="0" err="1"/>
+              <a:t>ini</a:t>
+            </a:r>
+            <a:r>
+              <a:rPr lang="en-US" dirty="0"/>
+              <a:t> juga </a:t>
+            </a:r>
+            <a:r>
+              <a:rPr lang="en-US" dirty="0" err="1"/>
+              <a:t>bertugas</a:t>
+            </a:r>
+            <a:r>
+              <a:rPr lang="en-US" dirty="0"/>
+              <a:t> </a:t>
+            </a:r>
+            <a:r>
+              <a:rPr lang="en-US" dirty="0" err="1"/>
+              <a:t>untuk</a:t>
+            </a:r>
+            <a:r>
+              <a:rPr lang="en-US" dirty="0"/>
+              <a:t> me-manage, </a:t>
+            </a:r>
+            <a:r>
+              <a:rPr lang="en-US" dirty="0" err="1"/>
+              <a:t>menjamin</a:t>
+            </a:r>
+            <a:r>
+              <a:rPr lang="en-US" dirty="0"/>
+              <a:t> </a:t>
+            </a:r>
+            <a:r>
+              <a:rPr lang="en-US" dirty="0" err="1"/>
+              <a:t>aplikasi</a:t>
+            </a:r>
+            <a:r>
+              <a:rPr lang="en-US" dirty="0"/>
+              <a:t> </a:t>
+            </a:r>
+            <a:r>
+              <a:rPr lang="en-US" dirty="0" err="1"/>
+              <a:t>bebas</a:t>
+            </a:r>
+            <a:r>
+              <a:rPr lang="en-US" dirty="0"/>
+              <a:t> </a:t>
+            </a:r>
+            <a:r>
+              <a:rPr lang="en-US" dirty="0" err="1"/>
+              <a:t>dari</a:t>
+            </a:r>
+            <a:r>
+              <a:rPr lang="en-US" dirty="0"/>
+              <a:t> </a:t>
+            </a:r>
+            <a:r>
+              <a:rPr lang="en-US" dirty="0" err="1"/>
+              <a:t>suatu</a:t>
+            </a:r>
+            <a:r>
+              <a:rPr lang="en-US" dirty="0"/>
+              <a:t> vulnerability, </a:t>
+            </a:r>
+            <a:r>
+              <a:rPr lang="en-US" dirty="0" err="1"/>
+              <a:t>dan</a:t>
+            </a:r>
+            <a:r>
+              <a:rPr lang="en-US" dirty="0"/>
+              <a:t> </a:t>
+            </a:r>
+            <a:r>
+              <a:rPr lang="en-US" dirty="0" err="1"/>
+              <a:t>mengindentifikasi</a:t>
+            </a:r>
+            <a:r>
+              <a:rPr lang="en-US" dirty="0"/>
+              <a:t> bug/vulnerability </a:t>
+            </a:r>
+            <a:r>
+              <a:rPr lang="en-US" dirty="0" err="1"/>
+              <a:t>itu</a:t>
+            </a:r>
+            <a:r>
+              <a:rPr lang="en-US" dirty="0"/>
+              <a:t> </a:t>
+            </a:r>
+            <a:r>
+              <a:rPr lang="en-US" dirty="0" err="1"/>
+              <a:t>sebelum</a:t>
+            </a:r>
+            <a:r>
+              <a:rPr lang="en-US" dirty="0"/>
+              <a:t> </a:t>
+            </a:r>
+            <a:r>
+              <a:rPr lang="en-US" dirty="0" err="1"/>
+              <a:t>aplikasi</a:t>
+            </a:r>
+            <a:r>
+              <a:rPr lang="en-US" dirty="0"/>
+              <a:t> </a:t>
+            </a:r>
+            <a:r>
+              <a:rPr lang="en-US" dirty="0" err="1"/>
+              <a:t>itu</a:t>
+            </a:r>
+            <a:r>
+              <a:rPr lang="en-US" dirty="0"/>
+              <a:t> </a:t>
+            </a:r>
+            <a:r>
+              <a:rPr lang="en-US" dirty="0" err="1"/>
+              <a:t>masuk</a:t>
+            </a:r>
+            <a:r>
+              <a:rPr lang="en-US" dirty="0"/>
+              <a:t> </a:t>
+            </a:r>
+            <a:r>
+              <a:rPr lang="en-US" dirty="0" err="1"/>
+              <a:t>tahap</a:t>
+            </a:r>
+            <a:r>
+              <a:rPr lang="en-US" dirty="0"/>
+              <a:t> production/</a:t>
+            </a:r>
+            <a:r>
+              <a:rPr lang="en-US" dirty="0" err="1"/>
+              <a:t>implementasi</a:t>
+            </a:r>
+            <a:r>
+              <a:rPr lang="en-US" dirty="0"/>
+              <a:t>.</a:t>
+            </a:r>
+            <a:endParaRPr lang="id-ID" dirty="0"/>
+          </a:p>
+          <a:p>
+            <a:pPr marL="0" indent="0">
+              <a:buNone/>
+            </a:pPr>
+            <a:r>
+              <a:rPr lang="en-US" dirty="0"/>
+              <a:t/>
+            </a:r>
+            <a:br>
+              <a:rPr lang="en-US" dirty="0"/>
+            </a:br>
+            <a:endParaRPr lang="id-ID" dirty="0"/>
+          </a:p>
+        </p:txBody>
+      </p:sp>
+    </p:spTree>
+    <p:extLst>
+      <p:ext uri="{BB962C8B-B14F-4D97-AF65-F5344CB8AC3E}">
+        <p14:creationId xmlns:p14="http://schemas.microsoft.com/office/powerpoint/2010/main" val="2917499755"/>
+      </p:ext>
+    </p:extLst>
+  </p:cSld>
+  <p:clrMapOvr>
+    <a:masterClrMapping/>
+  </p:clrMapOvr>
+  <mc:AlternateContent xmlns:mc="http://schemas.openxmlformats.org/markup-compatibility/2006" xmlns:p14="http://schemas.microsoft.com/office/powerpoint/2010/main">
+    <mc:Choice Requires="p14">
+      <p:transition spd="med" p14:dur="700">
+        <p:fade/>
+      </p:transition>
+    </mc:Choice>
+    <mc:Fallback xmlns="">
+      <p:transition spd="med">
+        <p:fade/>
+      </p:transition>
+    </mc:Fallback>
+  </mc:AlternateContent>
+</p:sld>
+</file>
+
 <file path=ppt/slides/slide2.xml><?xml version="1.0" encoding="utf-8"?>
 <p:sld xmlns:a="http://schemas.openxmlformats.org/drawingml/2006/main" xmlns:r="http://schemas.openxmlformats.org/officeDocument/2006/relationships" xmlns:p="http://schemas.openxmlformats.org/presentationml/2006/main">
   <p:cSld>
@@ -5935,8 +6547,8 @@
           <a:lstStyle/>
           <a:p>
             <a:r>
-              <a:rPr lang="id-ID" dirty="0" smtClean="0"/>
-              <a:t>Ringkasan Eksekutif</a:t>
+              <a:rPr lang="en-US" dirty="0" smtClean="0"/>
+              <a:t>Executive Summary</a:t>
             </a:r>
             <a:endParaRPr lang="id-ID" dirty="0"/>
           </a:p>
@@ -6011,7 +6623,39 @@
                   <a:schemeClr val="tx2"/>
                 </a:solidFill>
               </a:rPr>
-              <a:t>. Kami memilih usaha tersebut karena masih minimnya penggunaan teknologi router berbasis cloud yang ada di Indonesia. Berdasarkan hasil analisa kami, hingga saat ini jumlah provider yang menyediakan jasa router virtual masih bias dihitung dengan jari. Tantangan terbesar dari suatu perusahaan yang membutuhkan ketersediaan jaringan mereka adalah bagaimana mencapai tingkat availability yang tinggi dengan menggunakan perangkat router berbiaya rendah. Dengan adanya layanan router virtual ini diharapkan dapat memangkas jumlah cost yang besar dalam penyediaan router suatu jaringan komputer perusahaan tersebut. Router yang kami sediakan merupakan router virtual sehingga secara fisik router tersebut tidak ada, tetapi secara logika (software) router tersebut ada. Layanan router virtual tersebut dapat dikontrol dari berbagai gadget, PC, ataupun notebook melalui portal web yang kami sediakan</a:t>
+              <a:t>. Kami memilih usaha tersebut karena masih minimnya penggunaan teknologi router berbasis cloud yang ada di Indonesia. Berdasarkan hasil analisa kami, hingga saat ini jumlah provider yang menyediakan jasa router virtual masih </a:t>
+            </a:r>
+            <a:r>
+              <a:rPr lang="id-ID" sz="1400" dirty="0" smtClean="0">
+                <a:solidFill>
+                  <a:schemeClr val="tx2"/>
+                </a:solidFill>
+              </a:rPr>
+              <a:t>bis</a:t>
+            </a:r>
+            <a:r>
+              <a:rPr lang="en-US" sz="1400" dirty="0" smtClean="0">
+                <a:solidFill>
+                  <a:schemeClr val="tx2"/>
+                </a:solidFill>
+              </a:rPr>
+              <a:t>a</a:t>
+            </a:r>
+            <a:r>
+              <a:rPr lang="id-ID" sz="1400" dirty="0" smtClean="0">
+                <a:solidFill>
+                  <a:schemeClr val="tx2"/>
+                </a:solidFill>
+              </a:rPr>
+              <a:t> </a:t>
+            </a:r>
+            <a:r>
+              <a:rPr lang="id-ID" sz="1400" dirty="0">
+                <a:solidFill>
+                  <a:schemeClr val="tx2"/>
+                </a:solidFill>
+              </a:rPr>
+              <a:t>dihitung dengan jari. Tantangan terbesar dari suatu perusahaan yang membutuhkan ketersediaan jaringan mereka adalah bagaimana mencapai tingkat availability yang tinggi dengan menggunakan perangkat router berbiaya rendah. Dengan adanya layanan router virtual ini diharapkan dapat memangkas jumlah cost yang besar dalam penyediaan router suatu jaringan komputer perusahaan tersebut. Router yang kami sediakan merupakan router virtual sehingga secara fisik router tersebut tidak ada, tetapi secara logika (software) router tersebut ada. Layanan router virtual tersebut dapat dikontrol dari berbagai gadget, PC, ataupun notebook melalui portal web yang kami sediakan</a:t>
             </a:r>
             <a:r>
               <a:rPr lang="id-ID" sz="1400" dirty="0" smtClean="0">
@@ -6021,6 +6665,11 @@
               </a:rPr>
               <a:t>.</a:t>
             </a:r>
+            <a:endParaRPr lang="id-ID" sz="1400" dirty="0" smtClean="0">
+              <a:solidFill>
+                <a:schemeClr val="tx2"/>
+              </a:solidFill>
+            </a:endParaRPr>
           </a:p>
           <a:p>
             <a:pPr marL="0" indent="0" algn="just">
@@ -6083,7 +6732,31 @@
                   <a:schemeClr val="tx2"/>
                 </a:solidFill>
               </a:rPr>
-              <a:t> yang ingin mencoba hal-hal baru seputar teknologi cloud dan network</a:t>
+              <a:t> yang ingin mencoba hal-hal baru seputar teknologi cloud dan </a:t>
+            </a:r>
+            <a:r>
+              <a:rPr lang="id-ID" sz="1400" dirty="0" smtClean="0">
+                <a:solidFill>
+                  <a:schemeClr val="tx2"/>
+                </a:solidFill>
+              </a:rPr>
+              <a:t>network</a:t>
+            </a:r>
+            <a:r>
+              <a:rPr lang="en-US" sz="1400" dirty="0" smtClean="0">
+                <a:solidFill>
+                  <a:schemeClr val="tx2"/>
+                </a:solidFill>
+              </a:rPr>
+              <a:t>. </a:t>
+            </a:r>
+            <a:r>
+              <a:rPr lang="id-ID" sz="1400" dirty="0" smtClean="0">
+                <a:solidFill>
+                  <a:schemeClr val="tx2"/>
+                </a:solidFill>
+              </a:rPr>
+              <a:t>Visi </a:t>
             </a:r>
             <a:r>
               <a:rPr lang="id-ID" sz="1400" dirty="0">
@@ -6091,15 +6764,23 @@
                   <a:schemeClr val="tx2"/>
                 </a:solidFill>
               </a:rPr>
-              <a:t>. Fitur-fitur dari layanan kami, yakni mendukung </a:t>
-            </a:r>
-            <a:r>
-              <a:rPr lang="id-ID" sz="1400" dirty="0" smtClean="0">
+              <a:t>dari usaha kami adalah menjadi cloud router provider yang selalu dipercaya dan terpercaya di dunia, dan meningkatkan wawasan teknologi jaringan komputer bangsa Indonesia. Misi dari usaha kami adalah mengelola infrastruktur jaringan dengan segenap tenaga, meningkatkan hubungan yang baik dengan pelanggan dan partner perusahaan, dan menyelenggarakan training seputar dunia jaringan komputer kepada masyarakat. Untuk memenuhi visi dan misi perusahaan, terutama untuk kebutuhan pelanggan, kami masih membutuhkan dana sebesar Rp. X untuk realisasi layanan </a:t>
+            </a:r>
+            <a:r>
+              <a:rPr lang="id-ID" sz="1400" b="1" dirty="0">
                 <a:solidFill>
                   <a:schemeClr val="tx2"/>
                 </a:solidFill>
               </a:rPr>
-              <a:t>hampir semua open-source OS </a:t>
+              <a:t>Router</a:t>
+            </a:r>
+            <a:r>
+              <a:rPr lang="id-ID" sz="1400" b="1" dirty="0">
+                <a:solidFill>
+                  <a:srgbClr val="FFC000"/>
+                </a:solidFill>
+              </a:rPr>
+              <a:t>Maya</a:t>
             </a:r>
             <a:r>
               <a:rPr lang="id-ID" sz="1400" dirty="0">
@@ -6107,39 +6788,7 @@
                   <a:schemeClr val="tx2"/>
                 </a:solidFill>
               </a:rPr>
-              <a:t>untuk kebutuhan </a:t>
-            </a:r>
-            <a:r>
-              <a:rPr lang="id-ID" sz="1400" dirty="0" smtClean="0">
-                <a:solidFill>
-                  <a:schemeClr val="tx2"/>
-                </a:solidFill>
-              </a:rPr>
-              <a:t>routing. Layanan </a:t>
-            </a:r>
-            <a:r>
-              <a:rPr lang="id-ID" sz="1400" dirty="0">
-                <a:solidFill>
-                  <a:schemeClr val="tx2"/>
-                </a:solidFill>
-              </a:rPr>
-              <a:t>router kami juga dapat dijadikan sebagai backup router untuk fail-over, ataupun sebagai </a:t>
-            </a:r>
-            <a:r>
-              <a:rPr lang="id-ID" sz="1400" dirty="0" smtClean="0">
-                <a:solidFill>
-                  <a:schemeClr val="tx2"/>
-                </a:solidFill>
-              </a:rPr>
-              <a:t>load-balancer. </a:t>
-            </a:r>
-            <a:r>
-              <a:rPr lang="id-ID" sz="1400" dirty="0">
-                <a:solidFill>
-                  <a:schemeClr val="tx2"/>
-                </a:solidFill>
-              </a:rPr>
-              <a:t>Tidak hanya itu, kami juga mengijinkan private tunneling, seperti VPN (Virtual Private Network) untuk menjangkau seluruh cabang dari suatu instansi perusahaan. Router virtual kami juga dapat dijadikan sebagai firewall, sehingga Anda dapat dengan mudah mengontrol access-list (ACL) ataupun melakukan filter berbasis protokol dan no. port jaringan anda. Visi dari usaha kami adalah menjadi cloud router provider yang selalu dipercaya dan terpercaya, dan meningkatkan wawasan teknologi jaringan komputer bangsa. Misi dari usaha kami adalah mengelola infrastruktur jaringan dengan segenap tenaga, meningkatkan hubungan yang baik dengan pelanggan dan partner perusahaan, dan menyelenggarakan training seputar dunia jaringan komputer kepada masyarakat.</a:t>
+              <a:t> di bulan Februari 2017, dan kami sangat berharap dapat memberikan keuntungan sebesar 2% pada tahun 2018, 5% pada tahun 2020.</a:t>
             </a:r>
             <a:endParaRPr lang="id-ID" sz="1400" dirty="0"/>
           </a:p>
@@ -6203,8 +6852,8 @@
           <a:lstStyle/>
           <a:p>
             <a:r>
-              <a:rPr lang="id-ID" dirty="0" smtClean="0"/>
-              <a:t>Latar Belakang Perusahaan</a:t>
+              <a:rPr lang="en-US" dirty="0" smtClean="0"/>
+              <a:t>Business Overview</a:t>
             </a:r>
             <a:endParaRPr lang="id-ID" dirty="0"/>
           </a:p>
@@ -6230,13 +6879,45 @@
             <a:pPr marL="0" indent="0">
               <a:buNone/>
             </a:pPr>
+            <a:r>
+              <a:rPr lang="id-ID" sz="1600" dirty="0" smtClean="0">
+                <a:solidFill>
+                  <a:schemeClr val="tx2"/>
+                </a:solidFill>
+              </a:rPr>
+              <a:t>Perusahaan yang kami dirikan merupakan suatu perusahaan berbasis IT yang memberikan jasa layanan sewa router berbasis cloud. Tidak hanya itu, kami juga berupaya memaksimalkan produktivitas pelanggan kami dengan menyediakan layanan cloud hosting ataupun dedicated server yang dapat digabungkan dengan layanan </a:t>
+            </a:r>
+            <a:r>
+              <a:rPr lang="id-ID" sz="1600" b="1" dirty="0" smtClean="0">
+                <a:solidFill>
+                  <a:schemeClr val="tx2"/>
+                </a:solidFill>
+              </a:rPr>
+              <a:t>Router</a:t>
+            </a:r>
+            <a:r>
+              <a:rPr lang="id-ID" sz="1600" b="1" dirty="0" smtClean="0">
+                <a:solidFill>
+                  <a:srgbClr val="FFC000"/>
+                </a:solidFill>
+              </a:rPr>
+              <a:t>Maya</a:t>
+            </a:r>
+            <a:r>
+              <a:rPr lang="id-ID" sz="1600" dirty="0" smtClean="0">
+                <a:solidFill>
+                  <a:schemeClr val="tx2"/>
+                </a:solidFill>
+              </a:rPr>
+              <a:t> kami</a:t>
+            </a:r>
             <a:r>
               <a:rPr lang="id-ID" sz="1600" dirty="0">
                 <a:solidFill>
                   <a:schemeClr val="tx2"/>
                 </a:solidFill>
               </a:rPr>
-              <a:t>Perusahaan yang kami dirikan merupakan suatu perusahaan berbasis IT yang memberikan jasa layanan sewa router berbasis cloud. Tidak hanya itu, kami juga berupaya memaksimalkan produktivitas pelanggan kami dengan menyediakan layanan cloud hosting ataupun dedicated server yang dapat digabungkan dengan produk RouterMaya kami.</a:t>
+              <a:t>.</a:t>
             </a:r>
           </a:p>
           <a:p>
@@ -6249,18 +6930,40 @@
                   <a:schemeClr val="tx2"/>
                 </a:solidFill>
               </a:rPr>
-              <a:t>Perusahaan kami sudah berdiri hampir lima tahun dan tetap dapat berdiri kokoh hingga saat ini berkat sejumlah kenangan yang pahit dan manis di masa lampau. Perusahaan kami dulunya bernama DeHostGeek, merupakan cikal bakal lahirnya perusahaan RouterMaya ini. Perusahaan ini belum mengadopsi layanan virtual router pada mulanya, tetapi hanya fokus pada bisnis conventional hosting dan virtual private server. Saat itu kita juga sedang mengalami kekurangan peminat akibat munculnya pesaing-pesaing baru yang berani memberikan harga lebih murah ketimbang harga rata-rata di pasar. Oleh sebab itu, kami para founder dan para manager perusahaan melakukan meeting tertutup untuk membahas masa depan perusahaan ini. Akhirnya, kami memutuskan untuk tetap melanjutkan mimpi perusahaan ini dengan mengubah sedikit pandangan perusahaan, yakni yang sebelumnya lebih fokus dengan conventional hosting dan VPS, sekarang menjadi lebih fokus terhadap teknologi masa depan, cloud technology. Dan sejak itulah layanan RouterMaya kami pun berhasil direalisasikan.</a:t>
-            </a:r>
-          </a:p>
-          <a:p>
-            <a:pPr marL="0" indent="0">
-              <a:buNone/>
-            </a:pPr>
-            <a:endParaRPr lang="id-ID" sz="1400" dirty="0">
-              <a:solidFill>
-                <a:schemeClr val="tx2"/>
-              </a:solidFill>
-            </a:endParaRPr>
+              <a:t>Kami memilih usaha tersebut karena </a:t>
+            </a:r>
+            <a:r>
+              <a:rPr lang="id-ID" sz="1600" dirty="0" smtClean="0">
+                <a:solidFill>
+                  <a:schemeClr val="tx2"/>
+                </a:solidFill>
+              </a:rPr>
+              <a:t>masih </a:t>
+            </a:r>
+            <a:r>
+              <a:rPr lang="id-ID" sz="1600" dirty="0">
+                <a:solidFill>
+                  <a:schemeClr val="tx2"/>
+                </a:solidFill>
+              </a:rPr>
+              <a:t>minimnya penggunaan teknologi router berbasis cloud yang ada di Indonesia. Berdasarkan hasil analisa kami, hingga saat ini jumlah provider yang menyediakan jasa router virtual masih bisa dihitung dengan jari. Tantangan terbesar dari suatu perusahaan yang membutuhkan ketersediaan jaringan mereka adalah bagaimana mencapai tingkat </a:t>
+            </a:r>
+            <a:r>
+              <a:rPr lang="id-ID" sz="1600" i="1" dirty="0">
+                <a:solidFill>
+                  <a:schemeClr val="tx2"/>
+                </a:solidFill>
+              </a:rPr>
+              <a:t>availability</a:t>
+            </a:r>
+            <a:r>
+              <a:rPr lang="id-ID" sz="1600" dirty="0">
+                <a:solidFill>
+                  <a:schemeClr val="tx2"/>
+                </a:solidFill>
+              </a:rPr>
+              <a:t> yang tinggi dengan menggunakan perangkat router berbiaya rendah. Dengan adanya layanan router virtual ini diharapkan dapat memangkas jumlah cost yang besar dalam penyediaan router suatu jaringan komputer perusahaan tersebut.</a:t>
+            </a:r>
           </a:p>
         </p:txBody>
       </p:sp>
@@ -6322,8 +7025,341 @@
           <a:lstStyle/>
           <a:p>
             <a:r>
+              <a:rPr lang="en-US" dirty="0" smtClean="0"/>
+              <a:t>Product Description</a:t>
+            </a:r>
+            <a:endParaRPr lang="id-ID" dirty="0"/>
+          </a:p>
+        </p:txBody>
+      </p:sp>
+      <p:sp>
+        <p:nvSpPr>
+          <p:cNvPr id="3" name="Content Placeholder 2"/>
+          <p:cNvSpPr>
+            <a:spLocks noGrp="1"/>
+          </p:cNvSpPr>
+          <p:nvPr>
+            <p:ph idx="1"/>
+          </p:nvPr>
+        </p:nvSpPr>
+        <p:spPr/>
+        <p:txBody>
+          <a:bodyPr>
+            <a:normAutofit/>
+          </a:bodyPr>
+          <a:lstStyle/>
+          <a:p>
+            <a:r>
+              <a:rPr lang="id-ID" sz="1600" b="1" dirty="0">
+                <a:solidFill>
+                  <a:schemeClr val="tx2"/>
+                </a:solidFill>
+              </a:rPr>
+              <a:t>Router</a:t>
+            </a:r>
+            <a:r>
+              <a:rPr lang="id-ID" sz="1600" b="1" dirty="0">
+                <a:solidFill>
+                  <a:srgbClr val="FFC000"/>
+                </a:solidFill>
+              </a:rPr>
+              <a:t>Maya</a:t>
+            </a:r>
+            <a:r>
+              <a:rPr lang="id-ID" sz="1600" dirty="0"/>
+              <a:t> </a:t>
+            </a:r>
+            <a:r>
+              <a:rPr lang="id-ID" sz="1600" dirty="0">
+                <a:solidFill>
+                  <a:schemeClr val="tx2"/>
+                </a:solidFill>
+              </a:rPr>
+              <a:t>merupakan suatu layanan penyewaan router berbasis cloud, dimana router-router yang disewa tidak memiliki bentuk fisik, tetapi secara software (logika) router tersebut ada. Layanan tersebut dapat dipesan oleh calon pelanggan kami melalui web kami di </a:t>
+            </a:r>
+            <a:r>
+              <a:rPr lang="id-ID" sz="1600" u="sng" dirty="0">
+                <a:solidFill>
+                  <a:schemeClr val="tx2"/>
+                </a:solidFill>
+                <a:hlinkClick r:id="rId2"/>
+              </a:rPr>
+              <a:t>http://www.routermaya.com</a:t>
+            </a:r>
+            <a:r>
+              <a:rPr lang="id-ID" sz="1600" dirty="0">
+                <a:solidFill>
+                  <a:schemeClr val="tx2"/>
+                </a:solidFill>
+              </a:rPr>
+              <a:t>, dan manajemen router tersebut dapat dikontrol oleh pelanggan melalui halaman manajemen router yang telah kami sediakan. Pelanggan bias mengakses halaman itu melalui berbagai macam gadget, notebook, atau PC.</a:t>
+            </a:r>
+          </a:p>
+          <a:p>
+            <a:r>
+              <a:rPr lang="id-ID" sz="1600" dirty="0">
+                <a:solidFill>
+                  <a:schemeClr val="tx2"/>
+                </a:solidFill>
+              </a:rPr>
+              <a:t>Fitur-fitur dari layanan kami, yakni mendukung semua OS untuk kebutuhan routing, seperti OpenBSD, FreeBSD, BSDRP (BSD </a:t>
+            </a:r>
+            <a:r>
+              <a:rPr lang="id-ID" sz="1600" i="1" dirty="0">
+                <a:solidFill>
+                  <a:schemeClr val="tx2"/>
+                </a:solidFill>
+              </a:rPr>
+              <a:t>Routing Project</a:t>
+            </a:r>
+            <a:r>
+              <a:rPr lang="id-ID" sz="1600" dirty="0">
+                <a:solidFill>
+                  <a:schemeClr val="tx2"/>
+                </a:solidFill>
+              </a:rPr>
+              <a:t>), VyOS, dan Mikrotik CHR (</a:t>
+            </a:r>
+            <a:r>
+              <a:rPr lang="id-ID" sz="1600" i="1" dirty="0">
+                <a:solidFill>
+                  <a:schemeClr val="tx2"/>
+                </a:solidFill>
+              </a:rPr>
+              <a:t>Cloud Hosted Router</a:t>
+            </a:r>
+            <a:r>
+              <a:rPr lang="id-ID" sz="1600" dirty="0">
+                <a:solidFill>
+                  <a:schemeClr val="tx2"/>
+                </a:solidFill>
+              </a:rPr>
+              <a:t>). Kami juga menyediakan lisensi untuk beberapa OS jika dibutuhkan, seperti Mikrotik CHR. Layanan router kami juga dapat dijadikan sebagai </a:t>
+            </a:r>
+            <a:r>
+              <a:rPr lang="id-ID" sz="1600" i="1" dirty="0">
+                <a:solidFill>
+                  <a:schemeClr val="tx2"/>
+                </a:solidFill>
+              </a:rPr>
+              <a:t>backup router</a:t>
+            </a:r>
+            <a:r>
+              <a:rPr lang="id-ID" sz="1600" dirty="0">
+                <a:solidFill>
+                  <a:schemeClr val="tx2"/>
+                </a:solidFill>
+              </a:rPr>
+              <a:t> untuk </a:t>
+            </a:r>
+            <a:r>
+              <a:rPr lang="id-ID" sz="1600" i="1" dirty="0">
+                <a:solidFill>
+                  <a:schemeClr val="tx2"/>
+                </a:solidFill>
+              </a:rPr>
+              <a:t>fail-over</a:t>
+            </a:r>
+            <a:r>
+              <a:rPr lang="id-ID" sz="1600" dirty="0">
+                <a:solidFill>
+                  <a:schemeClr val="tx2"/>
+                </a:solidFill>
+              </a:rPr>
+              <a:t>, ataupun sebagai </a:t>
+            </a:r>
+            <a:r>
+              <a:rPr lang="id-ID" sz="1600" i="1" dirty="0">
+                <a:solidFill>
+                  <a:schemeClr val="tx2"/>
+                </a:solidFill>
+              </a:rPr>
+              <a:t>load-balancer</a:t>
+            </a:r>
+            <a:r>
+              <a:rPr lang="id-ID" sz="1600" dirty="0">
+                <a:solidFill>
+                  <a:schemeClr val="tx2"/>
+                </a:solidFill>
+              </a:rPr>
+              <a:t> pada jaringan anda. Tidak hanya itu, kami juga mengijinkan </a:t>
+            </a:r>
+            <a:r>
+              <a:rPr lang="id-ID" sz="1600" i="1" dirty="0">
+                <a:solidFill>
+                  <a:schemeClr val="tx2"/>
+                </a:solidFill>
+              </a:rPr>
+              <a:t>private tunneling</a:t>
+            </a:r>
+            <a:r>
+              <a:rPr lang="id-ID" sz="1600" dirty="0">
+                <a:solidFill>
+                  <a:schemeClr val="tx2"/>
+                </a:solidFill>
+              </a:rPr>
+              <a:t>, seperti VPN (</a:t>
+            </a:r>
+            <a:r>
+              <a:rPr lang="id-ID" sz="1600" i="1" dirty="0">
+                <a:solidFill>
+                  <a:schemeClr val="tx2"/>
+                </a:solidFill>
+              </a:rPr>
+              <a:t>Virtual Private Network</a:t>
+            </a:r>
+            <a:r>
+              <a:rPr lang="id-ID" sz="1600" u="sng" dirty="0">
+                <a:solidFill>
+                  <a:schemeClr val="tx2"/>
+                </a:solidFill>
+              </a:rPr>
+              <a:t>)</a:t>
+            </a:r>
+            <a:r>
+              <a:rPr lang="id-ID" sz="1600" dirty="0">
+                <a:solidFill>
+                  <a:schemeClr val="tx2"/>
+                </a:solidFill>
+              </a:rPr>
+              <a:t> untuk menjangkau seluruh cabang dari suatu instansi perusahaan. Router virtual kami juga dapat dijadikan sebagai firewall, sehingga Anda dapat dengan mudah mengontrol </a:t>
+            </a:r>
+            <a:r>
+              <a:rPr lang="id-ID" sz="1600" i="1" dirty="0">
+                <a:solidFill>
+                  <a:schemeClr val="tx2"/>
+                </a:solidFill>
+              </a:rPr>
+              <a:t>access-list</a:t>
+            </a:r>
+            <a:r>
+              <a:rPr lang="id-ID" sz="1600" dirty="0">
+                <a:solidFill>
+                  <a:schemeClr val="tx2"/>
+                </a:solidFill>
+              </a:rPr>
+              <a:t> (ACL) ataupun melakukan filter berbasis protokol dan no. port jaringan anda. Ada juga fitur opsional, yakni kami juga memberikan </a:t>
+            </a:r>
+            <a:r>
+              <a:rPr lang="id-ID" sz="1600" i="1" dirty="0">
+                <a:solidFill>
+                  <a:schemeClr val="tx2"/>
+                </a:solidFill>
+              </a:rPr>
+              <a:t>disk space</a:t>
+            </a:r>
+            <a:r>
+              <a:rPr lang="id-ID" sz="1600" dirty="0">
+                <a:solidFill>
+                  <a:schemeClr val="tx2"/>
+                </a:solidFill>
+              </a:rPr>
+              <a:t> yang besar untuk kebutuhan </a:t>
+            </a:r>
+            <a:r>
+              <a:rPr lang="id-ID" sz="1600" i="1" dirty="0">
+                <a:solidFill>
+                  <a:schemeClr val="tx2"/>
+                </a:solidFill>
+              </a:rPr>
+              <a:t>backup</a:t>
+            </a:r>
+            <a:r>
+              <a:rPr lang="id-ID" sz="1600" dirty="0">
+                <a:solidFill>
+                  <a:schemeClr val="tx2"/>
+                </a:solidFill>
+              </a:rPr>
+              <a:t> dan </a:t>
+            </a:r>
+            <a:r>
+              <a:rPr lang="id-ID" sz="1600" i="1" dirty="0">
+                <a:solidFill>
+                  <a:schemeClr val="tx2"/>
+                </a:solidFill>
+              </a:rPr>
+              <a:t>file storage</a:t>
+            </a:r>
+            <a:r>
+              <a:rPr lang="id-ID" sz="1600" dirty="0">
+                <a:solidFill>
+                  <a:schemeClr val="tx2"/>
+                </a:solidFill>
+              </a:rPr>
+              <a:t> melalui router virtual tersebut.</a:t>
+            </a:r>
+            <a:endParaRPr lang="id-ID" sz="1600" dirty="0">
+              <a:solidFill>
+                <a:schemeClr val="tx2"/>
+              </a:solidFill>
+            </a:endParaRPr>
+          </a:p>
+        </p:txBody>
+      </p:sp>
+    </p:spTree>
+    <p:extLst>
+      <p:ext uri="{BB962C8B-B14F-4D97-AF65-F5344CB8AC3E}">
+        <p14:creationId xmlns:p14="http://schemas.microsoft.com/office/powerpoint/2010/main" val="2613527231"/>
+      </p:ext>
+    </p:extLst>
+  </p:cSld>
+  <p:clrMapOvr>
+    <a:masterClrMapping/>
+  </p:clrMapOvr>
+  <mc:AlternateContent xmlns:mc="http://schemas.openxmlformats.org/markup-compatibility/2006" xmlns:p14="http://schemas.microsoft.com/office/powerpoint/2010/main">
+    <mc:Choice Requires="p14">
+      <p:transition spd="med" p14:dur="700">
+        <p:fade/>
+      </p:transition>
+    </mc:Choice>
+    <mc:Fallback xmlns="">
+      <p:transition spd="med">
+        <p:fade/>
+      </p:transition>
+    </mc:Fallback>
+  </mc:AlternateContent>
+</p:sld>
+</file>
+
+<file path=ppt/slides/slide6.xml><?xml version="1.0" encoding="utf-8"?>
+<p:sld xmlns:a="http://schemas.openxmlformats.org/drawingml/2006/main" xmlns:r="http://schemas.openxmlformats.org/officeDocument/2006/relationships" xmlns:p="http://schemas.openxmlformats.org/presentationml/2006/main">
+  <p:cSld>
+    <p:spTree>
+      <p:nvGrpSpPr>
+        <p:cNvPr id="1" name=""/>
+        <p:cNvGrpSpPr/>
+        <p:nvPr/>
+      </p:nvGrpSpPr>
+      <p:grpSpPr>
+        <a:xfrm>
+          <a:off x="0" y="0"/>
+          <a:ext cx="0" cy="0"/>
+          <a:chOff x="0" y="0"/>
+          <a:chExt cx="0" cy="0"/>
+        </a:xfrm>
+      </p:grpSpPr>
+      <p:sp>
+        <p:nvSpPr>
+          <p:cNvPr id="2" name="Title 1"/>
+          <p:cNvSpPr>
+            <a:spLocks noGrp="1"/>
+          </p:cNvSpPr>
+          <p:nvPr>
+            <p:ph type="title"/>
+          </p:nvPr>
+        </p:nvSpPr>
+        <p:spPr/>
+        <p:txBody>
+          <a:bodyPr/>
+          <a:lstStyle/>
+          <a:p>
+            <a:r>
               <a:rPr lang="id-ID" dirty="0" smtClean="0"/>
-              <a:t>Struktur Perusahaan - Team</a:t>
+              <a:t>Team</a:t>
+            </a:r>
+            <a:r>
+              <a:rPr lang="en-US" dirty="0" smtClean="0"/>
+              <a:t> – Management Profile</a:t>
             </a:r>
             <a:endParaRPr lang="id-ID" dirty="0"/>
           </a:p>
@@ -6928,7 +7964,7 @@
 </p:sld>
 </file>
 
-<file path=ppt/slides/slide6.xml><?xml version="1.0" encoding="utf-8"?>
+<file path=ppt/slides/slide7.xml><?xml version="1.0" encoding="utf-8"?>
 <p:sld xmlns:a="http://schemas.openxmlformats.org/drawingml/2006/main" xmlns:r="http://schemas.openxmlformats.org/officeDocument/2006/relationships" xmlns:p="http://schemas.openxmlformats.org/presentationml/2006/main">
   <p:cSld>
     <p:spTree>
@@ -6961,8 +7997,12 @@
           <a:lstStyle/>
           <a:p>
             <a:r>
-              <a:rPr lang="id-ID" dirty="0" smtClean="0"/>
-              <a:t>Struktur Perusahaan – Team Profile</a:t>
+              <a:rPr lang="id-ID" dirty="0"/>
+              <a:t>Team</a:t>
+            </a:r>
+            <a:r>
+              <a:rPr lang="en-US" dirty="0"/>
+              <a:t> – Management Profile</a:t>
             </a:r>
             <a:endParaRPr lang="id-ID" dirty="0"/>
           </a:p>
@@ -6996,7 +8036,7 @@
                 <a:gridCol w="3906982">
                   <a:extLst>
                     <a:ext uri="{9D8B030D-6E8A-4147-A177-3AD203B41FA5}">
-                      <a16:colId xmlns:a16="http://schemas.microsoft.com/office/drawing/2014/main" val="2057432390"/>
+                      <a16:colId xmlns:a16="http://schemas.microsoft.com/office/drawing/2014/main" xmlns="" val="2057432390"/>
                     </a:ext>
                   </a:extLst>
                 </a:gridCol>
@@ -7030,7 +8070,7 @@
                 </a:tc>
                 <a:extLst>
                   <a:ext uri="{0D108BD9-81ED-4DB2-BD59-A6C34878D82A}">
-                    <a16:rowId xmlns:a16="http://schemas.microsoft.com/office/drawing/2014/main" val="3202738208"/>
+                    <a16:rowId xmlns:a16="http://schemas.microsoft.com/office/drawing/2014/main" xmlns="" val="3202738208"/>
                   </a:ext>
                 </a:extLst>
               </a:tr>
@@ -7186,7 +8226,7 @@
                 </a:tc>
                 <a:extLst>
                   <a:ext uri="{0D108BD9-81ED-4DB2-BD59-A6C34878D82A}">
-                    <a16:rowId xmlns:a16="http://schemas.microsoft.com/office/drawing/2014/main" val="3915779658"/>
+                    <a16:rowId xmlns:a16="http://schemas.microsoft.com/office/drawing/2014/main" xmlns="" val="3915779658"/>
                   </a:ext>
                 </a:extLst>
               </a:tr>
@@ -7270,7 +8310,7 @@
                 <a:gridCol w="3874654">
                   <a:extLst>
                     <a:ext uri="{9D8B030D-6E8A-4147-A177-3AD203B41FA5}">
-                      <a16:colId xmlns:a16="http://schemas.microsoft.com/office/drawing/2014/main" val="2057432390"/>
+                      <a16:colId xmlns:a16="http://schemas.microsoft.com/office/drawing/2014/main" xmlns="" val="2057432390"/>
                     </a:ext>
                   </a:extLst>
                 </a:gridCol>
@@ -7304,7 +8344,7 @@
                 </a:tc>
                 <a:extLst>
                   <a:ext uri="{0D108BD9-81ED-4DB2-BD59-A6C34878D82A}">
-                    <a16:rowId xmlns:a16="http://schemas.microsoft.com/office/drawing/2014/main" val="3202738208"/>
+                    <a16:rowId xmlns:a16="http://schemas.microsoft.com/office/drawing/2014/main" xmlns="" val="3202738208"/>
                   </a:ext>
                 </a:extLst>
               </a:tr>
@@ -7362,7 +8402,7 @@
                 </a:tc>
                 <a:extLst>
                   <a:ext uri="{0D108BD9-81ED-4DB2-BD59-A6C34878D82A}">
-                    <a16:rowId xmlns:a16="http://schemas.microsoft.com/office/drawing/2014/main" val="3915779658"/>
+                    <a16:rowId xmlns:a16="http://schemas.microsoft.com/office/drawing/2014/main" xmlns="" val="3915779658"/>
                   </a:ext>
                 </a:extLst>
               </a:tr>
@@ -7446,7 +8486,7 @@
                 <a:gridCol w="4054764">
                   <a:extLst>
                     <a:ext uri="{9D8B030D-6E8A-4147-A177-3AD203B41FA5}">
-                      <a16:colId xmlns:a16="http://schemas.microsoft.com/office/drawing/2014/main" val="2057432390"/>
+                      <a16:colId xmlns:a16="http://schemas.microsoft.com/office/drawing/2014/main" xmlns="" val="2057432390"/>
                     </a:ext>
                   </a:extLst>
                 </a:gridCol>
@@ -7480,7 +8520,7 @@
                 </a:tc>
                 <a:extLst>
                   <a:ext uri="{0D108BD9-81ED-4DB2-BD59-A6C34878D82A}">
-                    <a16:rowId xmlns:a16="http://schemas.microsoft.com/office/drawing/2014/main" val="3202738208"/>
+                    <a16:rowId xmlns:a16="http://schemas.microsoft.com/office/drawing/2014/main" xmlns="" val="3202738208"/>
                   </a:ext>
                 </a:extLst>
               </a:tr>
@@ -7562,7 +8602,7 @@
                 </a:tc>
                 <a:extLst>
                   <a:ext uri="{0D108BD9-81ED-4DB2-BD59-A6C34878D82A}">
-                    <a16:rowId xmlns:a16="http://schemas.microsoft.com/office/drawing/2014/main" val="3915779658"/>
+                    <a16:rowId xmlns:a16="http://schemas.microsoft.com/office/drawing/2014/main" xmlns="" val="3915779658"/>
                   </a:ext>
                 </a:extLst>
               </a:tr>
@@ -7643,7 +8683,7 @@
 </p:sld>
 </file>
 
-<file path=ppt/slides/slide7.xml><?xml version="1.0" encoding="utf-8"?>
+<file path=ppt/slides/slide8.xml><?xml version="1.0" encoding="utf-8"?>
 <p:sld xmlns:a="http://schemas.openxmlformats.org/drawingml/2006/main" xmlns:r="http://schemas.openxmlformats.org/officeDocument/2006/relationships" xmlns:p="http://schemas.openxmlformats.org/presentationml/2006/main">
   <p:cSld>
     <p:spTree>
@@ -7676,8 +8716,12 @@
           <a:lstStyle/>
           <a:p>
             <a:r>
-              <a:rPr lang="id-ID" dirty="0" smtClean="0"/>
-              <a:t>Struktur Perusahaan – Team Profile</a:t>
+              <a:rPr lang="id-ID" dirty="0"/>
+              <a:t>Team</a:t>
+            </a:r>
+            <a:r>
+              <a:rPr lang="en-US" dirty="0"/>
+              <a:t> – Management Profile</a:t>
             </a:r>
             <a:endParaRPr lang="id-ID" dirty="0"/>
           </a:p>
@@ -7711,7 +8755,7 @@
                 <a:gridCol w="3906982">
                   <a:extLst>
                     <a:ext uri="{9D8B030D-6E8A-4147-A177-3AD203B41FA5}">
-                      <a16:colId xmlns:a16="http://schemas.microsoft.com/office/drawing/2014/main" val="2057432390"/>
+                      <a16:colId xmlns:a16="http://schemas.microsoft.com/office/drawing/2014/main" xmlns="" val="2057432390"/>
                     </a:ext>
                   </a:extLst>
                 </a:gridCol>
@@ -7745,7 +8789,7 @@
                 </a:tc>
                 <a:extLst>
                   <a:ext uri="{0D108BD9-81ED-4DB2-BD59-A6C34878D82A}">
-                    <a16:rowId xmlns:a16="http://schemas.microsoft.com/office/drawing/2014/main" val="3202738208"/>
+                    <a16:rowId xmlns:a16="http://schemas.microsoft.com/office/drawing/2014/main" xmlns="" val="3202738208"/>
                   </a:ext>
                 </a:extLst>
               </a:tr>
@@ -7827,7 +8871,7 @@
                 </a:tc>
                 <a:extLst>
                   <a:ext uri="{0D108BD9-81ED-4DB2-BD59-A6C34878D82A}">
-                    <a16:rowId xmlns:a16="http://schemas.microsoft.com/office/drawing/2014/main" val="3915779658"/>
+                    <a16:rowId xmlns:a16="http://schemas.microsoft.com/office/drawing/2014/main" xmlns="" val="3915779658"/>
                   </a:ext>
                 </a:extLst>
               </a:tr>
@@ -7911,7 +8955,7 @@
                 <a:gridCol w="3874654">
                   <a:extLst>
                     <a:ext uri="{9D8B030D-6E8A-4147-A177-3AD203B41FA5}">
-                      <a16:colId xmlns:a16="http://schemas.microsoft.com/office/drawing/2014/main" val="2057432390"/>
+                      <a16:colId xmlns:a16="http://schemas.microsoft.com/office/drawing/2014/main" xmlns="" val="2057432390"/>
                     </a:ext>
                   </a:extLst>
                 </a:gridCol>
@@ -7945,7 +8989,7 @@
                 </a:tc>
                 <a:extLst>
                   <a:ext uri="{0D108BD9-81ED-4DB2-BD59-A6C34878D82A}">
-                    <a16:rowId xmlns:a16="http://schemas.microsoft.com/office/drawing/2014/main" val="3202738208"/>
+                    <a16:rowId xmlns:a16="http://schemas.microsoft.com/office/drawing/2014/main" xmlns="" val="3202738208"/>
                   </a:ext>
                 </a:extLst>
               </a:tr>
@@ -8027,7 +9071,7 @@
                 </a:tc>
                 <a:extLst>
                   <a:ext uri="{0D108BD9-81ED-4DB2-BD59-A6C34878D82A}">
-                    <a16:rowId xmlns:a16="http://schemas.microsoft.com/office/drawing/2014/main" val="3915779658"/>
+                    <a16:rowId xmlns:a16="http://schemas.microsoft.com/office/drawing/2014/main" xmlns="" val="3915779658"/>
                   </a:ext>
                 </a:extLst>
               </a:tr>
@@ -8087,6 +9131,150 @@
     <p:extLst>
       <p:ext uri="{BB962C8B-B14F-4D97-AF65-F5344CB8AC3E}">
         <p14:creationId xmlns:p14="http://schemas.microsoft.com/office/powerpoint/2010/main" val="4050888949"/>
+      </p:ext>
+    </p:extLst>
+  </p:cSld>
+  <p:clrMapOvr>
+    <a:masterClrMapping/>
+  </p:clrMapOvr>
+  <mc:AlternateContent xmlns:mc="http://schemas.openxmlformats.org/markup-compatibility/2006" xmlns:p14="http://schemas.microsoft.com/office/powerpoint/2010/main">
+    <mc:Choice Requires="p14">
+      <p:transition spd="med" p14:dur="700">
+        <p:fade/>
+      </p:transition>
+    </mc:Choice>
+    <mc:Fallback xmlns="">
+      <p:transition spd="med">
+        <p:fade/>
+      </p:transition>
+    </mc:Fallback>
+  </mc:AlternateContent>
+</p:sld>
+</file>
+
+<file path=ppt/slides/slide9.xml><?xml version="1.0" encoding="utf-8"?>
+<p:sld xmlns:a="http://schemas.openxmlformats.org/drawingml/2006/main" xmlns:r="http://schemas.openxmlformats.org/officeDocument/2006/relationships" xmlns:p="http://schemas.openxmlformats.org/presentationml/2006/main">
+  <p:cSld>
+    <p:spTree>
+      <p:nvGrpSpPr>
+        <p:cNvPr id="1" name=""/>
+        <p:cNvGrpSpPr/>
+        <p:nvPr/>
+      </p:nvGrpSpPr>
+      <p:grpSpPr>
+        <a:xfrm>
+          <a:off x="0" y="0"/>
+          <a:ext cx="0" cy="0"/>
+          <a:chOff x="0" y="0"/>
+          <a:chExt cx="0" cy="0"/>
+        </a:xfrm>
+      </p:grpSpPr>
+      <p:sp>
+        <p:nvSpPr>
+          <p:cNvPr id="2" name="Title 1"/>
+          <p:cNvSpPr>
+            <a:spLocks noGrp="1"/>
+          </p:cNvSpPr>
+          <p:nvPr>
+            <p:ph type="title"/>
+          </p:nvPr>
+        </p:nvSpPr>
+        <p:spPr/>
+        <p:txBody>
+          <a:bodyPr/>
+          <a:lstStyle/>
+          <a:p>
+            <a:r>
+              <a:rPr lang="id-ID" dirty="0"/>
+              <a:t>Team</a:t>
+            </a:r>
+            <a:r>
+              <a:rPr lang="en-US" dirty="0"/>
+              <a:t> – </a:t>
+            </a:r>
+            <a:r>
+              <a:rPr lang="en-US" dirty="0" smtClean="0"/>
+              <a:t>Organization Structure</a:t>
+            </a:r>
+            <a:endParaRPr lang="id-ID" dirty="0"/>
+          </a:p>
+        </p:txBody>
+      </p:sp>
+      <p:sp>
+        <p:nvSpPr>
+          <p:cNvPr id="3" name="Content Placeholder 2"/>
+          <p:cNvSpPr>
+            <a:spLocks noGrp="1"/>
+          </p:cNvSpPr>
+          <p:nvPr>
+            <p:ph idx="1"/>
+          </p:nvPr>
+        </p:nvSpPr>
+        <p:spPr/>
+        <p:txBody>
+          <a:bodyPr/>
+          <a:lstStyle/>
+          <a:p>
+            <a:pPr marL="0" indent="0">
+              <a:buNone/>
+            </a:pPr>
+            <a:r>
+              <a:rPr lang="id-ID" b="1" dirty="0">
+                <a:solidFill>
+                  <a:srgbClr val="0070C0"/>
+                </a:solidFill>
+              </a:rPr>
+              <a:t>Cloud Division</a:t>
+            </a:r>
+            <a:endParaRPr lang="id-ID" dirty="0">
+              <a:solidFill>
+                <a:srgbClr val="0070C0"/>
+              </a:solidFill>
+            </a:endParaRPr>
+          </a:p>
+          <a:p>
+            <a:pPr marL="0" indent="0">
+              <a:buNone/>
+            </a:pPr>
+            <a:r>
+              <a:rPr lang="id-ID" dirty="0"/>
+              <a:t>Bertanggung jawab dalam instalasi, manajemen, dan maintenance sistem datacenter. Divisi ini dibagi lagi menjadi beberapa sub-divisi, seperti DB-Geek (bertanggung jawab untuk manajemen database perusahaan), Metal (bertanggung jawab dalam manajemen hardware datacenter, seperti server, router, storage, dll), dan DEV-GEEK (bertanggung jawab dalam me-manage aplikasi-aplikasi datacenter, seperti operating system, sistem pengontrolan server, dll.)</a:t>
+            </a:r>
+          </a:p>
+          <a:p>
+            <a:pPr marL="0" indent="0">
+              <a:buNone/>
+            </a:pPr>
+            <a:r>
+              <a:rPr lang="id-ID" b="1" dirty="0">
+                <a:solidFill>
+                  <a:srgbClr val="00B050"/>
+                </a:solidFill>
+              </a:rPr>
+              <a:t>Finance Division</a:t>
+            </a:r>
+            <a:endParaRPr lang="id-ID" dirty="0">
+              <a:solidFill>
+                <a:srgbClr val="00B050"/>
+              </a:solidFill>
+            </a:endParaRPr>
+          </a:p>
+          <a:p>
+            <a:pPr marL="0" indent="0">
+              <a:buNone/>
+            </a:pPr>
+            <a:r>
+              <a:rPr lang="id-ID" dirty="0"/>
+              <a:t>Bertanggung jawab dalam mengontrol pengeluaran perusahaan, dan menetapkan anggaran belanja perusahaan, seperti belanja memori, harddisk baru untuk menunjang kebutuhan pelanggan yang akan selalu bertambah tiap tahunnya.</a:t>
+            </a:r>
+            <a:endParaRPr lang="id-ID" dirty="0"/>
+          </a:p>
+        </p:txBody>
+      </p:sp>
+    </p:spTree>
+    <p:extLst>
+      <p:ext uri="{BB962C8B-B14F-4D97-AF65-F5344CB8AC3E}">
+        <p14:creationId xmlns:p14="http://schemas.microsoft.com/office/powerpoint/2010/main" val="1607794353"/>
       </p:ext>
     </p:extLst>
   </p:cSld>

</xml_diff>

<commit_message>
#20161115 -> Revisi 2016111501
</commit_message>
<xml_diff>
--- a/PPT/Business Plan MID.pptx
+++ b/PPT/Business Plan MID.pptx
@@ -5,10 +5,10 @@
     <p:sldMasterId id="2147483660" r:id="rId1"/>
   </p:sldMasterIdLst>
   <p:notesMasterIdLst>
-    <p:notesMasterId r:id="rId12"/>
+    <p:notesMasterId r:id="rId13"/>
   </p:notesMasterIdLst>
   <p:handoutMasterIdLst>
-    <p:handoutMasterId r:id="rId13"/>
+    <p:handoutMasterId r:id="rId14"/>
   </p:handoutMasterIdLst>
   <p:sldIdLst>
     <p:sldId id="256" r:id="rId2"/>
@@ -21,6 +21,7 @@
     <p:sldId id="262" r:id="rId9"/>
     <p:sldId id="263" r:id="rId10"/>
     <p:sldId id="265" r:id="rId11"/>
+    <p:sldId id="266" r:id="rId12"/>
   </p:sldIdLst>
   <p:sldSz cx="12192000" cy="6858000"/>
   <p:notesSz cx="6858000" cy="9144000"/>
@@ -6422,6 +6423,108 @@
 </p:sld>
 </file>
 
+<file path=ppt/slides/slide11.xml><?xml version="1.0" encoding="utf-8"?>
+<p:sld xmlns:a="http://schemas.openxmlformats.org/drawingml/2006/main" xmlns:r="http://schemas.openxmlformats.org/officeDocument/2006/relationships" xmlns:p="http://schemas.openxmlformats.org/presentationml/2006/main">
+  <p:cSld>
+    <p:spTree>
+      <p:nvGrpSpPr>
+        <p:cNvPr id="1" name=""/>
+        <p:cNvGrpSpPr/>
+        <p:nvPr/>
+      </p:nvGrpSpPr>
+      <p:grpSpPr>
+        <a:xfrm>
+          <a:off x="0" y="0"/>
+          <a:ext cx="0" cy="0"/>
+          <a:chOff x="0" y="0"/>
+          <a:chExt cx="0" cy="0"/>
+        </a:xfrm>
+      </p:grpSpPr>
+      <p:sp>
+        <p:nvSpPr>
+          <p:cNvPr id="2" name="Title 1"/>
+          <p:cNvSpPr>
+            <a:spLocks noGrp="1"/>
+          </p:cNvSpPr>
+          <p:nvPr>
+            <p:ph type="title"/>
+          </p:nvPr>
+        </p:nvSpPr>
+        <p:spPr/>
+        <p:txBody>
+          <a:bodyPr/>
+          <a:lstStyle/>
+          <a:p>
+            <a:r>
+              <a:rPr lang="en-US" dirty="0" smtClean="0"/>
+              <a:t>The Business Model </a:t>
+            </a:r>
+            <a:r>
+              <a:rPr lang="en-US" dirty="0"/>
+              <a:t>C</a:t>
+            </a:r>
+            <a:r>
+              <a:rPr lang="en-US" dirty="0" smtClean="0"/>
+              <a:t>anvas</a:t>
+            </a:r>
+            <a:endParaRPr lang="id-ID" dirty="0"/>
+          </a:p>
+        </p:txBody>
+      </p:sp>
+      <p:pic>
+        <p:nvPicPr>
+          <p:cNvPr id="4" name="Content Placeholder 3"/>
+          <p:cNvPicPr>
+            <a:picLocks noGrp="1" noChangeAspect="1"/>
+          </p:cNvPicPr>
+          <p:nvPr>
+            <p:ph idx="1"/>
+          </p:nvPr>
+        </p:nvPicPr>
+        <p:blipFill>
+          <a:blip r:embed="rId2">
+            <a:extLst>
+              <a:ext uri="{28A0092B-C50C-407E-A947-70E740481C1C}">
+                <a14:useLocalDpi xmlns:a14="http://schemas.microsoft.com/office/drawing/2010/main" val="0"/>
+              </a:ext>
+            </a:extLst>
+          </a:blip>
+          <a:stretch>
+            <a:fillRect/>
+          </a:stretch>
+        </p:blipFill>
+        <p:spPr>
+          <a:xfrm>
+            <a:off x="1820924" y="1576136"/>
+            <a:ext cx="8550152" cy="5190900"/>
+          </a:xfrm>
+        </p:spPr>
+      </p:pic>
+    </p:spTree>
+    <p:extLst>
+      <p:ext uri="{BB962C8B-B14F-4D97-AF65-F5344CB8AC3E}">
+        <p14:creationId xmlns:p14="http://schemas.microsoft.com/office/powerpoint/2010/main" val="3595945136"/>
+      </p:ext>
+    </p:extLst>
+  </p:cSld>
+  <p:clrMapOvr>
+    <a:masterClrMapping/>
+  </p:clrMapOvr>
+  <mc:AlternateContent xmlns:mc="http://schemas.openxmlformats.org/markup-compatibility/2006" xmlns:p14="http://schemas.microsoft.com/office/powerpoint/2010/main">
+    <mc:Choice Requires="p14">
+      <p:transition spd="med" p14:dur="700">
+        <p:fade/>
+      </p:transition>
+    </mc:Choice>
+    <mc:Fallback xmlns="">
+      <p:transition spd="med">
+        <p:fade/>
+      </p:transition>
+    </mc:Fallback>
+  </mc:AlternateContent>
+</p:sld>
+</file>
+
 <file path=ppt/slides/slide2.xml><?xml version="1.0" encoding="utf-8"?>
 <p:sld xmlns:a="http://schemas.openxmlformats.org/drawingml/2006/main" xmlns:r="http://schemas.openxmlformats.org/officeDocument/2006/relationships" xmlns:p="http://schemas.openxmlformats.org/presentationml/2006/main">
   <p:cSld>
@@ -6665,11 +6768,6 @@
               </a:rPr>
               <a:t>.</a:t>
             </a:r>
-            <a:endParaRPr lang="id-ID" sz="1400" dirty="0" smtClean="0">
-              <a:solidFill>
-                <a:schemeClr val="tx2"/>
-              </a:solidFill>
-            </a:endParaRPr>
           </a:p>
           <a:p>
             <a:pPr marL="0" indent="0" algn="just">
@@ -6732,15 +6830,7 @@
                   <a:schemeClr val="tx2"/>
                 </a:solidFill>
               </a:rPr>
-              <a:t> yang ingin mencoba hal-hal baru seputar teknologi cloud dan </a:t>
-            </a:r>
-            <a:r>
-              <a:rPr lang="id-ID" sz="1400" dirty="0" smtClean="0">
-                <a:solidFill>
-                  <a:schemeClr val="tx2"/>
-                </a:solidFill>
-              </a:rPr>
-              <a:t>network</a:t>
+              <a:t> yang ingin mencoba hal-hal baru seputar teknologi cloud dan network</a:t>
             </a:r>
             <a:r>
               <a:rPr lang="en-US" sz="1400" dirty="0" smtClean="0">
@@ -7288,11 +7378,6 @@
               </a:rPr>
               <a:t> melalui router virtual tersebut.</a:t>
             </a:r>
-            <a:endParaRPr lang="id-ID" sz="1600" dirty="0">
-              <a:solidFill>
-                <a:schemeClr val="tx2"/>
-              </a:solidFill>
-            </a:endParaRPr>
           </a:p>
         </p:txBody>
       </p:sp>
@@ -8036,7 +8121,7 @@
                 <a:gridCol w="3906982">
                   <a:extLst>
                     <a:ext uri="{9D8B030D-6E8A-4147-A177-3AD203B41FA5}">
-                      <a16:colId xmlns:a16="http://schemas.microsoft.com/office/drawing/2014/main" xmlns="" val="2057432390"/>
+                      <a16:colId xmlns="" xmlns:a16="http://schemas.microsoft.com/office/drawing/2014/main" val="2057432390"/>
                     </a:ext>
                   </a:extLst>
                 </a:gridCol>
@@ -8070,7 +8155,7 @@
                 </a:tc>
                 <a:extLst>
                   <a:ext uri="{0D108BD9-81ED-4DB2-BD59-A6C34878D82A}">
-                    <a16:rowId xmlns:a16="http://schemas.microsoft.com/office/drawing/2014/main" xmlns="" val="3202738208"/>
+                    <a16:rowId xmlns="" xmlns:a16="http://schemas.microsoft.com/office/drawing/2014/main" val="3202738208"/>
                   </a:ext>
                 </a:extLst>
               </a:tr>
@@ -8226,7 +8311,7 @@
                 </a:tc>
                 <a:extLst>
                   <a:ext uri="{0D108BD9-81ED-4DB2-BD59-A6C34878D82A}">
-                    <a16:rowId xmlns:a16="http://schemas.microsoft.com/office/drawing/2014/main" xmlns="" val="3915779658"/>
+                    <a16:rowId xmlns="" xmlns:a16="http://schemas.microsoft.com/office/drawing/2014/main" val="3915779658"/>
                   </a:ext>
                 </a:extLst>
               </a:tr>
@@ -8310,7 +8395,7 @@
                 <a:gridCol w="3874654">
                   <a:extLst>
                     <a:ext uri="{9D8B030D-6E8A-4147-A177-3AD203B41FA5}">
-                      <a16:colId xmlns:a16="http://schemas.microsoft.com/office/drawing/2014/main" xmlns="" val="2057432390"/>
+                      <a16:colId xmlns="" xmlns:a16="http://schemas.microsoft.com/office/drawing/2014/main" val="2057432390"/>
                     </a:ext>
                   </a:extLst>
                 </a:gridCol>
@@ -8344,7 +8429,7 @@
                 </a:tc>
                 <a:extLst>
                   <a:ext uri="{0D108BD9-81ED-4DB2-BD59-A6C34878D82A}">
-                    <a16:rowId xmlns:a16="http://schemas.microsoft.com/office/drawing/2014/main" xmlns="" val="3202738208"/>
+                    <a16:rowId xmlns="" xmlns:a16="http://schemas.microsoft.com/office/drawing/2014/main" val="3202738208"/>
                   </a:ext>
                 </a:extLst>
               </a:tr>
@@ -8402,7 +8487,7 @@
                 </a:tc>
                 <a:extLst>
                   <a:ext uri="{0D108BD9-81ED-4DB2-BD59-A6C34878D82A}">
-                    <a16:rowId xmlns:a16="http://schemas.microsoft.com/office/drawing/2014/main" xmlns="" val="3915779658"/>
+                    <a16:rowId xmlns="" xmlns:a16="http://schemas.microsoft.com/office/drawing/2014/main" val="3915779658"/>
                   </a:ext>
                 </a:extLst>
               </a:tr>
@@ -8486,7 +8571,7 @@
                 <a:gridCol w="4054764">
                   <a:extLst>
                     <a:ext uri="{9D8B030D-6E8A-4147-A177-3AD203B41FA5}">
-                      <a16:colId xmlns:a16="http://schemas.microsoft.com/office/drawing/2014/main" xmlns="" val="2057432390"/>
+                      <a16:colId xmlns="" xmlns:a16="http://schemas.microsoft.com/office/drawing/2014/main" val="2057432390"/>
                     </a:ext>
                   </a:extLst>
                 </a:gridCol>
@@ -8520,7 +8605,7 @@
                 </a:tc>
                 <a:extLst>
                   <a:ext uri="{0D108BD9-81ED-4DB2-BD59-A6C34878D82A}">
-                    <a16:rowId xmlns:a16="http://schemas.microsoft.com/office/drawing/2014/main" xmlns="" val="3202738208"/>
+                    <a16:rowId xmlns="" xmlns:a16="http://schemas.microsoft.com/office/drawing/2014/main" val="3202738208"/>
                   </a:ext>
                 </a:extLst>
               </a:tr>
@@ -8602,7 +8687,7 @@
                 </a:tc>
                 <a:extLst>
                   <a:ext uri="{0D108BD9-81ED-4DB2-BD59-A6C34878D82A}">
-                    <a16:rowId xmlns:a16="http://schemas.microsoft.com/office/drawing/2014/main" xmlns="" val="3915779658"/>
+                    <a16:rowId xmlns="" xmlns:a16="http://schemas.microsoft.com/office/drawing/2014/main" val="3915779658"/>
                   </a:ext>
                 </a:extLst>
               </a:tr>
@@ -8755,7 +8840,7 @@
                 <a:gridCol w="3906982">
                   <a:extLst>
                     <a:ext uri="{9D8B030D-6E8A-4147-A177-3AD203B41FA5}">
-                      <a16:colId xmlns:a16="http://schemas.microsoft.com/office/drawing/2014/main" xmlns="" val="2057432390"/>
+                      <a16:colId xmlns="" xmlns:a16="http://schemas.microsoft.com/office/drawing/2014/main" val="2057432390"/>
                     </a:ext>
                   </a:extLst>
                 </a:gridCol>
@@ -8789,7 +8874,7 @@
                 </a:tc>
                 <a:extLst>
                   <a:ext uri="{0D108BD9-81ED-4DB2-BD59-A6C34878D82A}">
-                    <a16:rowId xmlns:a16="http://schemas.microsoft.com/office/drawing/2014/main" xmlns="" val="3202738208"/>
+                    <a16:rowId xmlns="" xmlns:a16="http://schemas.microsoft.com/office/drawing/2014/main" val="3202738208"/>
                   </a:ext>
                 </a:extLst>
               </a:tr>
@@ -8871,7 +8956,7 @@
                 </a:tc>
                 <a:extLst>
                   <a:ext uri="{0D108BD9-81ED-4DB2-BD59-A6C34878D82A}">
-                    <a16:rowId xmlns:a16="http://schemas.microsoft.com/office/drawing/2014/main" xmlns="" val="3915779658"/>
+                    <a16:rowId xmlns="" xmlns:a16="http://schemas.microsoft.com/office/drawing/2014/main" val="3915779658"/>
                   </a:ext>
                 </a:extLst>
               </a:tr>
@@ -8955,7 +9040,7 @@
                 <a:gridCol w="3874654">
                   <a:extLst>
                     <a:ext uri="{9D8B030D-6E8A-4147-A177-3AD203B41FA5}">
-                      <a16:colId xmlns:a16="http://schemas.microsoft.com/office/drawing/2014/main" xmlns="" val="2057432390"/>
+                      <a16:colId xmlns="" xmlns:a16="http://schemas.microsoft.com/office/drawing/2014/main" val="2057432390"/>
                     </a:ext>
                   </a:extLst>
                 </a:gridCol>
@@ -8989,7 +9074,7 @@
                 </a:tc>
                 <a:extLst>
                   <a:ext uri="{0D108BD9-81ED-4DB2-BD59-A6C34878D82A}">
-                    <a16:rowId xmlns:a16="http://schemas.microsoft.com/office/drawing/2014/main" xmlns="" val="3202738208"/>
+                    <a16:rowId xmlns="" xmlns:a16="http://schemas.microsoft.com/office/drawing/2014/main" val="3202738208"/>
                   </a:ext>
                 </a:extLst>
               </a:tr>
@@ -9071,7 +9156,7 @@
                 </a:tc>
                 <a:extLst>
                   <a:ext uri="{0D108BD9-81ED-4DB2-BD59-A6C34878D82A}">
-                    <a16:rowId xmlns:a16="http://schemas.microsoft.com/office/drawing/2014/main" xmlns="" val="3915779658"/>
+                    <a16:rowId xmlns="" xmlns:a16="http://schemas.microsoft.com/office/drawing/2014/main" val="3915779658"/>
                   </a:ext>
                 </a:extLst>
               </a:tr>
@@ -9267,7 +9352,6 @@
               <a:rPr lang="id-ID" dirty="0"/>
               <a:t>Bertanggung jawab dalam mengontrol pengeluaran perusahaan, dan menetapkan anggaran belanja perusahaan, seperti belanja memori, harddisk baru untuk menunjang kebutuhan pelanggan yang akan selalu bertambah tiap tahunnya.</a:t>
             </a:r>
-            <a:endParaRPr lang="id-ID" dirty="0"/>
           </a:p>
         </p:txBody>
       </p:sp>

</xml_diff>

<commit_message>
#20161116 -> perubahan gambar business canvas
</commit_message>
<xml_diff>
--- a/PPT/Business Plan MID.pptx
+++ b/PPT/Business Plan MID.pptx
@@ -213,7 +213,7 @@
           <a:p>
             <a:fld id="{8B48C99A-A39E-4101-9841-2841ADECF095}" type="datetimeFigureOut">
               <a:rPr lang="id-ID" smtClean="0"/>
-              <a:t>15/11/2016</a:t>
+              <a:t>16/11/2016</a:t>
             </a:fld>
             <a:endParaRPr lang="id-ID"/>
           </a:p>
@@ -378,7 +378,7 @@
           <a:p>
             <a:fld id="{D17A2ABF-6DA3-46C4-A412-9D37D241A630}" type="datetimeFigureOut">
               <a:rPr lang="id-ID" smtClean="0"/>
-              <a:t>15/11/2016</a:t>
+              <a:t>16/11/2016</a:t>
             </a:fld>
             <a:endParaRPr lang="id-ID"/>
           </a:p>
@@ -1649,7 +1649,7 @@
           <a:p>
             <a:fld id="{3CDF5237-F705-4D5E-906A-DC4C67CD4E04}" type="datetimeFigureOut">
               <a:rPr lang="id-ID" smtClean="0"/>
-              <a:t>15/11/2016</a:t>
+              <a:t>16/11/2016</a:t>
             </a:fld>
             <a:endParaRPr lang="id-ID"/>
           </a:p>
@@ -1955,7 +1955,7 @@
           <a:p>
             <a:fld id="{3CDF5237-F705-4D5E-906A-DC4C67CD4E04}" type="datetimeFigureOut">
               <a:rPr lang="id-ID" smtClean="0"/>
-              <a:t>15/11/2016</a:t>
+              <a:t>16/11/2016</a:t>
             </a:fld>
             <a:endParaRPr lang="id-ID"/>
           </a:p>
@@ -2244,7 +2244,7 @@
           <a:p>
             <a:fld id="{3CDF5237-F705-4D5E-906A-DC4C67CD4E04}" type="datetimeFigureOut">
               <a:rPr lang="id-ID" smtClean="0"/>
-              <a:t>15/11/2016</a:t>
+              <a:t>16/11/2016</a:t>
             </a:fld>
             <a:endParaRPr lang="id-ID"/>
           </a:p>
@@ -2802,7 +2802,7 @@
           <a:p>
             <a:fld id="{3CDF5237-F705-4D5E-906A-DC4C67CD4E04}" type="datetimeFigureOut">
               <a:rPr lang="id-ID" smtClean="0"/>
-              <a:t>15/11/2016</a:t>
+              <a:t>16/11/2016</a:t>
             </a:fld>
             <a:endParaRPr lang="id-ID"/>
           </a:p>
@@ -3074,7 +3074,7 @@
           <a:p>
             <a:fld id="{3CDF5237-F705-4D5E-906A-DC4C67CD4E04}" type="datetimeFigureOut">
               <a:rPr lang="id-ID" smtClean="0"/>
-              <a:t>15/11/2016</a:t>
+              <a:t>16/11/2016</a:t>
             </a:fld>
             <a:endParaRPr lang="id-ID"/>
           </a:p>
@@ -3306,7 +3306,7 @@
           <a:p>
             <a:fld id="{3CDF5237-F705-4D5E-906A-DC4C67CD4E04}" type="datetimeFigureOut">
               <a:rPr lang="id-ID" smtClean="0"/>
-              <a:t>15/11/2016</a:t>
+              <a:t>16/11/2016</a:t>
             </a:fld>
             <a:endParaRPr lang="id-ID"/>
           </a:p>
@@ -4114,7 +4114,7 @@
           <a:p>
             <a:fld id="{3CDF5237-F705-4D5E-906A-DC4C67CD4E04}" type="datetimeFigureOut">
               <a:rPr lang="id-ID" smtClean="0"/>
-              <a:t>15/11/2016</a:t>
+              <a:t>16/11/2016</a:t>
             </a:fld>
             <a:endParaRPr lang="id-ID"/>
           </a:p>
@@ -4527,7 +4527,7 @@
           <a:p>
             <a:fld id="{3CDF5237-F705-4D5E-906A-DC4C67CD4E04}" type="datetimeFigureOut">
               <a:rPr lang="id-ID" smtClean="0"/>
-              <a:t>15/11/2016</a:t>
+              <a:t>16/11/2016</a:t>
             </a:fld>
             <a:endParaRPr lang="id-ID"/>
           </a:p>
@@ -4687,7 +4687,7 @@
           <a:p>
             <a:fld id="{3CDF5237-F705-4D5E-906A-DC4C67CD4E04}" type="datetimeFigureOut">
               <a:rPr lang="id-ID" smtClean="0"/>
-              <a:t>15/11/2016</a:t>
+              <a:t>16/11/2016</a:t>
             </a:fld>
             <a:endParaRPr lang="id-ID"/>
           </a:p>
@@ -4838,7 +4838,7 @@
           <a:p>
             <a:fld id="{3CDF5237-F705-4D5E-906A-DC4C67CD4E04}" type="datetimeFigureOut">
               <a:rPr lang="id-ID" smtClean="0"/>
-              <a:t>15/11/2016</a:t>
+              <a:t>16/11/2016</a:t>
             </a:fld>
             <a:endParaRPr lang="id-ID"/>
           </a:p>
@@ -4959,7 +4959,7 @@
           <a:p>
             <a:fld id="{3CDF5237-F705-4D5E-906A-DC4C67CD4E04}" type="datetimeFigureOut">
               <a:rPr lang="id-ID" smtClean="0"/>
-              <a:t>15/11/2016</a:t>
+              <a:t>16/11/2016</a:t>
             </a:fld>
             <a:endParaRPr lang="id-ID"/>
           </a:p>
@@ -5302,7 +5302,7 @@
           <a:p>
             <a:fld id="{3CDF5237-F705-4D5E-906A-DC4C67CD4E04}" type="datetimeFigureOut">
               <a:rPr lang="id-ID" smtClean="0"/>
-              <a:t>15/11/2016</a:t>
+              <a:t>16/11/2016</a:t>
             </a:fld>
             <a:endParaRPr lang="id-ID"/>
           </a:p>
@@ -6495,8 +6495,8 @@
         </p:blipFill>
         <p:spPr>
           <a:xfrm>
-            <a:off x="1820924" y="1576136"/>
-            <a:ext cx="8550152" cy="5190900"/>
+            <a:off x="814551" y="1562875"/>
+            <a:ext cx="10562897" cy="5172776"/>
           </a:xfrm>
         </p:spPr>
       </p:pic>
@@ -8121,7 +8121,7 @@
                 <a:gridCol w="3906982">
                   <a:extLst>
                     <a:ext uri="{9D8B030D-6E8A-4147-A177-3AD203B41FA5}">
-                      <a16:colId xmlns="" xmlns:a16="http://schemas.microsoft.com/office/drawing/2014/main" val="2057432390"/>
+                      <a16:colId xmlns:a16="http://schemas.microsoft.com/office/drawing/2014/main" xmlns="" val="2057432390"/>
                     </a:ext>
                   </a:extLst>
                 </a:gridCol>
@@ -8155,7 +8155,7 @@
                 </a:tc>
                 <a:extLst>
                   <a:ext uri="{0D108BD9-81ED-4DB2-BD59-A6C34878D82A}">
-                    <a16:rowId xmlns="" xmlns:a16="http://schemas.microsoft.com/office/drawing/2014/main" val="3202738208"/>
+                    <a16:rowId xmlns:a16="http://schemas.microsoft.com/office/drawing/2014/main" xmlns="" val="3202738208"/>
                   </a:ext>
                 </a:extLst>
               </a:tr>
@@ -8311,7 +8311,7 @@
                 </a:tc>
                 <a:extLst>
                   <a:ext uri="{0D108BD9-81ED-4DB2-BD59-A6C34878D82A}">
-                    <a16:rowId xmlns="" xmlns:a16="http://schemas.microsoft.com/office/drawing/2014/main" val="3915779658"/>
+                    <a16:rowId xmlns:a16="http://schemas.microsoft.com/office/drawing/2014/main" xmlns="" val="3915779658"/>
                   </a:ext>
                 </a:extLst>
               </a:tr>
@@ -8395,7 +8395,7 @@
                 <a:gridCol w="3874654">
                   <a:extLst>
                     <a:ext uri="{9D8B030D-6E8A-4147-A177-3AD203B41FA5}">
-                      <a16:colId xmlns="" xmlns:a16="http://schemas.microsoft.com/office/drawing/2014/main" val="2057432390"/>
+                      <a16:colId xmlns:a16="http://schemas.microsoft.com/office/drawing/2014/main" xmlns="" val="2057432390"/>
                     </a:ext>
                   </a:extLst>
                 </a:gridCol>
@@ -8429,7 +8429,7 @@
                 </a:tc>
                 <a:extLst>
                   <a:ext uri="{0D108BD9-81ED-4DB2-BD59-A6C34878D82A}">
-                    <a16:rowId xmlns="" xmlns:a16="http://schemas.microsoft.com/office/drawing/2014/main" val="3202738208"/>
+                    <a16:rowId xmlns:a16="http://schemas.microsoft.com/office/drawing/2014/main" xmlns="" val="3202738208"/>
                   </a:ext>
                 </a:extLst>
               </a:tr>
@@ -8487,7 +8487,7 @@
                 </a:tc>
                 <a:extLst>
                   <a:ext uri="{0D108BD9-81ED-4DB2-BD59-A6C34878D82A}">
-                    <a16:rowId xmlns="" xmlns:a16="http://schemas.microsoft.com/office/drawing/2014/main" val="3915779658"/>
+                    <a16:rowId xmlns:a16="http://schemas.microsoft.com/office/drawing/2014/main" xmlns="" val="3915779658"/>
                   </a:ext>
                 </a:extLst>
               </a:tr>
@@ -8571,7 +8571,7 @@
                 <a:gridCol w="4054764">
                   <a:extLst>
                     <a:ext uri="{9D8B030D-6E8A-4147-A177-3AD203B41FA5}">
-                      <a16:colId xmlns="" xmlns:a16="http://schemas.microsoft.com/office/drawing/2014/main" val="2057432390"/>
+                      <a16:colId xmlns:a16="http://schemas.microsoft.com/office/drawing/2014/main" xmlns="" val="2057432390"/>
                     </a:ext>
                   </a:extLst>
                 </a:gridCol>
@@ -8605,7 +8605,7 @@
                 </a:tc>
                 <a:extLst>
                   <a:ext uri="{0D108BD9-81ED-4DB2-BD59-A6C34878D82A}">
-                    <a16:rowId xmlns="" xmlns:a16="http://schemas.microsoft.com/office/drawing/2014/main" val="3202738208"/>
+                    <a16:rowId xmlns:a16="http://schemas.microsoft.com/office/drawing/2014/main" xmlns="" val="3202738208"/>
                   </a:ext>
                 </a:extLst>
               </a:tr>
@@ -8687,7 +8687,7 @@
                 </a:tc>
                 <a:extLst>
                   <a:ext uri="{0D108BD9-81ED-4DB2-BD59-A6C34878D82A}">
-                    <a16:rowId xmlns="" xmlns:a16="http://schemas.microsoft.com/office/drawing/2014/main" val="3915779658"/>
+                    <a16:rowId xmlns:a16="http://schemas.microsoft.com/office/drawing/2014/main" xmlns="" val="3915779658"/>
                   </a:ext>
                 </a:extLst>
               </a:tr>
@@ -8840,7 +8840,7 @@
                 <a:gridCol w="3906982">
                   <a:extLst>
                     <a:ext uri="{9D8B030D-6E8A-4147-A177-3AD203B41FA5}">
-                      <a16:colId xmlns="" xmlns:a16="http://schemas.microsoft.com/office/drawing/2014/main" val="2057432390"/>
+                      <a16:colId xmlns:a16="http://schemas.microsoft.com/office/drawing/2014/main" xmlns="" val="2057432390"/>
                     </a:ext>
                   </a:extLst>
                 </a:gridCol>
@@ -8874,7 +8874,7 @@
                 </a:tc>
                 <a:extLst>
                   <a:ext uri="{0D108BD9-81ED-4DB2-BD59-A6C34878D82A}">
-                    <a16:rowId xmlns="" xmlns:a16="http://schemas.microsoft.com/office/drawing/2014/main" val="3202738208"/>
+                    <a16:rowId xmlns:a16="http://schemas.microsoft.com/office/drawing/2014/main" xmlns="" val="3202738208"/>
                   </a:ext>
                 </a:extLst>
               </a:tr>
@@ -8956,7 +8956,7 @@
                 </a:tc>
                 <a:extLst>
                   <a:ext uri="{0D108BD9-81ED-4DB2-BD59-A6C34878D82A}">
-                    <a16:rowId xmlns="" xmlns:a16="http://schemas.microsoft.com/office/drawing/2014/main" val="3915779658"/>
+                    <a16:rowId xmlns:a16="http://schemas.microsoft.com/office/drawing/2014/main" xmlns="" val="3915779658"/>
                   </a:ext>
                 </a:extLst>
               </a:tr>
@@ -9040,7 +9040,7 @@
                 <a:gridCol w="3874654">
                   <a:extLst>
                     <a:ext uri="{9D8B030D-6E8A-4147-A177-3AD203B41FA5}">
-                      <a16:colId xmlns="" xmlns:a16="http://schemas.microsoft.com/office/drawing/2014/main" val="2057432390"/>
+                      <a16:colId xmlns:a16="http://schemas.microsoft.com/office/drawing/2014/main" xmlns="" val="2057432390"/>
                     </a:ext>
                   </a:extLst>
                 </a:gridCol>
@@ -9074,7 +9074,7 @@
                 </a:tc>
                 <a:extLst>
                   <a:ext uri="{0D108BD9-81ED-4DB2-BD59-A6C34878D82A}">
-                    <a16:rowId xmlns="" xmlns:a16="http://schemas.microsoft.com/office/drawing/2014/main" val="3202738208"/>
+                    <a16:rowId xmlns:a16="http://schemas.microsoft.com/office/drawing/2014/main" xmlns="" val="3202738208"/>
                   </a:ext>
                 </a:extLst>
               </a:tr>
@@ -9156,7 +9156,7 @@
                 </a:tc>
                 <a:extLst>
                   <a:ext uri="{0D108BD9-81ED-4DB2-BD59-A6C34878D82A}">
-                    <a16:rowId xmlns="" xmlns:a16="http://schemas.microsoft.com/office/drawing/2014/main" val="3915779658"/>
+                    <a16:rowId xmlns:a16="http://schemas.microsoft.com/office/drawing/2014/main" xmlns="" val="3915779658"/>
                   </a:ext>
                 </a:extLst>
               </a:tr>

</xml_diff>

<commit_message>
#20161116 -> Penambahan design creative center
</commit_message>
<xml_diff>
--- a/PPT/Business Plan MID.pptx
+++ b/PPT/Business Plan MID.pptx
@@ -5450,7 +5450,7 @@
         <a:buChar char="•"/>
         <a:defRPr sz="1800" kern="1200">
           <a:solidFill>
-            <a:schemeClr val="tx1"/>
+            <a:schemeClr val="tx2"/>
           </a:solidFill>
           <a:latin typeface="Arial" panose="020B0604020202020204" pitchFamily="34" charset="0"/>
           <a:ea typeface="+mn-ea"/>
@@ -5468,7 +5468,7 @@
         <a:buChar char="•"/>
         <a:defRPr sz="1500" kern="1200">
           <a:solidFill>
-            <a:schemeClr val="tx1"/>
+            <a:schemeClr val="tx2"/>
           </a:solidFill>
           <a:latin typeface="Arial" panose="020B0604020202020204" pitchFamily="34" charset="0"/>
           <a:ea typeface="+mn-ea"/>
@@ -5486,7 +5486,7 @@
         <a:buChar char="•"/>
         <a:defRPr sz="1350" kern="1200">
           <a:solidFill>
-            <a:schemeClr val="tx1"/>
+            <a:schemeClr val="tx2"/>
           </a:solidFill>
           <a:latin typeface="Arial" panose="020B0604020202020204" pitchFamily="34" charset="0"/>
           <a:ea typeface="+mn-ea"/>
@@ -5504,7 +5504,7 @@
         <a:buChar char="•"/>
         <a:defRPr sz="1200" kern="1200">
           <a:solidFill>
-            <a:schemeClr val="tx1"/>
+            <a:schemeClr val="tx2"/>
           </a:solidFill>
           <a:latin typeface="Arial" panose="020B0604020202020204" pitchFamily="34" charset="0"/>
           <a:ea typeface="+mn-ea"/>
@@ -5522,7 +5522,7 @@
         <a:buChar char="•"/>
         <a:defRPr sz="1200" kern="1200">
           <a:solidFill>
-            <a:schemeClr val="tx1"/>
+            <a:schemeClr val="tx2"/>
           </a:solidFill>
           <a:latin typeface="Arial" panose="020B0604020202020204" pitchFamily="34" charset="0"/>
           <a:ea typeface="+mn-ea"/>
@@ -5877,7 +5877,9 @@
         </p:nvSpPr>
         <p:spPr/>
         <p:txBody>
-          <a:bodyPr/>
+          <a:bodyPr>
+            <a:noAutofit/>
+          </a:bodyPr>
           <a:lstStyle/>
           <a:p>
             <a:pPr marL="0" indent="0">
@@ -6378,10 +6380,32 @@
               <a:t>implementasi</a:t>
             </a:r>
             <a:r>
-              <a:rPr lang="en-US" dirty="0"/>
+              <a:rPr lang="en-US" dirty="0" smtClean="0"/>
               <a:t>.</a:t>
             </a:r>
-            <a:endParaRPr lang="id-ID" dirty="0"/>
+            <a:endParaRPr lang="id-ID" dirty="0" smtClean="0"/>
+          </a:p>
+          <a:p>
+            <a:pPr marL="0" indent="0">
+              <a:buNone/>
+            </a:pPr>
+            <a:r>
+              <a:rPr lang="id-ID" b="1" dirty="0">
+                <a:solidFill>
+                  <a:srgbClr val="00B0F0"/>
+                </a:solidFill>
+              </a:rPr>
+              <a:t>Design Creative Center</a:t>
+            </a:r>
+          </a:p>
+          <a:p>
+            <a:pPr marL="0" indent="0">
+              <a:buNone/>
+            </a:pPr>
+            <a:r>
+              <a:rPr lang="id-ID" dirty="0"/>
+              <a:t>Divisi ini bertugas dalam hal desain perusahaan, baik itu untuk tampilan UI aplikasi perusahaan, brosur, flyer, iklan di sosial media, dll. Divisi ini akan berkolaborasi dengan marketing division apabila akan diadakan suatu event promosi, dimana pihak marketing yang membuat skema promosinya dan pihak desain yang akan membuat desain persuasif yang dapat mencuri perhatian para calon pelanggan.</a:t>
+            </a:r>
           </a:p>
           <a:p>
             <a:pPr marL="0" indent="0">
@@ -8121,7 +8145,7 @@
                 <a:gridCol w="3906982">
                   <a:extLst>
                     <a:ext uri="{9D8B030D-6E8A-4147-A177-3AD203B41FA5}">
-                      <a16:colId xmlns:a16="http://schemas.microsoft.com/office/drawing/2014/main" xmlns="" val="2057432390"/>
+                      <a16:colId xmlns:a16="http://schemas.microsoft.com/office/drawing/2014/main" val="2057432390"/>
                     </a:ext>
                   </a:extLst>
                 </a:gridCol>
@@ -8155,7 +8179,7 @@
                 </a:tc>
                 <a:extLst>
                   <a:ext uri="{0D108BD9-81ED-4DB2-BD59-A6C34878D82A}">
-                    <a16:rowId xmlns:a16="http://schemas.microsoft.com/office/drawing/2014/main" xmlns="" val="3202738208"/>
+                    <a16:rowId xmlns:a16="http://schemas.microsoft.com/office/drawing/2014/main" val="3202738208"/>
                   </a:ext>
                 </a:extLst>
               </a:tr>
@@ -8311,7 +8335,7 @@
                 </a:tc>
                 <a:extLst>
                   <a:ext uri="{0D108BD9-81ED-4DB2-BD59-A6C34878D82A}">
-                    <a16:rowId xmlns:a16="http://schemas.microsoft.com/office/drawing/2014/main" xmlns="" val="3915779658"/>
+                    <a16:rowId xmlns:a16="http://schemas.microsoft.com/office/drawing/2014/main" val="3915779658"/>
                   </a:ext>
                 </a:extLst>
               </a:tr>
@@ -8395,7 +8419,7 @@
                 <a:gridCol w="3874654">
                   <a:extLst>
                     <a:ext uri="{9D8B030D-6E8A-4147-A177-3AD203B41FA5}">
-                      <a16:colId xmlns:a16="http://schemas.microsoft.com/office/drawing/2014/main" xmlns="" val="2057432390"/>
+                      <a16:colId xmlns:a16="http://schemas.microsoft.com/office/drawing/2014/main" val="2057432390"/>
                     </a:ext>
                   </a:extLst>
                 </a:gridCol>
@@ -8429,7 +8453,7 @@
                 </a:tc>
                 <a:extLst>
                   <a:ext uri="{0D108BD9-81ED-4DB2-BD59-A6C34878D82A}">
-                    <a16:rowId xmlns:a16="http://schemas.microsoft.com/office/drawing/2014/main" xmlns="" val="3202738208"/>
+                    <a16:rowId xmlns:a16="http://schemas.microsoft.com/office/drawing/2014/main" val="3202738208"/>
                   </a:ext>
                 </a:extLst>
               </a:tr>
@@ -8487,7 +8511,7 @@
                 </a:tc>
                 <a:extLst>
                   <a:ext uri="{0D108BD9-81ED-4DB2-BD59-A6C34878D82A}">
-                    <a16:rowId xmlns:a16="http://schemas.microsoft.com/office/drawing/2014/main" xmlns="" val="3915779658"/>
+                    <a16:rowId xmlns:a16="http://schemas.microsoft.com/office/drawing/2014/main" val="3915779658"/>
                   </a:ext>
                 </a:extLst>
               </a:tr>
@@ -8571,7 +8595,7 @@
                 <a:gridCol w="4054764">
                   <a:extLst>
                     <a:ext uri="{9D8B030D-6E8A-4147-A177-3AD203B41FA5}">
-                      <a16:colId xmlns:a16="http://schemas.microsoft.com/office/drawing/2014/main" xmlns="" val="2057432390"/>
+                      <a16:colId xmlns:a16="http://schemas.microsoft.com/office/drawing/2014/main" val="2057432390"/>
                     </a:ext>
                   </a:extLst>
                 </a:gridCol>
@@ -8605,7 +8629,7 @@
                 </a:tc>
                 <a:extLst>
                   <a:ext uri="{0D108BD9-81ED-4DB2-BD59-A6C34878D82A}">
-                    <a16:rowId xmlns:a16="http://schemas.microsoft.com/office/drawing/2014/main" xmlns="" val="3202738208"/>
+                    <a16:rowId xmlns:a16="http://schemas.microsoft.com/office/drawing/2014/main" val="3202738208"/>
                   </a:ext>
                 </a:extLst>
               </a:tr>
@@ -8687,7 +8711,7 @@
                 </a:tc>
                 <a:extLst>
                   <a:ext uri="{0D108BD9-81ED-4DB2-BD59-A6C34878D82A}">
-                    <a16:rowId xmlns:a16="http://schemas.microsoft.com/office/drawing/2014/main" xmlns="" val="3915779658"/>
+                    <a16:rowId xmlns:a16="http://schemas.microsoft.com/office/drawing/2014/main" val="3915779658"/>
                   </a:ext>
                 </a:extLst>
               </a:tr>
@@ -8840,7 +8864,7 @@
                 <a:gridCol w="3906982">
                   <a:extLst>
                     <a:ext uri="{9D8B030D-6E8A-4147-A177-3AD203B41FA5}">
-                      <a16:colId xmlns:a16="http://schemas.microsoft.com/office/drawing/2014/main" xmlns="" val="2057432390"/>
+                      <a16:colId xmlns:a16="http://schemas.microsoft.com/office/drawing/2014/main" val="2057432390"/>
                     </a:ext>
                   </a:extLst>
                 </a:gridCol>
@@ -8874,7 +8898,7 @@
                 </a:tc>
                 <a:extLst>
                   <a:ext uri="{0D108BD9-81ED-4DB2-BD59-A6C34878D82A}">
-                    <a16:rowId xmlns:a16="http://schemas.microsoft.com/office/drawing/2014/main" xmlns="" val="3202738208"/>
+                    <a16:rowId xmlns:a16="http://schemas.microsoft.com/office/drawing/2014/main" val="3202738208"/>
                   </a:ext>
                 </a:extLst>
               </a:tr>
@@ -8956,7 +8980,7 @@
                 </a:tc>
                 <a:extLst>
                   <a:ext uri="{0D108BD9-81ED-4DB2-BD59-A6C34878D82A}">
-                    <a16:rowId xmlns:a16="http://schemas.microsoft.com/office/drawing/2014/main" xmlns="" val="3915779658"/>
+                    <a16:rowId xmlns:a16="http://schemas.microsoft.com/office/drawing/2014/main" val="3915779658"/>
                   </a:ext>
                 </a:extLst>
               </a:tr>
@@ -9040,7 +9064,7 @@
                 <a:gridCol w="3874654">
                   <a:extLst>
                     <a:ext uri="{9D8B030D-6E8A-4147-A177-3AD203B41FA5}">
-                      <a16:colId xmlns:a16="http://schemas.microsoft.com/office/drawing/2014/main" xmlns="" val="2057432390"/>
+                      <a16:colId xmlns:a16="http://schemas.microsoft.com/office/drawing/2014/main" val="2057432390"/>
                     </a:ext>
                   </a:extLst>
                 </a:gridCol>
@@ -9074,7 +9098,7 @@
                 </a:tc>
                 <a:extLst>
                   <a:ext uri="{0D108BD9-81ED-4DB2-BD59-A6C34878D82A}">
-                    <a16:rowId xmlns:a16="http://schemas.microsoft.com/office/drawing/2014/main" xmlns="" val="3202738208"/>
+                    <a16:rowId xmlns:a16="http://schemas.microsoft.com/office/drawing/2014/main" val="3202738208"/>
                   </a:ext>
                 </a:extLst>
               </a:tr>
@@ -9156,7 +9180,7 @@
                 </a:tc>
                 <a:extLst>
                   <a:ext uri="{0D108BD9-81ED-4DB2-BD59-A6C34878D82A}">
-                    <a16:rowId xmlns:a16="http://schemas.microsoft.com/office/drawing/2014/main" xmlns="" val="3915779658"/>
+                    <a16:rowId xmlns:a16="http://schemas.microsoft.com/office/drawing/2014/main" val="3915779658"/>
                   </a:ext>
                 </a:extLst>
               </a:tr>

</xml_diff>

<commit_message>
#20161116 -> change style (minor)
</commit_message>
<xml_diff>
--- a/PPT/Business Plan MID.pptx
+++ b/PPT/Business Plan MID.pptx
@@ -6519,8 +6519,8 @@
         </p:blipFill>
         <p:spPr>
           <a:xfrm>
-            <a:off x="814551" y="1562875"/>
-            <a:ext cx="10562897" cy="5172776"/>
+            <a:off x="814551" y="1554480"/>
+            <a:ext cx="10562897" cy="5170515"/>
           </a:xfrm>
         </p:spPr>
       </p:pic>

</xml_diff>